<commit_message>
Updated slides of design choices of RLNC
</commit_message>
<xml_diff>
--- a/Docs/Design of a RLNC implementation on the switch.pptx
+++ b/Docs/Design of a RLNC implementation on the switch.pptx
@@ -9,10 +9,12 @@
     <p:sldId id="257" r:id="rId3"/>
     <p:sldId id="258" r:id="rId4"/>
     <p:sldId id="259" r:id="rId5"/>
-    <p:sldId id="260" r:id="rId6"/>
-    <p:sldId id="262" r:id="rId7"/>
-    <p:sldId id="261" r:id="rId8"/>
-    <p:sldId id="263" r:id="rId9"/>
+    <p:sldId id="266" r:id="rId6"/>
+    <p:sldId id="260" r:id="rId7"/>
+    <p:sldId id="262" r:id="rId8"/>
+    <p:sldId id="261" r:id="rId9"/>
+    <p:sldId id="263" r:id="rId10"/>
+    <p:sldId id="265" r:id="rId11"/>
   </p:sldIdLst>
   <p:sldSz cx="12192000" cy="6858000"/>
   <p:notesSz cx="6858000" cy="9144000"/>
@@ -111,6 +113,11 @@
       </a:defRPr>
     </a:lvl9pPr>
   </p:defaultTextStyle>
+  <p:extLst>
+    <p:ext uri="{EFAFB233-063F-42B5-8137-9DF3F51BA10A}">
+      <p15:sldGuideLst xmlns:p15="http://schemas.microsoft.com/office/powerpoint/2012/main"/>
+    </p:ext>
+  </p:extLst>
 </p:presentation>
 </file>
 
@@ -3103,6 +3110,753 @@
 </file>
 
 <file path=ppt/diagrams/colors5.xml><?xml version="1.0" encoding="utf-8"?>
+<dgm:colorsDef xmlns:dgm="http://schemas.openxmlformats.org/drawingml/2006/diagram" xmlns:a="http://schemas.openxmlformats.org/drawingml/2006/main" uniqueId="urn:microsoft.com/office/officeart/2005/8/colors/accent1_2">
+  <dgm:title val=""/>
+  <dgm:desc val=""/>
+  <dgm:catLst>
+    <dgm:cat type="accent1" pri="11200"/>
+  </dgm:catLst>
+  <dgm:styleLbl name="node0">
+    <dgm:fillClrLst meth="repeat">
+      <a:schemeClr val="accent1"/>
+    </dgm:fillClrLst>
+    <dgm:linClrLst meth="repeat">
+      <a:schemeClr val="lt1"/>
+    </dgm:linClrLst>
+    <dgm:effectClrLst/>
+    <dgm:txLinClrLst/>
+    <dgm:txFillClrLst/>
+    <dgm:txEffectClrLst/>
+  </dgm:styleLbl>
+  <dgm:styleLbl name="alignNode1">
+    <dgm:fillClrLst meth="repeat">
+      <a:schemeClr val="accent1"/>
+    </dgm:fillClrLst>
+    <dgm:linClrLst meth="repeat">
+      <a:schemeClr val="accent1"/>
+    </dgm:linClrLst>
+    <dgm:effectClrLst/>
+    <dgm:txLinClrLst/>
+    <dgm:txFillClrLst/>
+    <dgm:txEffectClrLst/>
+  </dgm:styleLbl>
+  <dgm:styleLbl name="node1">
+    <dgm:fillClrLst meth="repeat">
+      <a:schemeClr val="accent1"/>
+    </dgm:fillClrLst>
+    <dgm:linClrLst meth="repeat">
+      <a:schemeClr val="lt1"/>
+    </dgm:linClrLst>
+    <dgm:effectClrLst/>
+    <dgm:txLinClrLst/>
+    <dgm:txFillClrLst/>
+    <dgm:txEffectClrLst/>
+  </dgm:styleLbl>
+  <dgm:styleLbl name="lnNode1">
+    <dgm:fillClrLst meth="repeat">
+      <a:schemeClr val="accent1"/>
+    </dgm:fillClrLst>
+    <dgm:linClrLst meth="repeat">
+      <a:schemeClr val="lt1"/>
+    </dgm:linClrLst>
+    <dgm:effectClrLst/>
+    <dgm:txLinClrLst/>
+    <dgm:txFillClrLst/>
+    <dgm:txEffectClrLst/>
+  </dgm:styleLbl>
+  <dgm:styleLbl name="vennNode1">
+    <dgm:fillClrLst meth="repeat">
+      <a:schemeClr val="accent1">
+        <a:alpha val="50000"/>
+      </a:schemeClr>
+    </dgm:fillClrLst>
+    <dgm:linClrLst meth="repeat">
+      <a:schemeClr val="lt1"/>
+    </dgm:linClrLst>
+    <dgm:effectClrLst/>
+    <dgm:txLinClrLst/>
+    <dgm:txFillClrLst/>
+    <dgm:txEffectClrLst/>
+  </dgm:styleLbl>
+  <dgm:styleLbl name="node2">
+    <dgm:fillClrLst meth="repeat">
+      <a:schemeClr val="accent1"/>
+    </dgm:fillClrLst>
+    <dgm:linClrLst meth="repeat">
+      <a:schemeClr val="lt1"/>
+    </dgm:linClrLst>
+    <dgm:effectClrLst/>
+    <dgm:txLinClrLst/>
+    <dgm:txFillClrLst/>
+    <dgm:txEffectClrLst/>
+  </dgm:styleLbl>
+  <dgm:styleLbl name="node3">
+    <dgm:fillClrLst meth="repeat">
+      <a:schemeClr val="accent1"/>
+    </dgm:fillClrLst>
+    <dgm:linClrLst meth="repeat">
+      <a:schemeClr val="lt1"/>
+    </dgm:linClrLst>
+    <dgm:effectClrLst/>
+    <dgm:txLinClrLst/>
+    <dgm:txFillClrLst/>
+    <dgm:txEffectClrLst/>
+  </dgm:styleLbl>
+  <dgm:styleLbl name="node4">
+    <dgm:fillClrLst meth="repeat">
+      <a:schemeClr val="accent1"/>
+    </dgm:fillClrLst>
+    <dgm:linClrLst meth="repeat">
+      <a:schemeClr val="lt1"/>
+    </dgm:linClrLst>
+    <dgm:effectClrLst/>
+    <dgm:txLinClrLst/>
+    <dgm:txFillClrLst/>
+    <dgm:txEffectClrLst/>
+  </dgm:styleLbl>
+  <dgm:styleLbl name="fgImgPlace1">
+    <dgm:fillClrLst meth="repeat">
+      <a:schemeClr val="accent1">
+        <a:tint val="50000"/>
+      </a:schemeClr>
+    </dgm:fillClrLst>
+    <dgm:linClrLst meth="repeat">
+      <a:schemeClr val="lt1"/>
+    </dgm:linClrLst>
+    <dgm:effectClrLst/>
+    <dgm:txLinClrLst/>
+    <dgm:txFillClrLst meth="repeat">
+      <a:schemeClr val="lt1"/>
+    </dgm:txFillClrLst>
+    <dgm:txEffectClrLst/>
+  </dgm:styleLbl>
+  <dgm:styleLbl name="alignImgPlace1">
+    <dgm:fillClrLst meth="repeat">
+      <a:schemeClr val="accent1">
+        <a:tint val="50000"/>
+      </a:schemeClr>
+    </dgm:fillClrLst>
+    <dgm:linClrLst meth="repeat">
+      <a:schemeClr val="lt1"/>
+    </dgm:linClrLst>
+    <dgm:effectClrLst/>
+    <dgm:txLinClrLst/>
+    <dgm:txFillClrLst meth="repeat">
+      <a:schemeClr val="lt1"/>
+    </dgm:txFillClrLst>
+    <dgm:txEffectClrLst/>
+  </dgm:styleLbl>
+  <dgm:styleLbl name="bgImgPlace1">
+    <dgm:fillClrLst meth="repeat">
+      <a:schemeClr val="accent1">
+        <a:tint val="50000"/>
+      </a:schemeClr>
+    </dgm:fillClrLst>
+    <dgm:linClrLst meth="repeat">
+      <a:schemeClr val="lt1"/>
+    </dgm:linClrLst>
+    <dgm:effectClrLst/>
+    <dgm:txLinClrLst/>
+    <dgm:txFillClrLst meth="repeat">
+      <a:schemeClr val="lt1"/>
+    </dgm:txFillClrLst>
+    <dgm:txEffectClrLst/>
+  </dgm:styleLbl>
+  <dgm:styleLbl name="sibTrans2D1">
+    <dgm:fillClrLst meth="repeat">
+      <a:schemeClr val="accent1">
+        <a:tint val="60000"/>
+      </a:schemeClr>
+    </dgm:fillClrLst>
+    <dgm:linClrLst meth="repeat">
+      <a:schemeClr val="accent1">
+        <a:tint val="60000"/>
+      </a:schemeClr>
+    </dgm:linClrLst>
+    <dgm:effectClrLst/>
+    <dgm:txLinClrLst/>
+    <dgm:txFillClrLst/>
+    <dgm:txEffectClrLst/>
+  </dgm:styleLbl>
+  <dgm:styleLbl name="fgSibTrans2D1">
+    <dgm:fillClrLst meth="repeat">
+      <a:schemeClr val="accent1">
+        <a:tint val="60000"/>
+      </a:schemeClr>
+    </dgm:fillClrLst>
+    <dgm:linClrLst meth="repeat">
+      <a:schemeClr val="accent1">
+        <a:tint val="60000"/>
+      </a:schemeClr>
+    </dgm:linClrLst>
+    <dgm:effectClrLst/>
+    <dgm:txLinClrLst/>
+    <dgm:txFillClrLst/>
+    <dgm:txEffectClrLst/>
+  </dgm:styleLbl>
+  <dgm:styleLbl name="bgSibTrans2D1">
+    <dgm:fillClrLst meth="repeat">
+      <a:schemeClr val="accent1">
+        <a:tint val="60000"/>
+      </a:schemeClr>
+    </dgm:fillClrLst>
+    <dgm:linClrLst meth="repeat">
+      <a:schemeClr val="accent1">
+        <a:tint val="60000"/>
+      </a:schemeClr>
+    </dgm:linClrLst>
+    <dgm:effectClrLst/>
+    <dgm:txLinClrLst/>
+    <dgm:txFillClrLst/>
+    <dgm:txEffectClrLst/>
+  </dgm:styleLbl>
+  <dgm:styleLbl name="sibTrans1D1">
+    <dgm:fillClrLst meth="repeat">
+      <a:schemeClr val="accent1"/>
+    </dgm:fillClrLst>
+    <dgm:linClrLst meth="repeat">
+      <a:schemeClr val="accent1"/>
+    </dgm:linClrLst>
+    <dgm:effectClrLst/>
+    <dgm:txLinClrLst/>
+    <dgm:txFillClrLst meth="repeat">
+      <a:schemeClr val="tx1"/>
+    </dgm:txFillClrLst>
+    <dgm:txEffectClrLst/>
+  </dgm:styleLbl>
+  <dgm:styleLbl name="callout">
+    <dgm:fillClrLst meth="repeat">
+      <a:schemeClr val="accent1"/>
+    </dgm:fillClrLst>
+    <dgm:linClrLst meth="repeat">
+      <a:schemeClr val="accent1">
+        <a:tint val="50000"/>
+      </a:schemeClr>
+    </dgm:linClrLst>
+    <dgm:effectClrLst/>
+    <dgm:txLinClrLst/>
+    <dgm:txFillClrLst meth="repeat">
+      <a:schemeClr val="tx1"/>
+    </dgm:txFillClrLst>
+    <dgm:txEffectClrLst/>
+  </dgm:styleLbl>
+  <dgm:styleLbl name="asst0">
+    <dgm:fillClrLst meth="repeat">
+      <a:schemeClr val="accent1"/>
+    </dgm:fillClrLst>
+    <dgm:linClrLst meth="repeat">
+      <a:schemeClr val="lt1"/>
+    </dgm:linClrLst>
+    <dgm:effectClrLst/>
+    <dgm:txLinClrLst/>
+    <dgm:txFillClrLst/>
+    <dgm:txEffectClrLst/>
+  </dgm:styleLbl>
+  <dgm:styleLbl name="asst1">
+    <dgm:fillClrLst meth="repeat">
+      <a:schemeClr val="accent1"/>
+    </dgm:fillClrLst>
+    <dgm:linClrLst meth="repeat">
+      <a:schemeClr val="lt1"/>
+    </dgm:linClrLst>
+    <dgm:effectClrLst/>
+    <dgm:txLinClrLst/>
+    <dgm:txFillClrLst/>
+    <dgm:txEffectClrLst/>
+  </dgm:styleLbl>
+  <dgm:styleLbl name="asst2">
+    <dgm:fillClrLst meth="repeat">
+      <a:schemeClr val="accent1"/>
+    </dgm:fillClrLst>
+    <dgm:linClrLst meth="repeat">
+      <a:schemeClr val="lt1"/>
+    </dgm:linClrLst>
+    <dgm:effectClrLst/>
+    <dgm:txLinClrLst/>
+    <dgm:txFillClrLst/>
+    <dgm:txEffectClrLst/>
+  </dgm:styleLbl>
+  <dgm:styleLbl name="asst3">
+    <dgm:fillClrLst meth="repeat">
+      <a:schemeClr val="accent1"/>
+    </dgm:fillClrLst>
+    <dgm:linClrLst meth="repeat">
+      <a:schemeClr val="lt1"/>
+    </dgm:linClrLst>
+    <dgm:effectClrLst/>
+    <dgm:txLinClrLst/>
+    <dgm:txFillClrLst/>
+    <dgm:txEffectClrLst/>
+  </dgm:styleLbl>
+  <dgm:styleLbl name="asst4">
+    <dgm:fillClrLst meth="repeat">
+      <a:schemeClr val="accent1"/>
+    </dgm:fillClrLst>
+    <dgm:linClrLst meth="repeat">
+      <a:schemeClr val="lt1"/>
+    </dgm:linClrLst>
+    <dgm:effectClrLst/>
+    <dgm:txLinClrLst/>
+    <dgm:txFillClrLst/>
+    <dgm:txEffectClrLst/>
+  </dgm:styleLbl>
+  <dgm:styleLbl name="parChTrans2D1">
+    <dgm:fillClrLst meth="repeat">
+      <a:schemeClr val="accent1">
+        <a:tint val="60000"/>
+      </a:schemeClr>
+    </dgm:fillClrLst>
+    <dgm:linClrLst meth="repeat">
+      <a:schemeClr val="accent1">
+        <a:tint val="60000"/>
+      </a:schemeClr>
+    </dgm:linClrLst>
+    <dgm:effectClrLst/>
+    <dgm:txLinClrLst/>
+    <dgm:txFillClrLst meth="repeat">
+      <a:schemeClr val="lt1"/>
+    </dgm:txFillClrLst>
+    <dgm:txEffectClrLst/>
+  </dgm:styleLbl>
+  <dgm:styleLbl name="parChTrans2D2">
+    <dgm:fillClrLst meth="repeat">
+      <a:schemeClr val="accent1"/>
+    </dgm:fillClrLst>
+    <dgm:linClrLst meth="repeat">
+      <a:schemeClr val="accent1"/>
+    </dgm:linClrLst>
+    <dgm:effectClrLst/>
+    <dgm:txLinClrLst/>
+    <dgm:txFillClrLst meth="repeat">
+      <a:schemeClr val="lt1"/>
+    </dgm:txFillClrLst>
+    <dgm:txEffectClrLst/>
+  </dgm:styleLbl>
+  <dgm:styleLbl name="parChTrans2D3">
+    <dgm:fillClrLst meth="repeat">
+      <a:schemeClr val="accent1"/>
+    </dgm:fillClrLst>
+    <dgm:linClrLst meth="repeat">
+      <a:schemeClr val="accent1"/>
+    </dgm:linClrLst>
+    <dgm:effectClrLst/>
+    <dgm:txLinClrLst/>
+    <dgm:txFillClrLst meth="repeat">
+      <a:schemeClr val="lt1"/>
+    </dgm:txFillClrLst>
+    <dgm:txEffectClrLst/>
+  </dgm:styleLbl>
+  <dgm:styleLbl name="parChTrans2D4">
+    <dgm:fillClrLst meth="repeat">
+      <a:schemeClr val="accent1"/>
+    </dgm:fillClrLst>
+    <dgm:linClrLst meth="repeat">
+      <a:schemeClr val="accent1"/>
+    </dgm:linClrLst>
+    <dgm:effectClrLst/>
+    <dgm:txLinClrLst/>
+    <dgm:txFillClrLst meth="repeat">
+      <a:schemeClr val="lt1"/>
+    </dgm:txFillClrLst>
+    <dgm:txEffectClrLst/>
+  </dgm:styleLbl>
+  <dgm:styleLbl name="parChTrans1D1">
+    <dgm:fillClrLst meth="repeat">
+      <a:schemeClr val="accent1"/>
+    </dgm:fillClrLst>
+    <dgm:linClrLst meth="repeat">
+      <a:schemeClr val="accent1">
+        <a:shade val="60000"/>
+      </a:schemeClr>
+    </dgm:linClrLst>
+    <dgm:effectClrLst/>
+    <dgm:txLinClrLst/>
+    <dgm:txFillClrLst meth="repeat">
+      <a:schemeClr val="tx1"/>
+    </dgm:txFillClrLst>
+    <dgm:txEffectClrLst/>
+  </dgm:styleLbl>
+  <dgm:styleLbl name="parChTrans1D2">
+    <dgm:fillClrLst meth="repeat">
+      <a:schemeClr val="accent1"/>
+    </dgm:fillClrLst>
+    <dgm:linClrLst meth="repeat">
+      <a:schemeClr val="accent1">
+        <a:shade val="60000"/>
+      </a:schemeClr>
+    </dgm:linClrLst>
+    <dgm:effectClrLst/>
+    <dgm:txLinClrLst/>
+    <dgm:txFillClrLst meth="repeat">
+      <a:schemeClr val="tx1"/>
+    </dgm:txFillClrLst>
+    <dgm:txEffectClrLst/>
+  </dgm:styleLbl>
+  <dgm:styleLbl name="parChTrans1D3">
+    <dgm:fillClrLst meth="repeat">
+      <a:schemeClr val="accent1"/>
+    </dgm:fillClrLst>
+    <dgm:linClrLst meth="repeat">
+      <a:schemeClr val="accent1">
+        <a:shade val="80000"/>
+      </a:schemeClr>
+    </dgm:linClrLst>
+    <dgm:effectClrLst/>
+    <dgm:txLinClrLst/>
+    <dgm:txFillClrLst meth="repeat">
+      <a:schemeClr val="tx1"/>
+    </dgm:txFillClrLst>
+    <dgm:txEffectClrLst/>
+  </dgm:styleLbl>
+  <dgm:styleLbl name="parChTrans1D4">
+    <dgm:fillClrLst meth="repeat">
+      <a:schemeClr val="accent1"/>
+    </dgm:fillClrLst>
+    <dgm:linClrLst meth="repeat">
+      <a:schemeClr val="accent1">
+        <a:shade val="80000"/>
+      </a:schemeClr>
+    </dgm:linClrLst>
+    <dgm:effectClrLst/>
+    <dgm:txLinClrLst/>
+    <dgm:txFillClrLst meth="repeat">
+      <a:schemeClr val="tx1"/>
+    </dgm:txFillClrLst>
+    <dgm:txEffectClrLst/>
+  </dgm:styleLbl>
+  <dgm:styleLbl name="fgAcc1">
+    <dgm:fillClrLst meth="repeat">
+      <a:schemeClr val="lt1">
+        <a:alpha val="90000"/>
+      </a:schemeClr>
+    </dgm:fillClrLst>
+    <dgm:linClrLst meth="repeat">
+      <a:schemeClr val="accent1"/>
+    </dgm:linClrLst>
+    <dgm:effectClrLst/>
+    <dgm:txLinClrLst/>
+    <dgm:txFillClrLst meth="repeat">
+      <a:schemeClr val="dk1"/>
+    </dgm:txFillClrLst>
+    <dgm:txEffectClrLst/>
+  </dgm:styleLbl>
+  <dgm:styleLbl name="conFgAcc1">
+    <dgm:fillClrLst meth="repeat">
+      <a:schemeClr val="lt1">
+        <a:alpha val="90000"/>
+      </a:schemeClr>
+    </dgm:fillClrLst>
+    <dgm:linClrLst meth="repeat">
+      <a:schemeClr val="accent1"/>
+    </dgm:linClrLst>
+    <dgm:effectClrLst/>
+    <dgm:txLinClrLst/>
+    <dgm:txFillClrLst meth="repeat">
+      <a:schemeClr val="dk1"/>
+    </dgm:txFillClrLst>
+    <dgm:txEffectClrLst/>
+  </dgm:styleLbl>
+  <dgm:styleLbl name="alignAcc1">
+    <dgm:fillClrLst meth="repeat">
+      <a:schemeClr val="lt1">
+        <a:alpha val="90000"/>
+      </a:schemeClr>
+    </dgm:fillClrLst>
+    <dgm:linClrLst meth="repeat">
+      <a:schemeClr val="accent1"/>
+    </dgm:linClrLst>
+    <dgm:effectClrLst/>
+    <dgm:txLinClrLst/>
+    <dgm:txFillClrLst meth="repeat">
+      <a:schemeClr val="dk1"/>
+    </dgm:txFillClrLst>
+    <dgm:txEffectClrLst/>
+  </dgm:styleLbl>
+  <dgm:styleLbl name="trAlignAcc1">
+    <dgm:fillClrLst meth="repeat">
+      <a:schemeClr val="lt1">
+        <a:alpha val="40000"/>
+      </a:schemeClr>
+    </dgm:fillClrLst>
+    <dgm:linClrLst meth="repeat">
+      <a:schemeClr val="accent1"/>
+    </dgm:linClrLst>
+    <dgm:effectClrLst/>
+    <dgm:txLinClrLst/>
+    <dgm:txFillClrLst meth="repeat">
+      <a:schemeClr val="dk1"/>
+    </dgm:txFillClrLst>
+    <dgm:txEffectClrLst/>
+  </dgm:styleLbl>
+  <dgm:styleLbl name="bgAcc1">
+    <dgm:fillClrLst meth="repeat">
+      <a:schemeClr val="lt1">
+        <a:alpha val="90000"/>
+      </a:schemeClr>
+    </dgm:fillClrLst>
+    <dgm:linClrLst meth="repeat">
+      <a:schemeClr val="accent1"/>
+    </dgm:linClrLst>
+    <dgm:effectClrLst/>
+    <dgm:txLinClrLst/>
+    <dgm:txFillClrLst meth="repeat">
+      <a:schemeClr val="dk1"/>
+    </dgm:txFillClrLst>
+    <dgm:txEffectClrLst/>
+  </dgm:styleLbl>
+  <dgm:styleLbl name="solidFgAcc1">
+    <dgm:fillClrLst meth="repeat">
+      <a:schemeClr val="lt1"/>
+    </dgm:fillClrLst>
+    <dgm:linClrLst meth="repeat">
+      <a:schemeClr val="accent1"/>
+    </dgm:linClrLst>
+    <dgm:effectClrLst/>
+    <dgm:txLinClrLst/>
+    <dgm:txFillClrLst meth="repeat">
+      <a:schemeClr val="dk1"/>
+    </dgm:txFillClrLst>
+    <dgm:txEffectClrLst/>
+  </dgm:styleLbl>
+  <dgm:styleLbl name="solidAlignAcc1">
+    <dgm:fillClrLst meth="repeat">
+      <a:schemeClr val="lt1"/>
+    </dgm:fillClrLst>
+    <dgm:linClrLst meth="repeat">
+      <a:schemeClr val="accent1"/>
+    </dgm:linClrLst>
+    <dgm:effectClrLst/>
+    <dgm:txLinClrLst/>
+    <dgm:txFillClrLst meth="repeat">
+      <a:schemeClr val="dk1"/>
+    </dgm:txFillClrLst>
+    <dgm:txEffectClrLst/>
+  </dgm:styleLbl>
+  <dgm:styleLbl name="solidBgAcc1">
+    <dgm:fillClrLst meth="repeat">
+      <a:schemeClr val="lt1"/>
+    </dgm:fillClrLst>
+    <dgm:linClrLst meth="repeat">
+      <a:schemeClr val="accent1"/>
+    </dgm:linClrLst>
+    <dgm:effectClrLst/>
+    <dgm:txLinClrLst/>
+    <dgm:txFillClrLst meth="repeat">
+      <a:schemeClr val="dk1"/>
+    </dgm:txFillClrLst>
+    <dgm:txEffectClrLst/>
+  </dgm:styleLbl>
+  <dgm:styleLbl name="fgAccFollowNode1">
+    <dgm:fillClrLst meth="repeat">
+      <a:schemeClr val="accent1">
+        <a:alpha val="90000"/>
+        <a:tint val="40000"/>
+      </a:schemeClr>
+    </dgm:fillClrLst>
+    <dgm:linClrLst meth="repeat">
+      <a:schemeClr val="accent1">
+        <a:alpha val="90000"/>
+        <a:tint val="40000"/>
+      </a:schemeClr>
+    </dgm:linClrLst>
+    <dgm:effectClrLst/>
+    <dgm:txLinClrLst/>
+    <dgm:txFillClrLst meth="repeat">
+      <a:schemeClr val="dk1"/>
+    </dgm:txFillClrLst>
+    <dgm:txEffectClrLst/>
+  </dgm:styleLbl>
+  <dgm:styleLbl name="alignAccFollowNode1">
+    <dgm:fillClrLst meth="repeat">
+      <a:schemeClr val="accent1">
+        <a:alpha val="90000"/>
+        <a:tint val="40000"/>
+      </a:schemeClr>
+    </dgm:fillClrLst>
+    <dgm:linClrLst meth="repeat">
+      <a:schemeClr val="accent1">
+        <a:alpha val="90000"/>
+        <a:tint val="40000"/>
+      </a:schemeClr>
+    </dgm:linClrLst>
+    <dgm:effectClrLst/>
+    <dgm:txLinClrLst/>
+    <dgm:txFillClrLst meth="repeat">
+      <a:schemeClr val="dk1"/>
+    </dgm:txFillClrLst>
+    <dgm:txEffectClrLst/>
+  </dgm:styleLbl>
+  <dgm:styleLbl name="bgAccFollowNode1">
+    <dgm:fillClrLst meth="repeat">
+      <a:schemeClr val="accent1">
+        <a:alpha val="90000"/>
+        <a:tint val="40000"/>
+      </a:schemeClr>
+    </dgm:fillClrLst>
+    <dgm:linClrLst meth="repeat">
+      <a:schemeClr val="accent1">
+        <a:alpha val="90000"/>
+        <a:tint val="40000"/>
+      </a:schemeClr>
+    </dgm:linClrLst>
+    <dgm:effectClrLst/>
+    <dgm:txLinClrLst/>
+    <dgm:txFillClrLst meth="repeat">
+      <a:schemeClr val="dk1"/>
+    </dgm:txFillClrLst>
+    <dgm:txEffectClrLst/>
+  </dgm:styleLbl>
+  <dgm:styleLbl name="fgAcc0">
+    <dgm:fillClrLst meth="repeat">
+      <a:schemeClr val="lt1">
+        <a:alpha val="90000"/>
+      </a:schemeClr>
+    </dgm:fillClrLst>
+    <dgm:linClrLst meth="repeat">
+      <a:schemeClr val="accent1"/>
+    </dgm:linClrLst>
+    <dgm:effectClrLst/>
+    <dgm:txLinClrLst/>
+    <dgm:txFillClrLst meth="repeat">
+      <a:schemeClr val="dk1"/>
+    </dgm:txFillClrLst>
+    <dgm:txEffectClrLst/>
+  </dgm:styleLbl>
+  <dgm:styleLbl name="fgAcc2">
+    <dgm:fillClrLst meth="repeat">
+      <a:schemeClr val="lt1">
+        <a:alpha val="90000"/>
+      </a:schemeClr>
+    </dgm:fillClrLst>
+    <dgm:linClrLst meth="repeat">
+      <a:schemeClr val="accent1"/>
+    </dgm:linClrLst>
+    <dgm:effectClrLst/>
+    <dgm:txLinClrLst/>
+    <dgm:txFillClrLst meth="repeat">
+      <a:schemeClr val="dk1"/>
+    </dgm:txFillClrLst>
+    <dgm:txEffectClrLst/>
+  </dgm:styleLbl>
+  <dgm:styleLbl name="fgAcc3">
+    <dgm:fillClrLst meth="repeat">
+      <a:schemeClr val="lt1">
+        <a:alpha val="90000"/>
+      </a:schemeClr>
+    </dgm:fillClrLst>
+    <dgm:linClrLst meth="repeat">
+      <a:schemeClr val="accent1"/>
+    </dgm:linClrLst>
+    <dgm:effectClrLst/>
+    <dgm:txLinClrLst/>
+    <dgm:txFillClrLst meth="repeat">
+      <a:schemeClr val="dk1"/>
+    </dgm:txFillClrLst>
+    <dgm:txEffectClrLst/>
+  </dgm:styleLbl>
+  <dgm:styleLbl name="fgAcc4">
+    <dgm:fillClrLst meth="repeat">
+      <a:schemeClr val="lt1">
+        <a:alpha val="90000"/>
+      </a:schemeClr>
+    </dgm:fillClrLst>
+    <dgm:linClrLst meth="repeat">
+      <a:schemeClr val="accent1"/>
+    </dgm:linClrLst>
+    <dgm:effectClrLst/>
+    <dgm:txLinClrLst/>
+    <dgm:txFillClrLst meth="repeat">
+      <a:schemeClr val="dk1"/>
+    </dgm:txFillClrLst>
+    <dgm:txEffectClrLst/>
+  </dgm:styleLbl>
+  <dgm:styleLbl name="bgShp">
+    <dgm:fillClrLst meth="repeat">
+      <a:schemeClr val="accent1">
+        <a:tint val="40000"/>
+      </a:schemeClr>
+    </dgm:fillClrLst>
+    <dgm:linClrLst meth="repeat">
+      <a:schemeClr val="accent1"/>
+    </dgm:linClrLst>
+    <dgm:effectClrLst/>
+    <dgm:txLinClrLst/>
+    <dgm:txFillClrLst meth="repeat">
+      <a:schemeClr val="dk1"/>
+    </dgm:txFillClrLst>
+    <dgm:txEffectClrLst/>
+  </dgm:styleLbl>
+  <dgm:styleLbl name="dkBgShp">
+    <dgm:fillClrLst meth="repeat">
+      <a:schemeClr val="accent1">
+        <a:shade val="80000"/>
+      </a:schemeClr>
+    </dgm:fillClrLst>
+    <dgm:linClrLst meth="repeat">
+      <a:schemeClr val="accent1"/>
+    </dgm:linClrLst>
+    <dgm:effectClrLst/>
+    <dgm:txLinClrLst/>
+    <dgm:txFillClrLst meth="repeat">
+      <a:schemeClr val="lt1"/>
+    </dgm:txFillClrLst>
+    <dgm:txEffectClrLst/>
+  </dgm:styleLbl>
+  <dgm:styleLbl name="trBgShp">
+    <dgm:fillClrLst meth="repeat">
+      <a:schemeClr val="accent1">
+        <a:tint val="50000"/>
+        <a:alpha val="40000"/>
+      </a:schemeClr>
+    </dgm:fillClrLst>
+    <dgm:linClrLst meth="repeat">
+      <a:schemeClr val="accent1"/>
+    </dgm:linClrLst>
+    <dgm:effectClrLst/>
+    <dgm:txLinClrLst/>
+    <dgm:txFillClrLst meth="repeat">
+      <a:schemeClr val="lt1"/>
+    </dgm:txFillClrLst>
+    <dgm:txEffectClrLst/>
+  </dgm:styleLbl>
+  <dgm:styleLbl name="fgShp">
+    <dgm:fillClrLst meth="repeat">
+      <a:schemeClr val="accent1">
+        <a:tint val="60000"/>
+      </a:schemeClr>
+    </dgm:fillClrLst>
+    <dgm:linClrLst meth="repeat">
+      <a:schemeClr val="lt1"/>
+    </dgm:linClrLst>
+    <dgm:effectClrLst/>
+    <dgm:txLinClrLst/>
+    <dgm:txFillClrLst meth="repeat">
+      <a:schemeClr val="dk1"/>
+    </dgm:txFillClrLst>
+    <dgm:txEffectClrLst/>
+  </dgm:styleLbl>
+  <dgm:styleLbl name="revTx">
+    <dgm:fillClrLst meth="repeat">
+      <a:schemeClr val="lt1">
+        <a:alpha val="0"/>
+      </a:schemeClr>
+    </dgm:fillClrLst>
+    <dgm:linClrLst meth="repeat">
+      <a:schemeClr val="dk1">
+        <a:alpha val="0"/>
+      </a:schemeClr>
+    </dgm:linClrLst>
+    <dgm:effectClrLst/>
+    <dgm:txLinClrLst/>
+    <dgm:txFillClrLst meth="repeat">
+      <a:schemeClr val="tx1"/>
+    </dgm:txFillClrLst>
+    <dgm:txEffectClrLst/>
+  </dgm:styleLbl>
+</dgm:colorsDef>
+</file>
+
+<file path=ppt/diagrams/colors6.xml><?xml version="1.0" encoding="utf-8"?>
 <dgm:colorsDef xmlns:dgm="http://schemas.openxmlformats.org/drawingml/2006/diagram" xmlns:a="http://schemas.openxmlformats.org/drawingml/2006/main" uniqueId="urn:microsoft.com/office/officeart/2005/8/colors/accent1_2">
   <dgm:title val=""/>
   <dgm:desc val=""/>
@@ -4559,22 +5313,19 @@
       <dgm:prSet phldrT="[Texto]"/>
       <dgm:spPr>
         <a:solidFill>
-          <a:srgbClr val="C00000"/>
+          <a:srgbClr val="C00000">
+            <a:alpha val="0"/>
+          </a:srgbClr>
         </a:solidFill>
         <a:ln>
-          <a:solidFill>
-            <a:schemeClr val="tx1"/>
-          </a:solidFill>
+          <a:noFill/>
         </a:ln>
       </dgm:spPr>
       <dgm:t>
         <a:bodyPr/>
         <a:lstStyle/>
         <a:p>
-          <a:r>
-            <a:rPr lang="en-GB" dirty="0"/>
-            <a:t>Coding Submodule</a:t>
-          </a:r>
+          <a:endParaRPr lang="en-GB" dirty="0"/>
         </a:p>
       </dgm:t>
     </dgm:pt>
@@ -4812,13 +5563,336 @@
   <dgm:whole/>
   <dgm:extLst>
     <a:ext uri="http://schemas.microsoft.com/office/drawing/2008/diagram">
+      <dsp:dataModelExt xmlns:dsp="http://schemas.microsoft.com/office/drawing/2008/diagram" relId="rId13" minVer="http://schemas.openxmlformats.org/drawingml/2006/diagram"/>
+    </a:ext>
+  </dgm:extLst>
+</dgm:dataModel>
+</file>
+
+<file path=ppt/diagrams/data4.xml><?xml version="1.0" encoding="utf-8"?>
+<dgm:dataModel xmlns:dgm="http://schemas.openxmlformats.org/drawingml/2006/diagram" xmlns:a="http://schemas.openxmlformats.org/drawingml/2006/main">
+  <dgm:ptLst>
+    <dgm:pt modelId="{B2EC7707-988C-4C9E-B84A-9086DF1095B9}" type="doc">
+      <dgm:prSet loTypeId="urn:microsoft.com/office/officeart/2005/8/layout/radial6" loCatId="cycle" qsTypeId="urn:microsoft.com/office/officeart/2005/8/quickstyle/simple1" qsCatId="simple" csTypeId="urn:microsoft.com/office/officeart/2005/8/colors/accent1_2" csCatId="accent1" phldr="1"/>
+      <dgm:spPr/>
+      <dgm:t>
+        <a:bodyPr/>
+        <a:lstStyle/>
+        <a:p>
+          <a:endParaRPr lang="en-GB"/>
+        </a:p>
+      </dgm:t>
+    </dgm:pt>
+    <dgm:pt modelId="{1D6D459A-1E3D-46DA-8AD4-2C412A7F4CD6}">
+      <dgm:prSet phldrT="[Texto]" custT="1"/>
+      <dgm:spPr>
+        <a:solidFill>
+          <a:srgbClr val="C00000"/>
+        </a:solidFill>
+        <a:ln>
+          <a:solidFill>
+            <a:schemeClr val="tx1"/>
+          </a:solidFill>
+        </a:ln>
+      </dgm:spPr>
+      <dgm:t>
+        <a:bodyPr/>
+        <a:lstStyle/>
+        <a:p>
+          <a:r>
+            <a:rPr lang="en-GB" sz="2000"/>
+            <a:t>Network Coding Module</a:t>
+          </a:r>
+          <a:endParaRPr lang="en-GB" sz="2000" dirty="0"/>
+        </a:p>
+      </dgm:t>
+    </dgm:pt>
+    <dgm:pt modelId="{71770DD5-365C-4599-8C66-77715EEC1BAA}" type="parTrans" cxnId="{BEBA19A8-6690-42A1-818A-55792A1B27F0}">
+      <dgm:prSet/>
+      <dgm:spPr/>
+      <dgm:t>
+        <a:bodyPr/>
+        <a:lstStyle/>
+        <a:p>
+          <a:endParaRPr lang="en-GB"/>
+        </a:p>
+      </dgm:t>
+    </dgm:pt>
+    <dgm:pt modelId="{5A046299-D3B8-4C02-914B-17C508F8A18C}" type="sibTrans" cxnId="{BEBA19A8-6690-42A1-818A-55792A1B27F0}">
+      <dgm:prSet/>
+      <dgm:spPr/>
+      <dgm:t>
+        <a:bodyPr/>
+        <a:lstStyle/>
+        <a:p>
+          <a:endParaRPr lang="en-GB"/>
+        </a:p>
+      </dgm:t>
+    </dgm:pt>
+    <dgm:pt modelId="{BFF1B1AC-4CF1-4243-8CEC-85D2C53471B3}">
+      <dgm:prSet phldrT="[Texto]"/>
+      <dgm:spPr>
+        <a:solidFill>
+          <a:srgbClr val="C00000"/>
+        </a:solidFill>
+        <a:ln>
+          <a:solidFill>
+            <a:schemeClr val="tx1"/>
+          </a:solidFill>
+        </a:ln>
+      </dgm:spPr>
+      <dgm:t>
+        <a:bodyPr/>
+        <a:lstStyle/>
+        <a:p>
+          <a:r>
+            <a:rPr lang="en-GB" dirty="0"/>
+            <a:t>Coding Submodule</a:t>
+          </a:r>
+        </a:p>
+      </dgm:t>
+    </dgm:pt>
+    <dgm:pt modelId="{64D72D0E-3545-4832-9705-D8D0E45590F6}" type="parTrans" cxnId="{F6BB2FA2-E46B-4727-B6AC-7C243BC43E0C}">
+      <dgm:prSet/>
+      <dgm:spPr/>
+      <dgm:t>
+        <a:bodyPr/>
+        <a:lstStyle/>
+        <a:p>
+          <a:endParaRPr lang="en-GB"/>
+        </a:p>
+      </dgm:t>
+    </dgm:pt>
+    <dgm:pt modelId="{C7E66E3E-473B-453F-AF76-35ED62A4B78E}" type="sibTrans" cxnId="{F6BB2FA2-E46B-4727-B6AC-7C243BC43E0C}">
+      <dgm:prSet/>
+      <dgm:spPr>
+        <a:solidFill>
+          <a:schemeClr val="accent2">
+            <a:lumMod val="60000"/>
+            <a:lumOff val="40000"/>
+          </a:schemeClr>
+        </a:solidFill>
+        <a:ln>
+          <a:solidFill>
+            <a:schemeClr val="tx1"/>
+          </a:solidFill>
+        </a:ln>
+      </dgm:spPr>
+      <dgm:t>
+        <a:bodyPr/>
+        <a:lstStyle/>
+        <a:p>
+          <a:endParaRPr lang="en-GB"/>
+        </a:p>
+      </dgm:t>
+    </dgm:pt>
+    <dgm:pt modelId="{EDD2FCD7-4D48-44F5-8009-B8904EE0C404}">
+      <dgm:prSet phldrT="[Texto]"/>
+      <dgm:spPr>
+        <a:solidFill>
+          <a:srgbClr val="C00000">
+            <a:alpha val="0"/>
+          </a:srgbClr>
+        </a:solidFill>
+        <a:ln>
+          <a:noFill/>
+        </a:ln>
+      </dgm:spPr>
+      <dgm:t>
+        <a:bodyPr/>
+        <a:lstStyle/>
+        <a:p>
+          <a:endParaRPr lang="en-GB" dirty="0"/>
+        </a:p>
+      </dgm:t>
+    </dgm:pt>
+    <dgm:pt modelId="{2B922E2C-E423-4011-A937-101BC28BEA7A}" type="sibTrans" cxnId="{62B34AAB-DF74-468A-8954-393B9D7F0532}">
+      <dgm:prSet/>
+      <dgm:spPr>
+        <a:solidFill>
+          <a:schemeClr val="accent2">
+            <a:lumMod val="60000"/>
+            <a:lumOff val="40000"/>
+          </a:schemeClr>
+        </a:solidFill>
+        <a:ln>
+          <a:solidFill>
+            <a:schemeClr val="tx1"/>
+          </a:solidFill>
+        </a:ln>
+      </dgm:spPr>
+      <dgm:t>
+        <a:bodyPr/>
+        <a:lstStyle/>
+        <a:p>
+          <a:endParaRPr lang="en-GB"/>
+        </a:p>
+      </dgm:t>
+    </dgm:pt>
+    <dgm:pt modelId="{7D997FB0-65F6-4378-AEBA-D3BCD0DF47D3}" type="parTrans" cxnId="{62B34AAB-DF74-468A-8954-393B9D7F0532}">
+      <dgm:prSet/>
+      <dgm:spPr/>
+      <dgm:t>
+        <a:bodyPr/>
+        <a:lstStyle/>
+        <a:p>
+          <a:endParaRPr lang="en-GB"/>
+        </a:p>
+      </dgm:t>
+    </dgm:pt>
+    <dgm:pt modelId="{DEE4972F-F539-4686-A334-B3EFB5C401D5}">
+      <dgm:prSet phldrT="[Texto]" custT="1"/>
+      <dgm:spPr>
+        <a:solidFill>
+          <a:srgbClr val="C00000">
+            <a:alpha val="0"/>
+          </a:srgbClr>
+        </a:solidFill>
+        <a:ln>
+          <a:noFill/>
+        </a:ln>
+      </dgm:spPr>
+      <dgm:t>
+        <a:bodyPr/>
+        <a:lstStyle/>
+        <a:p>
+          <a:endParaRPr lang="en-GB" sz="2000" dirty="0"/>
+        </a:p>
+      </dgm:t>
+    </dgm:pt>
+    <dgm:pt modelId="{F8315F64-6249-44E5-9FBE-AC3A44DFC175}" type="sibTrans" cxnId="{76125BAE-7686-45E3-A47C-A091DEC14DC3}">
+      <dgm:prSet/>
+      <dgm:spPr>
+        <a:solidFill>
+          <a:schemeClr val="accent2">
+            <a:lumMod val="60000"/>
+            <a:lumOff val="40000"/>
+          </a:schemeClr>
+        </a:solidFill>
+        <a:ln>
+          <a:solidFill>
+            <a:schemeClr val="tx1"/>
+          </a:solidFill>
+        </a:ln>
+      </dgm:spPr>
+      <dgm:t>
+        <a:bodyPr/>
+        <a:lstStyle/>
+        <a:p>
+          <a:endParaRPr lang="en-GB"/>
+        </a:p>
+      </dgm:t>
+    </dgm:pt>
+    <dgm:pt modelId="{0BC4F143-9ECC-41B1-A07A-74CFAE68C7E7}" type="parTrans" cxnId="{76125BAE-7686-45E3-A47C-A091DEC14DC3}">
+      <dgm:prSet/>
+      <dgm:spPr/>
+      <dgm:t>
+        <a:bodyPr/>
+        <a:lstStyle/>
+        <a:p>
+          <a:endParaRPr lang="en-GB"/>
+        </a:p>
+      </dgm:t>
+    </dgm:pt>
+    <dgm:pt modelId="{69C9E4D5-3123-4CA9-8F5E-B88DF6F45F49}" type="pres">
+      <dgm:prSet presAssocID="{B2EC7707-988C-4C9E-B84A-9086DF1095B9}" presName="Name0" presStyleCnt="0">
+        <dgm:presLayoutVars>
+          <dgm:chMax val="1"/>
+          <dgm:dir/>
+          <dgm:animLvl val="ctr"/>
+          <dgm:resizeHandles val="exact"/>
+        </dgm:presLayoutVars>
+      </dgm:prSet>
+      <dgm:spPr/>
+    </dgm:pt>
+    <dgm:pt modelId="{0F08D026-CD8D-48C1-B7D5-DB95CC4FAC63}" type="pres">
+      <dgm:prSet presAssocID="{1D6D459A-1E3D-46DA-8AD4-2C412A7F4CD6}" presName="centerShape" presStyleLbl="node0" presStyleIdx="0" presStyleCnt="1"/>
+      <dgm:spPr/>
+    </dgm:pt>
+    <dgm:pt modelId="{9D7528A3-451E-4AA7-937C-F1EE94B3E1CB}" type="pres">
+      <dgm:prSet presAssocID="{DEE4972F-F539-4686-A334-B3EFB5C401D5}" presName="node" presStyleLbl="node1" presStyleIdx="0" presStyleCnt="3" custScaleX="125515" custScaleY="112291">
+        <dgm:presLayoutVars>
+          <dgm:bulletEnabled val="1"/>
+        </dgm:presLayoutVars>
+      </dgm:prSet>
+      <dgm:spPr/>
+    </dgm:pt>
+    <dgm:pt modelId="{BC98E3BF-BFD8-49A7-88D3-FC91C2D2E0E9}" type="pres">
+      <dgm:prSet presAssocID="{DEE4972F-F539-4686-A334-B3EFB5C401D5}" presName="dummy" presStyleCnt="0"/>
+      <dgm:spPr/>
+    </dgm:pt>
+    <dgm:pt modelId="{88342B3C-F0DE-4F8E-B1C1-EB6967ADCDDB}" type="pres">
+      <dgm:prSet presAssocID="{F8315F64-6249-44E5-9FBE-AC3A44DFC175}" presName="sibTrans" presStyleLbl="sibTrans2D1" presStyleIdx="0" presStyleCnt="3"/>
+      <dgm:spPr/>
+    </dgm:pt>
+    <dgm:pt modelId="{EFFB76CB-2E33-4F80-AB62-B6556D89ED8B}" type="pres">
+      <dgm:prSet presAssocID="{BFF1B1AC-4CF1-4243-8CEC-85D2C53471B3}" presName="node" presStyleLbl="node1" presStyleIdx="1" presStyleCnt="3" custScaleX="125515" custScaleY="112291">
+        <dgm:presLayoutVars>
+          <dgm:bulletEnabled val="1"/>
+        </dgm:presLayoutVars>
+      </dgm:prSet>
+      <dgm:spPr/>
+    </dgm:pt>
+    <dgm:pt modelId="{D18E4ECF-B1F1-4F30-9ABF-35AA9073E617}" type="pres">
+      <dgm:prSet presAssocID="{BFF1B1AC-4CF1-4243-8CEC-85D2C53471B3}" presName="dummy" presStyleCnt="0"/>
+      <dgm:spPr/>
+    </dgm:pt>
+    <dgm:pt modelId="{E9147838-34B6-4C77-B4A8-8EBC3A79364B}" type="pres">
+      <dgm:prSet presAssocID="{C7E66E3E-473B-453F-AF76-35ED62A4B78E}" presName="sibTrans" presStyleLbl="sibTrans2D1" presStyleIdx="1" presStyleCnt="3"/>
+      <dgm:spPr/>
+    </dgm:pt>
+    <dgm:pt modelId="{4483141A-A05F-4AFD-9286-A1344B210FB2}" type="pres">
+      <dgm:prSet presAssocID="{EDD2FCD7-4D48-44F5-8009-B8904EE0C404}" presName="node" presStyleLbl="node1" presStyleIdx="2" presStyleCnt="3" custScaleX="125515" custScaleY="112291">
+        <dgm:presLayoutVars>
+          <dgm:bulletEnabled val="1"/>
+        </dgm:presLayoutVars>
+      </dgm:prSet>
+      <dgm:spPr/>
+    </dgm:pt>
+    <dgm:pt modelId="{FB4BE392-031D-4C41-8802-882D0F343821}" type="pres">
+      <dgm:prSet presAssocID="{EDD2FCD7-4D48-44F5-8009-B8904EE0C404}" presName="dummy" presStyleCnt="0"/>
+      <dgm:spPr/>
+    </dgm:pt>
+    <dgm:pt modelId="{9C976933-F07A-4F16-B6B7-32332C29D7B6}" type="pres">
+      <dgm:prSet presAssocID="{2B922E2C-E423-4011-A937-101BC28BEA7A}" presName="sibTrans" presStyleLbl="sibTrans2D1" presStyleIdx="2" presStyleCnt="3"/>
+      <dgm:spPr/>
+    </dgm:pt>
+  </dgm:ptLst>
+  <dgm:cxnLst>
+    <dgm:cxn modelId="{CC23A502-AD6F-4614-8A3E-9C8D036EBEAA}" type="presOf" srcId="{B2EC7707-988C-4C9E-B84A-9086DF1095B9}" destId="{69C9E4D5-3123-4CA9-8F5E-B88DF6F45F49}" srcOrd="0" destOrd="0" presId="urn:microsoft.com/office/officeart/2005/8/layout/radial6"/>
+    <dgm:cxn modelId="{DBC6F003-CE13-43FC-9202-7E0B54C680F8}" type="presOf" srcId="{F8315F64-6249-44E5-9FBE-AC3A44DFC175}" destId="{88342B3C-F0DE-4F8E-B1C1-EB6967ADCDDB}" srcOrd="0" destOrd="0" presId="urn:microsoft.com/office/officeart/2005/8/layout/radial6"/>
+    <dgm:cxn modelId="{DC37E241-49F2-4562-835A-EBEA5504A722}" type="presOf" srcId="{2B922E2C-E423-4011-A937-101BC28BEA7A}" destId="{9C976933-F07A-4F16-B6B7-32332C29D7B6}" srcOrd="0" destOrd="0" presId="urn:microsoft.com/office/officeart/2005/8/layout/radial6"/>
+    <dgm:cxn modelId="{9E332E78-EC8A-4230-955D-EC3CD2A96F4B}" type="presOf" srcId="{EDD2FCD7-4D48-44F5-8009-B8904EE0C404}" destId="{4483141A-A05F-4AFD-9286-A1344B210FB2}" srcOrd="0" destOrd="0" presId="urn:microsoft.com/office/officeart/2005/8/layout/radial6"/>
+    <dgm:cxn modelId="{F6BB2FA2-E46B-4727-B6AC-7C243BC43E0C}" srcId="{1D6D459A-1E3D-46DA-8AD4-2C412A7F4CD6}" destId="{BFF1B1AC-4CF1-4243-8CEC-85D2C53471B3}" srcOrd="1" destOrd="0" parTransId="{64D72D0E-3545-4832-9705-D8D0E45590F6}" sibTransId="{C7E66E3E-473B-453F-AF76-35ED62A4B78E}"/>
+    <dgm:cxn modelId="{0A7FC7A3-8C49-4651-91D4-E142D33C7524}" type="presOf" srcId="{C7E66E3E-473B-453F-AF76-35ED62A4B78E}" destId="{E9147838-34B6-4C77-B4A8-8EBC3A79364B}" srcOrd="0" destOrd="0" presId="urn:microsoft.com/office/officeart/2005/8/layout/radial6"/>
+    <dgm:cxn modelId="{BEBA19A8-6690-42A1-818A-55792A1B27F0}" srcId="{B2EC7707-988C-4C9E-B84A-9086DF1095B9}" destId="{1D6D459A-1E3D-46DA-8AD4-2C412A7F4CD6}" srcOrd="0" destOrd="0" parTransId="{71770DD5-365C-4599-8C66-77715EEC1BAA}" sibTransId="{5A046299-D3B8-4C02-914B-17C508F8A18C}"/>
+    <dgm:cxn modelId="{62B34AAB-DF74-468A-8954-393B9D7F0532}" srcId="{1D6D459A-1E3D-46DA-8AD4-2C412A7F4CD6}" destId="{EDD2FCD7-4D48-44F5-8009-B8904EE0C404}" srcOrd="2" destOrd="0" parTransId="{7D997FB0-65F6-4378-AEBA-D3BCD0DF47D3}" sibTransId="{2B922E2C-E423-4011-A937-101BC28BEA7A}"/>
+    <dgm:cxn modelId="{76125BAE-7686-45E3-A47C-A091DEC14DC3}" srcId="{1D6D459A-1E3D-46DA-8AD4-2C412A7F4CD6}" destId="{DEE4972F-F539-4686-A334-B3EFB5C401D5}" srcOrd="0" destOrd="0" parTransId="{0BC4F143-9ECC-41B1-A07A-74CFAE68C7E7}" sibTransId="{F8315F64-6249-44E5-9FBE-AC3A44DFC175}"/>
+    <dgm:cxn modelId="{27C09FD8-7A4E-4512-ACCF-618DA8E2D150}" type="presOf" srcId="{1D6D459A-1E3D-46DA-8AD4-2C412A7F4CD6}" destId="{0F08D026-CD8D-48C1-B7D5-DB95CC4FAC63}" srcOrd="0" destOrd="0" presId="urn:microsoft.com/office/officeart/2005/8/layout/radial6"/>
+    <dgm:cxn modelId="{A25150E5-282F-4B53-8BAC-4998A0ACA2FF}" type="presOf" srcId="{BFF1B1AC-4CF1-4243-8CEC-85D2C53471B3}" destId="{EFFB76CB-2E33-4F80-AB62-B6556D89ED8B}" srcOrd="0" destOrd="0" presId="urn:microsoft.com/office/officeart/2005/8/layout/radial6"/>
+    <dgm:cxn modelId="{56C323F9-1345-4387-B554-E5ACCD41A265}" type="presOf" srcId="{DEE4972F-F539-4686-A334-B3EFB5C401D5}" destId="{9D7528A3-451E-4AA7-937C-F1EE94B3E1CB}" srcOrd="0" destOrd="0" presId="urn:microsoft.com/office/officeart/2005/8/layout/radial6"/>
+    <dgm:cxn modelId="{5FD453A8-C1EF-478D-9A46-E3FEBCB09A49}" type="presParOf" srcId="{69C9E4D5-3123-4CA9-8F5E-B88DF6F45F49}" destId="{0F08D026-CD8D-48C1-B7D5-DB95CC4FAC63}" srcOrd="0" destOrd="0" presId="urn:microsoft.com/office/officeart/2005/8/layout/radial6"/>
+    <dgm:cxn modelId="{D2125E9C-8A03-47A3-8A04-220528B67777}" type="presParOf" srcId="{69C9E4D5-3123-4CA9-8F5E-B88DF6F45F49}" destId="{9D7528A3-451E-4AA7-937C-F1EE94B3E1CB}" srcOrd="1" destOrd="0" presId="urn:microsoft.com/office/officeart/2005/8/layout/radial6"/>
+    <dgm:cxn modelId="{5B9316EB-D497-48D4-8363-D0D55C9E8523}" type="presParOf" srcId="{69C9E4D5-3123-4CA9-8F5E-B88DF6F45F49}" destId="{BC98E3BF-BFD8-49A7-88D3-FC91C2D2E0E9}" srcOrd="2" destOrd="0" presId="urn:microsoft.com/office/officeart/2005/8/layout/radial6"/>
+    <dgm:cxn modelId="{CD71CE3E-EAEA-418E-8E57-B516A485058C}" type="presParOf" srcId="{69C9E4D5-3123-4CA9-8F5E-B88DF6F45F49}" destId="{88342B3C-F0DE-4F8E-B1C1-EB6967ADCDDB}" srcOrd="3" destOrd="0" presId="urn:microsoft.com/office/officeart/2005/8/layout/radial6"/>
+    <dgm:cxn modelId="{84AB7FCA-14E7-46AE-8B72-50ED211FF869}" type="presParOf" srcId="{69C9E4D5-3123-4CA9-8F5E-B88DF6F45F49}" destId="{EFFB76CB-2E33-4F80-AB62-B6556D89ED8B}" srcOrd="4" destOrd="0" presId="urn:microsoft.com/office/officeart/2005/8/layout/radial6"/>
+    <dgm:cxn modelId="{E0E26679-65C4-4C43-933D-8B36C7D617EB}" type="presParOf" srcId="{69C9E4D5-3123-4CA9-8F5E-B88DF6F45F49}" destId="{D18E4ECF-B1F1-4F30-9ABF-35AA9073E617}" srcOrd="5" destOrd="0" presId="urn:microsoft.com/office/officeart/2005/8/layout/radial6"/>
+    <dgm:cxn modelId="{DAF39707-F709-459E-A959-F9A1A96D545D}" type="presParOf" srcId="{69C9E4D5-3123-4CA9-8F5E-B88DF6F45F49}" destId="{E9147838-34B6-4C77-B4A8-8EBC3A79364B}" srcOrd="6" destOrd="0" presId="urn:microsoft.com/office/officeart/2005/8/layout/radial6"/>
+    <dgm:cxn modelId="{F65CA773-627C-48B1-8BD5-7285C2C6C1EB}" type="presParOf" srcId="{69C9E4D5-3123-4CA9-8F5E-B88DF6F45F49}" destId="{4483141A-A05F-4AFD-9286-A1344B210FB2}" srcOrd="7" destOrd="0" presId="urn:microsoft.com/office/officeart/2005/8/layout/radial6"/>
+    <dgm:cxn modelId="{CD918D76-8AF8-4601-9B96-B3CB82EBDC1D}" type="presParOf" srcId="{69C9E4D5-3123-4CA9-8F5E-B88DF6F45F49}" destId="{FB4BE392-031D-4C41-8802-882D0F343821}" srcOrd="8" destOrd="0" presId="urn:microsoft.com/office/officeart/2005/8/layout/radial6"/>
+    <dgm:cxn modelId="{925DFC5D-C4BE-43F8-AF07-EA5912A7C586}" type="presParOf" srcId="{69C9E4D5-3123-4CA9-8F5E-B88DF6F45F49}" destId="{9C976933-F07A-4F16-B6B7-32332C29D7B6}" srcOrd="9" destOrd="0" presId="urn:microsoft.com/office/officeart/2005/8/layout/radial6"/>
+  </dgm:cxnLst>
+  <dgm:bg/>
+  <dgm:whole/>
+  <dgm:extLst>
+    <a:ext uri="http://schemas.microsoft.com/office/drawing/2008/diagram">
       <dsp:dataModelExt xmlns:dsp="http://schemas.microsoft.com/office/drawing/2008/diagram" relId="rId6" minVer="http://schemas.openxmlformats.org/drawingml/2006/diagram"/>
     </a:ext>
   </dgm:extLst>
 </dgm:dataModel>
 </file>
 
-<file path=ppt/diagrams/data4.xml><?xml version="1.0" encoding="utf-8"?>
+<file path=ppt/diagrams/data5.xml><?xml version="1.0" encoding="utf-8"?>
 <dgm:dataModel xmlns:dgm="http://schemas.openxmlformats.org/drawingml/2006/diagram" xmlns:a="http://schemas.openxmlformats.org/drawingml/2006/main">
   <dgm:ptLst>
     <dgm:pt modelId="{B2EC7707-988C-4C9E-B84A-9086DF1095B9}" type="doc">
@@ -5140,7 +6214,7 @@
 </dgm:dataModel>
 </file>
 
-<file path=ppt/diagrams/data5.xml><?xml version="1.0" encoding="utf-8"?>
+<file path=ppt/diagrams/data6.xml><?xml version="1.0" encoding="utf-8"?>
 <dgm:dataModel xmlns:dgm="http://schemas.openxmlformats.org/drawingml/2006/diagram" xmlns:a="http://schemas.openxmlformats.org/drawingml/2006/main">
   <dgm:ptLst>
     <dgm:pt modelId="{B2EC7707-988C-4C9E-B84A-9086DF1095B9}" type="doc">
@@ -6579,6 +7653,417 @@
           <a:avLst/>
         </a:prstGeom>
         <a:solidFill>
+          <a:srgbClr val="C00000">
+            <a:alpha val="0"/>
+          </a:srgbClr>
+        </a:solidFill>
+        <a:ln w="12700" cap="flat" cmpd="sng" algn="ctr">
+          <a:noFill/>
+          <a:prstDash val="solid"/>
+          <a:miter lim="800000"/>
+        </a:ln>
+        <a:effectLst/>
+      </dsp:spPr>
+      <dsp:style>
+        <a:lnRef idx="2">
+          <a:scrgbClr r="0" g="0" b="0"/>
+        </a:lnRef>
+        <a:fillRef idx="1">
+          <a:scrgbClr r="0" g="0" b="0"/>
+        </a:fillRef>
+        <a:effectRef idx="0">
+          <a:scrgbClr r="0" g="0" b="0"/>
+        </a:effectRef>
+        <a:fontRef idx="minor">
+          <a:schemeClr val="lt1"/>
+        </a:fontRef>
+      </dsp:style>
+      <dsp:txBody>
+        <a:bodyPr spcFirstLastPara="0" vert="horz" wrap="square" lIns="64770" tIns="64770" rIns="64770" bIns="64770" numCol="1" spcCol="1270" anchor="ctr" anchorCtr="0">
+          <a:noAutofit/>
+        </a:bodyPr>
+        <a:lstStyle/>
+        <a:p>
+          <a:pPr marL="0" lvl="0" indent="0" algn="ctr" defTabSz="2266950">
+            <a:lnSpc>
+              <a:spcPct val="90000"/>
+            </a:lnSpc>
+            <a:spcBef>
+              <a:spcPct val="0"/>
+            </a:spcBef>
+            <a:spcAft>
+              <a:spcPct val="35000"/>
+            </a:spcAft>
+            <a:buNone/>
+          </a:pPr>
+          <a:endParaRPr lang="en-GB" sz="5100" kern="1200" dirty="0"/>
+        </a:p>
+      </dsp:txBody>
+      <dsp:txXfrm>
+        <a:off x="3875440" y="2958518"/>
+        <a:ext cx="1090435" cy="975550"/>
+      </dsp:txXfrm>
+    </dsp:sp>
+    <dsp:sp modelId="{4483141A-A05F-4AFD-9286-A1344B210FB2}">
+      <dsp:nvSpPr>
+        <dsp:cNvPr id="0" name=""/>
+        <dsp:cNvSpPr/>
+      </dsp:nvSpPr>
+      <dsp:spPr>
+        <a:xfrm>
+          <a:off x="424862" y="2756475"/>
+          <a:ext cx="1542109" cy="1379636"/>
+        </a:xfrm>
+        <a:prstGeom prst="ellipse">
+          <a:avLst/>
+        </a:prstGeom>
+        <a:solidFill>
+          <a:srgbClr val="C00000">
+            <a:alpha val="0"/>
+          </a:srgbClr>
+        </a:solidFill>
+        <a:ln w="12700" cap="flat" cmpd="sng" algn="ctr">
+          <a:noFill/>
+          <a:prstDash val="solid"/>
+          <a:miter lim="800000"/>
+        </a:ln>
+        <a:effectLst/>
+      </dsp:spPr>
+      <dsp:style>
+        <a:lnRef idx="2">
+          <a:scrgbClr r="0" g="0" b="0"/>
+        </a:lnRef>
+        <a:fillRef idx="1">
+          <a:scrgbClr r="0" g="0" b="0"/>
+        </a:fillRef>
+        <a:effectRef idx="0">
+          <a:scrgbClr r="0" g="0" b="0"/>
+        </a:effectRef>
+        <a:fontRef idx="minor">
+          <a:schemeClr val="lt1"/>
+        </a:fontRef>
+      </dsp:style>
+      <dsp:txBody>
+        <a:bodyPr spcFirstLastPara="0" vert="horz" wrap="square" lIns="64770" tIns="64770" rIns="64770" bIns="64770" numCol="1" spcCol="1270" anchor="ctr" anchorCtr="0">
+          <a:noAutofit/>
+        </a:bodyPr>
+        <a:lstStyle/>
+        <a:p>
+          <a:pPr marL="0" lvl="0" indent="0" algn="ctr" defTabSz="2266950">
+            <a:lnSpc>
+              <a:spcPct val="90000"/>
+            </a:lnSpc>
+            <a:spcBef>
+              <a:spcPct val="0"/>
+            </a:spcBef>
+            <a:spcAft>
+              <a:spcPct val="35000"/>
+            </a:spcAft>
+            <a:buNone/>
+          </a:pPr>
+          <a:endParaRPr lang="en-GB" sz="5100" kern="1200" dirty="0"/>
+        </a:p>
+      </dsp:txBody>
+      <dsp:txXfrm>
+        <a:off x="650699" y="2958518"/>
+        <a:ext cx="1090435" cy="975550"/>
+      </dsp:txXfrm>
+    </dsp:sp>
+  </dsp:spTree>
+</dsp:drawing>
+</file>
+
+<file path=ppt/diagrams/drawing4.xml><?xml version="1.0" encoding="utf-8"?>
+<dsp:drawing xmlns:dgm="http://schemas.openxmlformats.org/drawingml/2006/diagram" xmlns:dsp="http://schemas.microsoft.com/office/drawing/2008/diagram" xmlns:a="http://schemas.openxmlformats.org/drawingml/2006/main">
+  <dsp:spTree>
+    <dsp:nvGrpSpPr>
+      <dsp:cNvPr id="0" name=""/>
+      <dsp:cNvGrpSpPr/>
+    </dsp:nvGrpSpPr>
+    <dsp:grpSpPr/>
+    <dsp:sp modelId="{9C976933-F07A-4F16-B6B7-32332C29D7B6}">
+      <dsp:nvSpPr>
+        <dsp:cNvPr id="0" name=""/>
+        <dsp:cNvSpPr/>
+      </dsp:nvSpPr>
+      <dsp:spPr>
+        <a:xfrm>
+          <a:off x="902251" y="609355"/>
+          <a:ext cx="3812071" cy="3812071"/>
+        </a:xfrm>
+        <a:prstGeom prst="blockArc">
+          <a:avLst>
+            <a:gd name="adj1" fmla="val 9000000"/>
+            <a:gd name="adj2" fmla="val 16200000"/>
+            <a:gd name="adj3" fmla="val 4641"/>
+          </a:avLst>
+        </a:prstGeom>
+        <a:solidFill>
+          <a:schemeClr val="accent2">
+            <a:lumMod val="60000"/>
+            <a:lumOff val="40000"/>
+          </a:schemeClr>
+        </a:solidFill>
+        <a:ln>
+          <a:solidFill>
+            <a:schemeClr val="tx1"/>
+          </a:solidFill>
+        </a:ln>
+        <a:effectLst/>
+      </dsp:spPr>
+      <dsp:style>
+        <a:lnRef idx="0">
+          <a:scrgbClr r="0" g="0" b="0"/>
+        </a:lnRef>
+        <a:fillRef idx="1">
+          <a:scrgbClr r="0" g="0" b="0"/>
+        </a:fillRef>
+        <a:effectRef idx="0">
+          <a:scrgbClr r="0" g="0" b="0"/>
+        </a:effectRef>
+        <a:fontRef idx="minor">
+          <a:schemeClr val="lt1"/>
+        </a:fontRef>
+      </dsp:style>
+    </dsp:sp>
+    <dsp:sp modelId="{E9147838-34B6-4C77-B4A8-8EBC3A79364B}">
+      <dsp:nvSpPr>
+        <dsp:cNvPr id="0" name=""/>
+        <dsp:cNvSpPr/>
+      </dsp:nvSpPr>
+      <dsp:spPr>
+        <a:xfrm>
+          <a:off x="902251" y="609355"/>
+          <a:ext cx="3812071" cy="3812071"/>
+        </a:xfrm>
+        <a:prstGeom prst="blockArc">
+          <a:avLst>
+            <a:gd name="adj1" fmla="val 1800000"/>
+            <a:gd name="adj2" fmla="val 9000000"/>
+            <a:gd name="adj3" fmla="val 4641"/>
+          </a:avLst>
+        </a:prstGeom>
+        <a:solidFill>
+          <a:schemeClr val="accent2">
+            <a:lumMod val="60000"/>
+            <a:lumOff val="40000"/>
+          </a:schemeClr>
+        </a:solidFill>
+        <a:ln>
+          <a:solidFill>
+            <a:schemeClr val="tx1"/>
+          </a:solidFill>
+        </a:ln>
+        <a:effectLst/>
+      </dsp:spPr>
+      <dsp:style>
+        <a:lnRef idx="0">
+          <a:scrgbClr r="0" g="0" b="0"/>
+        </a:lnRef>
+        <a:fillRef idx="1">
+          <a:scrgbClr r="0" g="0" b="0"/>
+        </a:fillRef>
+        <a:effectRef idx="0">
+          <a:scrgbClr r="0" g="0" b="0"/>
+        </a:effectRef>
+        <a:fontRef idx="minor">
+          <a:schemeClr val="lt1"/>
+        </a:fontRef>
+      </dsp:style>
+    </dsp:sp>
+    <dsp:sp modelId="{88342B3C-F0DE-4F8E-B1C1-EB6967ADCDDB}">
+      <dsp:nvSpPr>
+        <dsp:cNvPr id="0" name=""/>
+        <dsp:cNvSpPr/>
+      </dsp:nvSpPr>
+      <dsp:spPr>
+        <a:xfrm>
+          <a:off x="902251" y="609355"/>
+          <a:ext cx="3812071" cy="3812071"/>
+        </a:xfrm>
+        <a:prstGeom prst="blockArc">
+          <a:avLst>
+            <a:gd name="adj1" fmla="val 16200000"/>
+            <a:gd name="adj2" fmla="val 1800000"/>
+            <a:gd name="adj3" fmla="val 4641"/>
+          </a:avLst>
+        </a:prstGeom>
+        <a:solidFill>
+          <a:schemeClr val="accent2">
+            <a:lumMod val="60000"/>
+            <a:lumOff val="40000"/>
+          </a:schemeClr>
+        </a:solidFill>
+        <a:ln>
+          <a:solidFill>
+            <a:schemeClr val="tx1"/>
+          </a:solidFill>
+        </a:ln>
+        <a:effectLst/>
+      </dsp:spPr>
+      <dsp:style>
+        <a:lnRef idx="0">
+          <a:scrgbClr r="0" g="0" b="0"/>
+        </a:lnRef>
+        <a:fillRef idx="1">
+          <a:scrgbClr r="0" g="0" b="0"/>
+        </a:fillRef>
+        <a:effectRef idx="0">
+          <a:scrgbClr r="0" g="0" b="0"/>
+        </a:effectRef>
+        <a:fontRef idx="minor">
+          <a:schemeClr val="lt1"/>
+        </a:fontRef>
+      </dsp:style>
+    </dsp:sp>
+    <dsp:sp modelId="{0F08D026-CD8D-48C1-B7D5-DB95CC4FAC63}">
+      <dsp:nvSpPr>
+        <dsp:cNvPr id="0" name=""/>
+        <dsp:cNvSpPr/>
+      </dsp:nvSpPr>
+      <dsp:spPr>
+        <a:xfrm>
+          <a:off x="1930697" y="1637801"/>
+          <a:ext cx="1755179" cy="1755179"/>
+        </a:xfrm>
+        <a:prstGeom prst="ellipse">
+          <a:avLst/>
+        </a:prstGeom>
+        <a:solidFill>
+          <a:srgbClr val="C00000"/>
+        </a:solidFill>
+        <a:ln w="12700" cap="flat" cmpd="sng" algn="ctr">
+          <a:solidFill>
+            <a:schemeClr val="tx1"/>
+          </a:solidFill>
+          <a:prstDash val="solid"/>
+          <a:miter lim="800000"/>
+        </a:ln>
+        <a:effectLst/>
+      </dsp:spPr>
+      <dsp:style>
+        <a:lnRef idx="2">
+          <a:scrgbClr r="0" g="0" b="0"/>
+        </a:lnRef>
+        <a:fillRef idx="1">
+          <a:scrgbClr r="0" g="0" b="0"/>
+        </a:fillRef>
+        <a:effectRef idx="0">
+          <a:scrgbClr r="0" g="0" b="0"/>
+        </a:effectRef>
+        <a:fontRef idx="minor">
+          <a:schemeClr val="lt1"/>
+        </a:fontRef>
+      </dsp:style>
+      <dsp:txBody>
+        <a:bodyPr spcFirstLastPara="0" vert="horz" wrap="square" lIns="25400" tIns="25400" rIns="25400" bIns="25400" numCol="1" spcCol="1270" anchor="ctr" anchorCtr="0">
+          <a:noAutofit/>
+        </a:bodyPr>
+        <a:lstStyle/>
+        <a:p>
+          <a:pPr marL="0" lvl="0" indent="0" algn="ctr" defTabSz="889000">
+            <a:lnSpc>
+              <a:spcPct val="90000"/>
+            </a:lnSpc>
+            <a:spcBef>
+              <a:spcPct val="0"/>
+            </a:spcBef>
+            <a:spcAft>
+              <a:spcPct val="35000"/>
+            </a:spcAft>
+            <a:buNone/>
+          </a:pPr>
+          <a:r>
+            <a:rPr lang="en-GB" sz="2000" kern="1200"/>
+            <a:t>Network Coding Module</a:t>
+          </a:r>
+          <a:endParaRPr lang="en-GB" sz="2000" kern="1200" dirty="0"/>
+        </a:p>
+      </dsp:txBody>
+      <dsp:txXfrm>
+        <a:off x="2187737" y="1894841"/>
+        <a:ext cx="1241099" cy="1241099"/>
+      </dsp:txXfrm>
+    </dsp:sp>
+    <dsp:sp modelId="{9D7528A3-451E-4AA7-937C-F1EE94B3E1CB}">
+      <dsp:nvSpPr>
+        <dsp:cNvPr id="0" name=""/>
+        <dsp:cNvSpPr/>
+      </dsp:nvSpPr>
+      <dsp:spPr>
+        <a:xfrm>
+          <a:off x="2037232" y="-36232"/>
+          <a:ext cx="1542109" cy="1379636"/>
+        </a:xfrm>
+        <a:prstGeom prst="ellipse">
+          <a:avLst/>
+        </a:prstGeom>
+        <a:solidFill>
+          <a:srgbClr val="C00000">
+            <a:alpha val="0"/>
+          </a:srgbClr>
+        </a:solidFill>
+        <a:ln w="12700" cap="flat" cmpd="sng" algn="ctr">
+          <a:noFill/>
+          <a:prstDash val="solid"/>
+          <a:miter lim="800000"/>
+        </a:ln>
+        <a:effectLst/>
+      </dsp:spPr>
+      <dsp:style>
+        <a:lnRef idx="2">
+          <a:scrgbClr r="0" g="0" b="0"/>
+        </a:lnRef>
+        <a:fillRef idx="1">
+          <a:scrgbClr r="0" g="0" b="0"/>
+        </a:fillRef>
+        <a:effectRef idx="0">
+          <a:scrgbClr r="0" g="0" b="0"/>
+        </a:effectRef>
+        <a:fontRef idx="minor">
+          <a:schemeClr val="lt1"/>
+        </a:fontRef>
+      </dsp:style>
+      <dsp:txBody>
+        <a:bodyPr spcFirstLastPara="0" vert="horz" wrap="square" lIns="25400" tIns="25400" rIns="25400" bIns="25400" numCol="1" spcCol="1270" anchor="ctr" anchorCtr="0">
+          <a:noAutofit/>
+        </a:bodyPr>
+        <a:lstStyle/>
+        <a:p>
+          <a:pPr marL="0" lvl="0" indent="0" algn="ctr" defTabSz="889000">
+            <a:lnSpc>
+              <a:spcPct val="90000"/>
+            </a:lnSpc>
+            <a:spcBef>
+              <a:spcPct val="0"/>
+            </a:spcBef>
+            <a:spcAft>
+              <a:spcPct val="35000"/>
+            </a:spcAft>
+            <a:buNone/>
+          </a:pPr>
+          <a:endParaRPr lang="en-GB" sz="2000" kern="1200" dirty="0"/>
+        </a:p>
+      </dsp:txBody>
+      <dsp:txXfrm>
+        <a:off x="2263069" y="165811"/>
+        <a:ext cx="1090435" cy="975550"/>
+      </dsp:txXfrm>
+    </dsp:sp>
+    <dsp:sp modelId="{EFFB76CB-2E33-4F80-AB62-B6556D89ED8B}">
+      <dsp:nvSpPr>
+        <dsp:cNvPr id="0" name=""/>
+        <dsp:cNvSpPr/>
+      </dsp:nvSpPr>
+      <dsp:spPr>
+        <a:xfrm>
+          <a:off x="3649603" y="2756475"/>
+          <a:ext cx="1542109" cy="1379636"/>
+        </a:xfrm>
+        <a:prstGeom prst="ellipse">
+          <a:avLst/>
+        </a:prstGeom>
+        <a:solidFill>
           <a:srgbClr val="C00000"/>
         </a:solidFill>
         <a:ln w="12700" cap="flat" cmpd="sng" algn="ctr">
@@ -6702,7 +8187,7 @@
 </dsp:drawing>
 </file>
 
-<file path=ppt/diagrams/drawing4.xml><?xml version="1.0" encoding="utf-8"?>
+<file path=ppt/diagrams/drawing5.xml><?xml version="1.0" encoding="utf-8"?>
 <dsp:drawing xmlns:dgm="http://schemas.openxmlformats.org/drawingml/2006/diagram" xmlns:dsp="http://schemas.microsoft.com/office/drawing/2008/diagram" xmlns:a="http://schemas.openxmlformats.org/drawingml/2006/main">
   <dsp:spTree>
     <dsp:nvGrpSpPr>
@@ -7115,7 +8600,7 @@
 </dsp:drawing>
 </file>
 
-<file path=ppt/diagrams/drawing5.xml><?xml version="1.0" encoding="utf-8"?>
+<file path=ppt/diagrams/drawing6.xml><?xml version="1.0" encoding="utf-8"?>
 <dsp:drawing xmlns:dgm="http://schemas.openxmlformats.org/drawingml/2006/diagram" xmlns:dsp="http://schemas.microsoft.com/office/drawing/2008/diagram" xmlns:a="http://schemas.openxmlformats.org/drawingml/2006/main">
   <dsp:spTree>
     <dsp:nvGrpSpPr>
@@ -9561,6 +11046,413 @@
 </dgm:layoutDef>
 </file>
 
+<file path=ppt/diagrams/layout6.xml><?xml version="1.0" encoding="utf-8"?>
+<dgm:layoutDef xmlns:dgm="http://schemas.openxmlformats.org/drawingml/2006/diagram" xmlns:a="http://schemas.openxmlformats.org/drawingml/2006/main" uniqueId="urn:microsoft.com/office/officeart/2005/8/layout/radial6">
+  <dgm:title val=""/>
+  <dgm:desc val=""/>
+  <dgm:catLst>
+    <dgm:cat type="cycle" pri="9000"/>
+    <dgm:cat type="relationship" pri="21000"/>
+  </dgm:catLst>
+  <dgm:sampData>
+    <dgm:dataModel>
+      <dgm:ptLst>
+        <dgm:pt modelId="0" type="doc"/>
+        <dgm:pt modelId="1">
+          <dgm:prSet phldr="1"/>
+        </dgm:pt>
+        <dgm:pt modelId="11">
+          <dgm:prSet phldr="1"/>
+        </dgm:pt>
+        <dgm:pt modelId="12">
+          <dgm:prSet phldr="1"/>
+        </dgm:pt>
+        <dgm:pt modelId="13">
+          <dgm:prSet phldr="1"/>
+        </dgm:pt>
+        <dgm:pt modelId="14">
+          <dgm:prSet phldr="1"/>
+        </dgm:pt>
+      </dgm:ptLst>
+      <dgm:cxnLst>
+        <dgm:cxn modelId="2" srcId="0" destId="1" srcOrd="0" destOrd="0"/>
+        <dgm:cxn modelId="3" srcId="1" destId="11" srcOrd="0" destOrd="0"/>
+        <dgm:cxn modelId="4" srcId="1" destId="12" srcOrd="1" destOrd="0"/>
+        <dgm:cxn modelId="5" srcId="1" destId="13" srcOrd="2" destOrd="0"/>
+        <dgm:cxn modelId="6" srcId="1" destId="14" srcOrd="3" destOrd="0"/>
+      </dgm:cxnLst>
+      <dgm:bg/>
+      <dgm:whole/>
+    </dgm:dataModel>
+  </dgm:sampData>
+  <dgm:styleData>
+    <dgm:dataModel>
+      <dgm:ptLst>
+        <dgm:pt modelId="0" type="doc"/>
+        <dgm:pt modelId="1"/>
+        <dgm:pt modelId="11"/>
+        <dgm:pt modelId="12"/>
+        <dgm:pt modelId="13"/>
+      </dgm:ptLst>
+      <dgm:cxnLst>
+        <dgm:cxn modelId="2" srcId="0" destId="1" srcOrd="0" destOrd="0"/>
+        <dgm:cxn modelId="15" srcId="1" destId="11" srcOrd="0" destOrd="0"/>
+        <dgm:cxn modelId="16" srcId="1" destId="12" srcOrd="1" destOrd="0"/>
+        <dgm:cxn modelId="17" srcId="1" destId="13" srcOrd="2" destOrd="0"/>
+      </dgm:cxnLst>
+      <dgm:bg/>
+      <dgm:whole/>
+    </dgm:dataModel>
+  </dgm:styleData>
+  <dgm:clrData>
+    <dgm:dataModel>
+      <dgm:ptLst>
+        <dgm:pt modelId="0" type="doc"/>
+        <dgm:pt modelId="1"/>
+        <dgm:pt modelId="11"/>
+        <dgm:pt modelId="12"/>
+        <dgm:pt modelId="13"/>
+        <dgm:pt modelId="14"/>
+        <dgm:pt modelId="15"/>
+        <dgm:pt modelId="16"/>
+      </dgm:ptLst>
+      <dgm:cxnLst>
+        <dgm:cxn modelId="2" srcId="0" destId="1" srcOrd="0" destOrd="0"/>
+        <dgm:cxn modelId="16" srcId="1" destId="11" srcOrd="0" destOrd="0"/>
+        <dgm:cxn modelId="17" srcId="1" destId="12" srcOrd="1" destOrd="0"/>
+        <dgm:cxn modelId="18" srcId="1" destId="13" srcOrd="2" destOrd="0"/>
+        <dgm:cxn modelId="19" srcId="1" destId="14" srcOrd="3" destOrd="0"/>
+        <dgm:cxn modelId="20" srcId="1" destId="15" srcOrd="4" destOrd="0"/>
+        <dgm:cxn modelId="21" srcId="1" destId="16" srcOrd="5" destOrd="0"/>
+      </dgm:cxnLst>
+      <dgm:bg/>
+      <dgm:whole/>
+    </dgm:dataModel>
+  </dgm:clrData>
+  <dgm:layoutNode name="Name0">
+    <dgm:varLst>
+      <dgm:chMax val="1"/>
+      <dgm:dir/>
+      <dgm:animLvl val="ctr"/>
+      <dgm:resizeHandles val="exact"/>
+    </dgm:varLst>
+    <dgm:choose name="Name1">
+      <dgm:if name="Name2" func="var" arg="dir" op="equ" val="norm">
+        <dgm:choose name="Name3">
+          <dgm:if name="Name4" axis="ch ch" ptType="node node" st="1 1" cnt="1 0" func="cnt" op="lte" val="1">
+            <dgm:alg type="cycle">
+              <dgm:param type="stAng" val="90"/>
+              <dgm:param type="spanAng" val="360"/>
+              <dgm:param type="ctrShpMap" val="fNode"/>
+            </dgm:alg>
+          </dgm:if>
+          <dgm:else name="Name5">
+            <dgm:alg type="cycle">
+              <dgm:param type="stAng" val="0"/>
+              <dgm:param type="spanAng" val="360"/>
+              <dgm:param type="ctrShpMap" val="fNode"/>
+            </dgm:alg>
+          </dgm:else>
+        </dgm:choose>
+      </dgm:if>
+      <dgm:else name="Name6">
+        <dgm:choose name="Name7">
+          <dgm:if name="Name8" axis="ch ch" ptType="node node" st="1 1" cnt="1 0" func="cnt" op="lte" val="1">
+            <dgm:alg type="cycle">
+              <dgm:param type="stAng" val="-90"/>
+              <dgm:param type="spanAng" val="360"/>
+              <dgm:param type="ctrShpMap" val="fNode"/>
+            </dgm:alg>
+          </dgm:if>
+          <dgm:else name="Name9">
+            <dgm:alg type="cycle">
+              <dgm:param type="stAng" val="0"/>
+              <dgm:param type="spanAng" val="-360"/>
+              <dgm:param type="ctrShpMap" val="fNode"/>
+            </dgm:alg>
+          </dgm:else>
+        </dgm:choose>
+      </dgm:else>
+    </dgm:choose>
+    <dgm:shape xmlns:r="http://schemas.openxmlformats.org/officeDocument/2006/relationships" r:blip="">
+      <dgm:adjLst/>
+    </dgm:shape>
+    <dgm:presOf/>
+    <dgm:choose name="Name10">
+      <dgm:if name="Name11" func="var" arg="dir" op="equ" val="norm">
+        <dgm:choose name="Name12">
+          <dgm:if name="Name13" axis="ch ch" ptType="node node" st="1 1" cnt="1 0" func="cnt" op="equ" val="1">
+            <dgm:constrLst>
+              <dgm:constr type="diam" val="170"/>
+              <dgm:constr type="w" for="ch" forName="centerShape" refType="w"/>
+              <dgm:constr type="w" for="ch" forName="oneComp" refType="w" refFor="ch" refForName="centerShape" op="equ" fact="0.7"/>
+              <dgm:constr type="sp" refType="w" refFor="ch" refForName="oneComp" fact="0.3"/>
+              <dgm:constr type="sibSp" refType="w" refFor="ch" refForName="oneComp" fact="0.3"/>
+              <dgm:constr type="primFontSz" for="ch" forName="centerShape" val="65"/>
+              <dgm:constr type="primFontSz" for="des" forName="oneNode" refType="primFontSz" refFor="ch" refForName="centerShape" fact="0.95"/>
+              <dgm:constr type="primFontSz" for="des" forName="oneNode" refType="primFontSz" refFor="ch" refForName="centerShape" op="lte" fact="0.95"/>
+              <dgm:constr type="diam" for="ch" forName="singleconn" refType="diam" op="equ" fact="-1"/>
+              <dgm:constr type="h" for="ch" forName="singleconn" refType="w" refFor="ch" refForName="oneComp" fact="0.24"/>
+              <dgm:constr type="w" for="ch" forName="dummya" refType="w" refFor="ch" refForName="oneComp" op="equ"/>
+              <dgm:constr type="w" for="ch" forName="dummyb" refType="w" refFor="ch" refForName="oneComp" op="equ"/>
+              <dgm:constr type="w" for="ch" forName="dummyc" refType="w" refFor="ch" refForName="oneComp" op="equ"/>
+            </dgm:constrLst>
+          </dgm:if>
+          <dgm:else name="Name14">
+            <dgm:constrLst>
+              <dgm:constr type="diam" val="170"/>
+              <dgm:constr type="w" for="ch" forName="centerShape" refType="w"/>
+              <dgm:constr type="w" for="ch" forName="node" refType="w" refFor="ch" refForName="centerShape" op="equ" fact="0.7"/>
+              <dgm:constr type="sp" refType="w" refFor="ch" refForName="node" fact="0.3"/>
+              <dgm:constr type="sibSp" refType="w" refFor="ch" refForName="node" fact="0.3"/>
+              <dgm:constr type="primFontSz" for="ch" forName="centerShape" val="65"/>
+              <dgm:constr type="primFontSz" for="des" forName="node" refType="primFontSz" refFor="ch" refForName="centerShape" fact="0.78"/>
+              <dgm:constr type="primFontSz" for="ch" forName="node" refType="primFontSz" refFor="ch" refForName="centerShape" op="lte" fact="0.95"/>
+              <dgm:constr type="diam" for="ch" forName="sibTrans" refType="diam" op="equ"/>
+              <dgm:constr type="h" for="ch" forName="sibTrans" refType="w" refFor="ch" refForName="node" fact="0.24"/>
+              <dgm:constr type="w" for="ch" forName="dummy" val="1"/>
+            </dgm:constrLst>
+          </dgm:else>
+        </dgm:choose>
+      </dgm:if>
+      <dgm:else name="Name15">
+        <dgm:choose name="Name16">
+          <dgm:if name="Name17" axis="ch ch" ptType="node node" st="1 1" cnt="1 0" func="cnt" op="equ" val="1">
+            <dgm:constrLst>
+              <dgm:constr type="diam" val="170"/>
+              <dgm:constr type="w" for="ch" forName="centerShape" refType="w"/>
+              <dgm:constr type="w" for="ch" forName="oneComp" refType="w" refFor="ch" refForName="centerShape" op="equ" fact="0.7"/>
+              <dgm:constr type="sp" refType="w" refFor="ch" refForName="oneComp" fact="0.3"/>
+              <dgm:constr type="sibSp" refType="w" refFor="ch" refForName="oneComp" fact="0.3"/>
+              <dgm:constr type="primFontSz" for="ch" forName="centerShape" val="65"/>
+              <dgm:constr type="primFontSz" for="des" forName="oneNode" refType="primFontSz" refFor="ch" refForName="centerShape" fact="0.95"/>
+              <dgm:constr type="primFontSz" for="ch" forName="oneNode" refType="primFontSz" refFor="ch" refForName="centerShape" op="lte" fact="0.95"/>
+              <dgm:constr type="diam" for="ch" forName="singleconn" refType="diam"/>
+              <dgm:constr type="h" for="ch" forName="singleconn" refType="w" refFor="ch" refForName="oneComp" fact="0.24"/>
+              <dgm:constr type="diam" for="ch" refType="diam" op="equ"/>
+              <dgm:constr type="w" for="ch" forName="dummya" refType="w" refFor="ch" refForName="oneComp" op="equ"/>
+              <dgm:constr type="w" for="ch" forName="dummyb" refType="w" refFor="ch" refForName="oneComp" op="equ"/>
+              <dgm:constr type="w" for="ch" forName="dummyc" refType="w" refFor="ch" refForName="oneComp" op="equ"/>
+            </dgm:constrLst>
+          </dgm:if>
+          <dgm:else name="Name18">
+            <dgm:constrLst>
+              <dgm:constr type="diam" val="170"/>
+              <dgm:constr type="w" for="ch" forName="centerShape" refType="w"/>
+              <dgm:constr type="w" for="ch" forName="node" refType="w" refFor="ch" refForName="centerShape" op="equ" fact="0.7"/>
+              <dgm:constr type="sp" refType="w" refFor="ch" refForName="node" fact="0.3"/>
+              <dgm:constr type="sibSp" refType="w" refFor="ch" refForName="node" fact="0.3"/>
+              <dgm:constr type="primFontSz" for="ch" forName="centerShape" val="65"/>
+              <dgm:constr type="primFontSz" for="des" forName="node" refType="primFontSz" refFor="ch" refForName="centerShape" fact="0.78"/>
+              <dgm:constr type="primFontSz" for="ch" forName="node" refType="primFontSz" refFor="ch" refForName="centerShape" op="lte" fact="0.95"/>
+              <dgm:constr type="diam" for="ch" ptType="sibTrans" refType="diam" fact="-1"/>
+              <dgm:constr type="h" for="ch" forName="sibTrans" refType="w" refFor="ch" refForName="node" fact="0.24"/>
+              <dgm:constr type="diam" for="ch" refType="diam" op="equ" fact="-1"/>
+              <dgm:constr type="w" for="ch" forName="dummy" val="1"/>
+            </dgm:constrLst>
+          </dgm:else>
+        </dgm:choose>
+      </dgm:else>
+    </dgm:choose>
+    <dgm:ruleLst>
+      <dgm:rule type="diam" val="INF" fact="NaN" max="NaN"/>
+    </dgm:ruleLst>
+    <dgm:forEach name="Name19" axis="ch" ptType="node" cnt="1">
+      <dgm:layoutNode name="centerShape" styleLbl="node0">
+        <dgm:alg type="tx"/>
+        <dgm:shape xmlns:r="http://schemas.openxmlformats.org/officeDocument/2006/relationships" type="ellipse" r:blip="">
+          <dgm:adjLst/>
+        </dgm:shape>
+        <dgm:presOf axis="self"/>
+        <dgm:constrLst>
+          <dgm:constr type="h" refType="w"/>
+          <dgm:constr type="tMarg" refType="primFontSz" fact="0.1"/>
+          <dgm:constr type="bMarg" refType="primFontSz" fact="0.1"/>
+          <dgm:constr type="lMarg" refType="primFontSz" fact="0.1"/>
+          <dgm:constr type="rMarg" refType="primFontSz" fact="0.1"/>
+        </dgm:constrLst>
+        <dgm:ruleLst>
+          <dgm:rule type="primFontSz" val="5" fact="NaN" max="NaN"/>
+        </dgm:ruleLst>
+      </dgm:layoutNode>
+      <dgm:forEach name="Name20" axis="ch">
+        <dgm:forEach name="Name21" axis="self" ptType="node">
+          <dgm:choose name="Name22">
+            <dgm:if name="Name23" axis="par ch" ptType="node node" func="cnt" op="gt" val="1">
+              <dgm:layoutNode name="node" styleLbl="node1">
+                <dgm:varLst>
+                  <dgm:bulletEnabled val="1"/>
+                </dgm:varLst>
+                <dgm:alg type="tx">
+                  <dgm:param type="txAnchorVertCh" val="mid"/>
+                </dgm:alg>
+                <dgm:shape xmlns:r="http://schemas.openxmlformats.org/officeDocument/2006/relationships" type="ellipse" r:blip="">
+                  <dgm:adjLst/>
+                </dgm:shape>
+                <dgm:presOf axis="desOrSelf" ptType="node"/>
+                <dgm:constrLst>
+                  <dgm:constr type="h" refType="w"/>
+                  <dgm:constr type="tMarg" refType="primFontSz" fact="0.1"/>
+                  <dgm:constr type="bMarg" refType="primFontSz" fact="0.1"/>
+                  <dgm:constr type="lMarg" refType="primFontSz" fact="0.1"/>
+                  <dgm:constr type="rMarg" refType="primFontSz" fact="0.1"/>
+                </dgm:constrLst>
+                <dgm:ruleLst>
+                  <dgm:rule type="primFontSz" val="5" fact="NaN" max="NaN"/>
+                </dgm:ruleLst>
+              </dgm:layoutNode>
+              <dgm:layoutNode name="dummy">
+                <dgm:alg type="sp"/>
+                <dgm:shape xmlns:r="http://schemas.openxmlformats.org/officeDocument/2006/relationships" r:blip="">
+                  <dgm:adjLst/>
+                </dgm:shape>
+                <dgm:presOf/>
+                <dgm:constrLst>
+                  <dgm:constr type="h" refType="w"/>
+                </dgm:constrLst>
+                <dgm:ruleLst/>
+              </dgm:layoutNode>
+              <dgm:forEach name="sibTransForEach" axis="followSib" ptType="sibTrans" hideLastTrans="0" cnt="1">
+                <dgm:layoutNode name="sibTrans" styleLbl="sibTrans2D1">
+                  <dgm:alg type="conn">
+                    <dgm:param type="connRout" val="curve"/>
+                    <dgm:param type="begPts" val="ctr"/>
+                    <dgm:param type="endPts" val="ctr"/>
+                    <dgm:param type="begSty" val="noArr"/>
+                    <dgm:param type="endSty" val="noArr"/>
+                    <dgm:param type="dstNode" val="node"/>
+                  </dgm:alg>
+                  <dgm:shape xmlns:r="http://schemas.openxmlformats.org/officeDocument/2006/relationships" type="conn" r:blip="" zOrderOff="-999">
+                    <dgm:adjLst/>
+                  </dgm:shape>
+                  <dgm:presOf axis="self"/>
+                  <dgm:constrLst>
+                    <dgm:constr type="begPad"/>
+                    <dgm:constr type="endPad"/>
+                  </dgm:constrLst>
+                  <dgm:ruleLst/>
+                </dgm:layoutNode>
+              </dgm:forEach>
+            </dgm:if>
+            <dgm:if name="Name24" axis="par ch" ptType="node node" func="cnt" op="equ" val="1">
+              <dgm:layoutNode name="oneComp">
+                <dgm:alg type="composite">
+                  <dgm:param type="ar" val="1"/>
+                </dgm:alg>
+                <dgm:shape xmlns:r="http://schemas.openxmlformats.org/officeDocument/2006/relationships" r:blip="">
+                  <dgm:adjLst/>
+                </dgm:shape>
+                <dgm:presOf/>
+                <dgm:constrLst>
+                  <dgm:constr type="h" refType="w"/>
+                  <dgm:constr type="l" for="ch" forName="dummyConnPt" refType="w" fact="0.5"/>
+                  <dgm:constr type="t" for="ch" forName="dummyConnPt" refType="w" fact="0.5"/>
+                  <dgm:constr type="l" for="ch" forName="oneNode"/>
+                  <dgm:constr type="t" for="ch" forName="oneNode"/>
+                  <dgm:constr type="h" for="ch" forName="oneNode" refType="h"/>
+                  <dgm:constr type="w" for="ch" forName="oneNode" refType="w"/>
+                </dgm:constrLst>
+                <dgm:ruleLst/>
+                <dgm:layoutNode name="dummyConnPt" styleLbl="node1">
+                  <dgm:alg type="sp"/>
+                  <dgm:shape xmlns:r="http://schemas.openxmlformats.org/officeDocument/2006/relationships" r:blip="">
+                    <dgm:adjLst/>
+                  </dgm:shape>
+                  <dgm:presOf/>
+                  <dgm:constrLst>
+                    <dgm:constr type="w" val="1"/>
+                    <dgm:constr type="h" val="1"/>
+                  </dgm:constrLst>
+                  <dgm:ruleLst/>
+                </dgm:layoutNode>
+                <dgm:layoutNode name="oneNode" styleLbl="node1">
+                  <dgm:varLst>
+                    <dgm:bulletEnabled val="1"/>
+                  </dgm:varLst>
+                  <dgm:alg type="tx">
+                    <dgm:param type="txAnchorVertCh" val="mid"/>
+                  </dgm:alg>
+                  <dgm:shape xmlns:r="http://schemas.openxmlformats.org/officeDocument/2006/relationships" type="ellipse" r:blip="">
+                    <dgm:adjLst/>
+                  </dgm:shape>
+                  <dgm:presOf axis="desOrSelf" ptType="node"/>
+                  <dgm:constrLst>
+                    <dgm:constr type="h" refType="w"/>
+                    <dgm:constr type="tMarg" refType="primFontSz" fact="0.1"/>
+                    <dgm:constr type="bMarg" refType="primFontSz" fact="0.1"/>
+                    <dgm:constr type="lMarg" refType="primFontSz" fact="0.1"/>
+                    <dgm:constr type="rMarg" refType="primFontSz" fact="0.1"/>
+                  </dgm:constrLst>
+                  <dgm:ruleLst>
+                    <dgm:rule type="primFontSz" val="5" fact="NaN" max="NaN"/>
+                  </dgm:ruleLst>
+                </dgm:layoutNode>
+              </dgm:layoutNode>
+              <dgm:layoutNode name="dummya">
+                <dgm:alg type="sp"/>
+                <dgm:shape xmlns:r="http://schemas.openxmlformats.org/officeDocument/2006/relationships" r:blip="">
+                  <dgm:adjLst/>
+                </dgm:shape>
+                <dgm:presOf/>
+                <dgm:constrLst>
+                  <dgm:constr type="h" refType="w"/>
+                </dgm:constrLst>
+                <dgm:ruleLst/>
+              </dgm:layoutNode>
+              <dgm:layoutNode name="dummyb">
+                <dgm:alg type="sp"/>
+                <dgm:shape xmlns:r="http://schemas.openxmlformats.org/officeDocument/2006/relationships" r:blip="">
+                  <dgm:adjLst/>
+                </dgm:shape>
+                <dgm:presOf/>
+                <dgm:constrLst>
+                  <dgm:constr type="h" refType="w"/>
+                </dgm:constrLst>
+                <dgm:ruleLst/>
+              </dgm:layoutNode>
+              <dgm:layoutNode name="dummyc">
+                <dgm:alg type="sp"/>
+                <dgm:shape xmlns:r="http://schemas.openxmlformats.org/officeDocument/2006/relationships" r:blip="">
+                  <dgm:adjLst/>
+                </dgm:shape>
+                <dgm:presOf/>
+                <dgm:constrLst>
+                  <dgm:constr type="h" refType="w"/>
+                </dgm:constrLst>
+                <dgm:ruleLst/>
+              </dgm:layoutNode>
+              <dgm:forEach name="sibTransForEach1" axis="followSib" ptType="sibTrans" hideLastTrans="0" cnt="1">
+                <dgm:layoutNode name="singleconn" styleLbl="sibTrans2D1">
+                  <dgm:alg type="conn">
+                    <dgm:param type="connRout" val="longCurve"/>
+                    <dgm:param type="begPts" val="bCtr"/>
+                    <dgm:param type="endPts" val="tCtr"/>
+                    <dgm:param type="begSty" val="noArr"/>
+                    <dgm:param type="endSty" val="noArr"/>
+                    <dgm:param type="srcNode" val="dummyConnPt"/>
+                    <dgm:param type="dstNode" val="dummyConnPt"/>
+                  </dgm:alg>
+                  <dgm:shape xmlns:r="http://schemas.openxmlformats.org/officeDocument/2006/relationships" type="conn" r:blip="" zOrderOff="-999">
+                    <dgm:adjLst/>
+                  </dgm:shape>
+                  <dgm:presOf axis="self"/>
+                  <dgm:constrLst>
+                    <dgm:constr type="begPad"/>
+                    <dgm:constr type="endPad"/>
+                  </dgm:constrLst>
+                  <dgm:ruleLst/>
+                </dgm:layoutNode>
+              </dgm:forEach>
+            </dgm:if>
+            <dgm:else name="Name25"/>
+          </dgm:choose>
+        </dgm:forEach>
+      </dgm:forEach>
+    </dgm:forEach>
+  </dgm:layoutNode>
+</dgm:layoutDef>
+</file>
+
 <file path=ppt/diagrams/quickStyle1.xml><?xml version="1.0" encoding="utf-8"?>
 <dgm:styleDef xmlns:dgm="http://schemas.openxmlformats.org/drawingml/2006/diagram" xmlns:a="http://schemas.openxmlformats.org/drawingml/2006/main" uniqueId="urn:microsoft.com/office/officeart/2005/8/quickstyle/simple1">
   <dgm:title val=""/>
@@ -13698,6 +15590,1040 @@
 </file>
 
 <file path=ppt/diagrams/quickStyle5.xml><?xml version="1.0" encoding="utf-8"?>
+<dgm:styleDef xmlns:dgm="http://schemas.openxmlformats.org/drawingml/2006/diagram" xmlns:a="http://schemas.openxmlformats.org/drawingml/2006/main" uniqueId="urn:microsoft.com/office/officeart/2005/8/quickstyle/simple1">
+  <dgm:title val=""/>
+  <dgm:desc val=""/>
+  <dgm:catLst>
+    <dgm:cat type="simple" pri="10100"/>
+  </dgm:catLst>
+  <dgm:scene3d>
+    <a:camera prst="orthographicFront"/>
+    <a:lightRig rig="threePt" dir="t"/>
+  </dgm:scene3d>
+  <dgm:styleLbl name="node0">
+    <dgm:scene3d>
+      <a:camera prst="orthographicFront"/>
+      <a:lightRig rig="threePt" dir="t"/>
+    </dgm:scene3d>
+    <dgm:sp3d/>
+    <dgm:txPr/>
+    <dgm:style>
+      <a:lnRef idx="2">
+        <a:scrgbClr r="0" g="0" b="0"/>
+      </a:lnRef>
+      <a:fillRef idx="1">
+        <a:scrgbClr r="0" g="0" b="0"/>
+      </a:fillRef>
+      <a:effectRef idx="0">
+        <a:scrgbClr r="0" g="0" b="0"/>
+      </a:effectRef>
+      <a:fontRef idx="minor">
+        <a:schemeClr val="lt1"/>
+      </a:fontRef>
+    </dgm:style>
+  </dgm:styleLbl>
+  <dgm:styleLbl name="lnNode1">
+    <dgm:scene3d>
+      <a:camera prst="orthographicFront"/>
+      <a:lightRig rig="threePt" dir="t"/>
+    </dgm:scene3d>
+    <dgm:sp3d/>
+    <dgm:txPr/>
+    <dgm:style>
+      <a:lnRef idx="2">
+        <a:scrgbClr r="0" g="0" b="0"/>
+      </a:lnRef>
+      <a:fillRef idx="1">
+        <a:scrgbClr r="0" g="0" b="0"/>
+      </a:fillRef>
+      <a:effectRef idx="0">
+        <a:scrgbClr r="0" g="0" b="0"/>
+      </a:effectRef>
+      <a:fontRef idx="minor">
+        <a:schemeClr val="lt1"/>
+      </a:fontRef>
+    </dgm:style>
+  </dgm:styleLbl>
+  <dgm:styleLbl name="vennNode1">
+    <dgm:scene3d>
+      <a:camera prst="orthographicFront"/>
+      <a:lightRig rig="threePt" dir="t"/>
+    </dgm:scene3d>
+    <dgm:sp3d/>
+    <dgm:txPr/>
+    <dgm:style>
+      <a:lnRef idx="2">
+        <a:scrgbClr r="0" g="0" b="0"/>
+      </a:lnRef>
+      <a:fillRef idx="1">
+        <a:scrgbClr r="0" g="0" b="0"/>
+      </a:fillRef>
+      <a:effectRef idx="0">
+        <a:scrgbClr r="0" g="0" b="0"/>
+      </a:effectRef>
+      <a:fontRef idx="minor">
+        <a:schemeClr val="tx1"/>
+      </a:fontRef>
+    </dgm:style>
+  </dgm:styleLbl>
+  <dgm:styleLbl name="alignNode1">
+    <dgm:scene3d>
+      <a:camera prst="orthographicFront"/>
+      <a:lightRig rig="threePt" dir="t"/>
+    </dgm:scene3d>
+    <dgm:sp3d/>
+    <dgm:txPr/>
+    <dgm:style>
+      <a:lnRef idx="2">
+        <a:scrgbClr r="0" g="0" b="0"/>
+      </a:lnRef>
+      <a:fillRef idx="1">
+        <a:scrgbClr r="0" g="0" b="0"/>
+      </a:fillRef>
+      <a:effectRef idx="0">
+        <a:scrgbClr r="0" g="0" b="0"/>
+      </a:effectRef>
+      <a:fontRef idx="minor">
+        <a:schemeClr val="lt1"/>
+      </a:fontRef>
+    </dgm:style>
+  </dgm:styleLbl>
+  <dgm:styleLbl name="node1">
+    <dgm:scene3d>
+      <a:camera prst="orthographicFront"/>
+      <a:lightRig rig="threePt" dir="t"/>
+    </dgm:scene3d>
+    <dgm:sp3d/>
+    <dgm:txPr/>
+    <dgm:style>
+      <a:lnRef idx="2">
+        <a:scrgbClr r="0" g="0" b="0"/>
+      </a:lnRef>
+      <a:fillRef idx="1">
+        <a:scrgbClr r="0" g="0" b="0"/>
+      </a:fillRef>
+      <a:effectRef idx="0">
+        <a:scrgbClr r="0" g="0" b="0"/>
+      </a:effectRef>
+      <a:fontRef idx="minor">
+        <a:schemeClr val="lt1"/>
+      </a:fontRef>
+    </dgm:style>
+  </dgm:styleLbl>
+  <dgm:styleLbl name="node2">
+    <dgm:scene3d>
+      <a:camera prst="orthographicFront"/>
+      <a:lightRig rig="threePt" dir="t"/>
+    </dgm:scene3d>
+    <dgm:sp3d/>
+    <dgm:txPr/>
+    <dgm:style>
+      <a:lnRef idx="2">
+        <a:scrgbClr r="0" g="0" b="0"/>
+      </a:lnRef>
+      <a:fillRef idx="1">
+        <a:scrgbClr r="0" g="0" b="0"/>
+      </a:fillRef>
+      <a:effectRef idx="0">
+        <a:scrgbClr r="0" g="0" b="0"/>
+      </a:effectRef>
+      <a:fontRef idx="minor">
+        <a:schemeClr val="lt1"/>
+      </a:fontRef>
+    </dgm:style>
+  </dgm:styleLbl>
+  <dgm:styleLbl name="node3">
+    <dgm:scene3d>
+      <a:camera prst="orthographicFront"/>
+      <a:lightRig rig="threePt" dir="t"/>
+    </dgm:scene3d>
+    <dgm:sp3d/>
+    <dgm:txPr/>
+    <dgm:style>
+      <a:lnRef idx="2">
+        <a:scrgbClr r="0" g="0" b="0"/>
+      </a:lnRef>
+      <a:fillRef idx="1">
+        <a:scrgbClr r="0" g="0" b="0"/>
+      </a:fillRef>
+      <a:effectRef idx="0">
+        <a:scrgbClr r="0" g="0" b="0"/>
+      </a:effectRef>
+      <a:fontRef idx="minor">
+        <a:schemeClr val="lt1"/>
+      </a:fontRef>
+    </dgm:style>
+  </dgm:styleLbl>
+  <dgm:styleLbl name="node4">
+    <dgm:scene3d>
+      <a:camera prst="orthographicFront"/>
+      <a:lightRig rig="threePt" dir="t"/>
+    </dgm:scene3d>
+    <dgm:sp3d/>
+    <dgm:txPr/>
+    <dgm:style>
+      <a:lnRef idx="2">
+        <a:scrgbClr r="0" g="0" b="0"/>
+      </a:lnRef>
+      <a:fillRef idx="1">
+        <a:scrgbClr r="0" g="0" b="0"/>
+      </a:fillRef>
+      <a:effectRef idx="0">
+        <a:scrgbClr r="0" g="0" b="0"/>
+      </a:effectRef>
+      <a:fontRef idx="minor">
+        <a:schemeClr val="lt1"/>
+      </a:fontRef>
+    </dgm:style>
+  </dgm:styleLbl>
+  <dgm:styleLbl name="fgImgPlace1">
+    <dgm:scene3d>
+      <a:camera prst="orthographicFront"/>
+      <a:lightRig rig="threePt" dir="t"/>
+    </dgm:scene3d>
+    <dgm:sp3d/>
+    <dgm:txPr/>
+    <dgm:style>
+      <a:lnRef idx="2">
+        <a:scrgbClr r="0" g="0" b="0"/>
+      </a:lnRef>
+      <a:fillRef idx="1">
+        <a:scrgbClr r="0" g="0" b="0"/>
+      </a:fillRef>
+      <a:effectRef idx="0">
+        <a:scrgbClr r="0" g="0" b="0"/>
+      </a:effectRef>
+      <a:fontRef idx="minor"/>
+    </dgm:style>
+  </dgm:styleLbl>
+  <dgm:styleLbl name="alignImgPlace1">
+    <dgm:scene3d>
+      <a:camera prst="orthographicFront"/>
+      <a:lightRig rig="threePt" dir="t"/>
+    </dgm:scene3d>
+    <dgm:sp3d/>
+    <dgm:txPr/>
+    <dgm:style>
+      <a:lnRef idx="2">
+        <a:scrgbClr r="0" g="0" b="0"/>
+      </a:lnRef>
+      <a:fillRef idx="1">
+        <a:scrgbClr r="0" g="0" b="0"/>
+      </a:fillRef>
+      <a:effectRef idx="0">
+        <a:scrgbClr r="0" g="0" b="0"/>
+      </a:effectRef>
+      <a:fontRef idx="minor"/>
+    </dgm:style>
+  </dgm:styleLbl>
+  <dgm:styleLbl name="bgImgPlace1">
+    <dgm:scene3d>
+      <a:camera prst="orthographicFront"/>
+      <a:lightRig rig="threePt" dir="t"/>
+    </dgm:scene3d>
+    <dgm:sp3d/>
+    <dgm:txPr/>
+    <dgm:style>
+      <a:lnRef idx="2">
+        <a:scrgbClr r="0" g="0" b="0"/>
+      </a:lnRef>
+      <a:fillRef idx="1">
+        <a:scrgbClr r="0" g="0" b="0"/>
+      </a:fillRef>
+      <a:effectRef idx="0">
+        <a:scrgbClr r="0" g="0" b="0"/>
+      </a:effectRef>
+      <a:fontRef idx="minor"/>
+    </dgm:style>
+  </dgm:styleLbl>
+  <dgm:styleLbl name="sibTrans2D1">
+    <dgm:scene3d>
+      <a:camera prst="orthographicFront"/>
+      <a:lightRig rig="threePt" dir="t"/>
+    </dgm:scene3d>
+    <dgm:sp3d/>
+    <dgm:txPr/>
+    <dgm:style>
+      <a:lnRef idx="0">
+        <a:scrgbClr r="0" g="0" b="0"/>
+      </a:lnRef>
+      <a:fillRef idx="1">
+        <a:scrgbClr r="0" g="0" b="0"/>
+      </a:fillRef>
+      <a:effectRef idx="0">
+        <a:scrgbClr r="0" g="0" b="0"/>
+      </a:effectRef>
+      <a:fontRef idx="minor">
+        <a:schemeClr val="lt1"/>
+      </a:fontRef>
+    </dgm:style>
+  </dgm:styleLbl>
+  <dgm:styleLbl name="fgSibTrans2D1">
+    <dgm:scene3d>
+      <a:camera prst="orthographicFront"/>
+      <a:lightRig rig="threePt" dir="t"/>
+    </dgm:scene3d>
+    <dgm:sp3d/>
+    <dgm:txPr/>
+    <dgm:style>
+      <a:lnRef idx="0">
+        <a:scrgbClr r="0" g="0" b="0"/>
+      </a:lnRef>
+      <a:fillRef idx="1">
+        <a:scrgbClr r="0" g="0" b="0"/>
+      </a:fillRef>
+      <a:effectRef idx="0">
+        <a:scrgbClr r="0" g="0" b="0"/>
+      </a:effectRef>
+      <a:fontRef idx="minor">
+        <a:schemeClr val="lt1"/>
+      </a:fontRef>
+    </dgm:style>
+  </dgm:styleLbl>
+  <dgm:styleLbl name="bgSibTrans2D1">
+    <dgm:scene3d>
+      <a:camera prst="orthographicFront"/>
+      <a:lightRig rig="threePt" dir="t"/>
+    </dgm:scene3d>
+    <dgm:sp3d/>
+    <dgm:txPr/>
+    <dgm:style>
+      <a:lnRef idx="0">
+        <a:scrgbClr r="0" g="0" b="0"/>
+      </a:lnRef>
+      <a:fillRef idx="1">
+        <a:scrgbClr r="0" g="0" b="0"/>
+      </a:fillRef>
+      <a:effectRef idx="0">
+        <a:scrgbClr r="0" g="0" b="0"/>
+      </a:effectRef>
+      <a:fontRef idx="minor">
+        <a:schemeClr val="lt1"/>
+      </a:fontRef>
+    </dgm:style>
+  </dgm:styleLbl>
+  <dgm:styleLbl name="sibTrans1D1">
+    <dgm:scene3d>
+      <a:camera prst="orthographicFront"/>
+      <a:lightRig rig="threePt" dir="t"/>
+    </dgm:scene3d>
+    <dgm:sp3d/>
+    <dgm:txPr/>
+    <dgm:style>
+      <a:lnRef idx="1">
+        <a:scrgbClr r="0" g="0" b="0"/>
+      </a:lnRef>
+      <a:fillRef idx="0">
+        <a:scrgbClr r="0" g="0" b="0"/>
+      </a:fillRef>
+      <a:effectRef idx="0">
+        <a:scrgbClr r="0" g="0" b="0"/>
+      </a:effectRef>
+      <a:fontRef idx="minor"/>
+    </dgm:style>
+  </dgm:styleLbl>
+  <dgm:styleLbl name="callout">
+    <dgm:scene3d>
+      <a:camera prst="orthographicFront"/>
+      <a:lightRig rig="threePt" dir="t"/>
+    </dgm:scene3d>
+    <dgm:sp3d/>
+    <dgm:txPr/>
+    <dgm:style>
+      <a:lnRef idx="2">
+        <a:scrgbClr r="0" g="0" b="0"/>
+      </a:lnRef>
+      <a:fillRef idx="1">
+        <a:scrgbClr r="0" g="0" b="0"/>
+      </a:fillRef>
+      <a:effectRef idx="0">
+        <a:scrgbClr r="0" g="0" b="0"/>
+      </a:effectRef>
+      <a:fontRef idx="minor"/>
+    </dgm:style>
+  </dgm:styleLbl>
+  <dgm:styleLbl name="asst0">
+    <dgm:scene3d>
+      <a:camera prst="orthographicFront"/>
+      <a:lightRig rig="threePt" dir="t"/>
+    </dgm:scene3d>
+    <dgm:sp3d/>
+    <dgm:txPr/>
+    <dgm:style>
+      <a:lnRef idx="2">
+        <a:scrgbClr r="0" g="0" b="0"/>
+      </a:lnRef>
+      <a:fillRef idx="1">
+        <a:scrgbClr r="0" g="0" b="0"/>
+      </a:fillRef>
+      <a:effectRef idx="0">
+        <a:scrgbClr r="0" g="0" b="0"/>
+      </a:effectRef>
+      <a:fontRef idx="minor">
+        <a:schemeClr val="lt1"/>
+      </a:fontRef>
+    </dgm:style>
+  </dgm:styleLbl>
+  <dgm:styleLbl name="asst1">
+    <dgm:scene3d>
+      <a:camera prst="orthographicFront"/>
+      <a:lightRig rig="threePt" dir="t"/>
+    </dgm:scene3d>
+    <dgm:sp3d/>
+    <dgm:txPr/>
+    <dgm:style>
+      <a:lnRef idx="2">
+        <a:scrgbClr r="0" g="0" b="0"/>
+      </a:lnRef>
+      <a:fillRef idx="1">
+        <a:scrgbClr r="0" g="0" b="0"/>
+      </a:fillRef>
+      <a:effectRef idx="0">
+        <a:scrgbClr r="0" g="0" b="0"/>
+      </a:effectRef>
+      <a:fontRef idx="minor">
+        <a:schemeClr val="lt1"/>
+      </a:fontRef>
+    </dgm:style>
+  </dgm:styleLbl>
+  <dgm:styleLbl name="asst2">
+    <dgm:scene3d>
+      <a:camera prst="orthographicFront"/>
+      <a:lightRig rig="threePt" dir="t"/>
+    </dgm:scene3d>
+    <dgm:sp3d/>
+    <dgm:txPr/>
+    <dgm:style>
+      <a:lnRef idx="2">
+        <a:scrgbClr r="0" g="0" b="0"/>
+      </a:lnRef>
+      <a:fillRef idx="1">
+        <a:scrgbClr r="0" g="0" b="0"/>
+      </a:fillRef>
+      <a:effectRef idx="0">
+        <a:scrgbClr r="0" g="0" b="0"/>
+      </a:effectRef>
+      <a:fontRef idx="minor">
+        <a:schemeClr val="lt1"/>
+      </a:fontRef>
+    </dgm:style>
+  </dgm:styleLbl>
+  <dgm:styleLbl name="asst3">
+    <dgm:scene3d>
+      <a:camera prst="orthographicFront"/>
+      <a:lightRig rig="threePt" dir="t"/>
+    </dgm:scene3d>
+    <dgm:sp3d/>
+    <dgm:txPr/>
+    <dgm:style>
+      <a:lnRef idx="2">
+        <a:scrgbClr r="0" g="0" b="0"/>
+      </a:lnRef>
+      <a:fillRef idx="1">
+        <a:scrgbClr r="0" g="0" b="0"/>
+      </a:fillRef>
+      <a:effectRef idx="0">
+        <a:scrgbClr r="0" g="0" b="0"/>
+      </a:effectRef>
+      <a:fontRef idx="minor">
+        <a:schemeClr val="lt1"/>
+      </a:fontRef>
+    </dgm:style>
+  </dgm:styleLbl>
+  <dgm:styleLbl name="asst4">
+    <dgm:scene3d>
+      <a:camera prst="orthographicFront"/>
+      <a:lightRig rig="threePt" dir="t"/>
+    </dgm:scene3d>
+    <dgm:sp3d/>
+    <dgm:txPr/>
+    <dgm:style>
+      <a:lnRef idx="2">
+        <a:scrgbClr r="0" g="0" b="0"/>
+      </a:lnRef>
+      <a:fillRef idx="1">
+        <a:scrgbClr r="0" g="0" b="0"/>
+      </a:fillRef>
+      <a:effectRef idx="0">
+        <a:scrgbClr r="0" g="0" b="0"/>
+      </a:effectRef>
+      <a:fontRef idx="minor">
+        <a:schemeClr val="lt1"/>
+      </a:fontRef>
+    </dgm:style>
+  </dgm:styleLbl>
+  <dgm:styleLbl name="parChTrans2D1">
+    <dgm:scene3d>
+      <a:camera prst="orthographicFront"/>
+      <a:lightRig rig="threePt" dir="t"/>
+    </dgm:scene3d>
+    <dgm:sp3d/>
+    <dgm:txPr/>
+    <dgm:style>
+      <a:lnRef idx="2">
+        <a:scrgbClr r="0" g="0" b="0"/>
+      </a:lnRef>
+      <a:fillRef idx="1">
+        <a:scrgbClr r="0" g="0" b="0"/>
+      </a:fillRef>
+      <a:effectRef idx="0">
+        <a:scrgbClr r="0" g="0" b="0"/>
+      </a:effectRef>
+      <a:fontRef idx="minor">
+        <a:schemeClr val="lt1"/>
+      </a:fontRef>
+    </dgm:style>
+  </dgm:styleLbl>
+  <dgm:styleLbl name="parChTrans2D2">
+    <dgm:scene3d>
+      <a:camera prst="orthographicFront"/>
+      <a:lightRig rig="threePt" dir="t"/>
+    </dgm:scene3d>
+    <dgm:sp3d/>
+    <dgm:txPr/>
+    <dgm:style>
+      <a:lnRef idx="2">
+        <a:scrgbClr r="0" g="0" b="0"/>
+      </a:lnRef>
+      <a:fillRef idx="1">
+        <a:scrgbClr r="0" g="0" b="0"/>
+      </a:fillRef>
+      <a:effectRef idx="0">
+        <a:scrgbClr r="0" g="0" b="0"/>
+      </a:effectRef>
+      <a:fontRef idx="minor">
+        <a:schemeClr val="lt1"/>
+      </a:fontRef>
+    </dgm:style>
+  </dgm:styleLbl>
+  <dgm:styleLbl name="parChTrans2D3">
+    <dgm:scene3d>
+      <a:camera prst="orthographicFront"/>
+      <a:lightRig rig="threePt" dir="t"/>
+    </dgm:scene3d>
+    <dgm:sp3d/>
+    <dgm:txPr/>
+    <dgm:style>
+      <a:lnRef idx="2">
+        <a:scrgbClr r="0" g="0" b="0"/>
+      </a:lnRef>
+      <a:fillRef idx="1">
+        <a:scrgbClr r="0" g="0" b="0"/>
+      </a:fillRef>
+      <a:effectRef idx="0">
+        <a:scrgbClr r="0" g="0" b="0"/>
+      </a:effectRef>
+      <a:fontRef idx="minor">
+        <a:schemeClr val="lt1"/>
+      </a:fontRef>
+    </dgm:style>
+  </dgm:styleLbl>
+  <dgm:styleLbl name="parChTrans2D4">
+    <dgm:scene3d>
+      <a:camera prst="orthographicFront"/>
+      <a:lightRig rig="threePt" dir="t"/>
+    </dgm:scene3d>
+    <dgm:sp3d/>
+    <dgm:txPr/>
+    <dgm:style>
+      <a:lnRef idx="2">
+        <a:scrgbClr r="0" g="0" b="0"/>
+      </a:lnRef>
+      <a:fillRef idx="1">
+        <a:scrgbClr r="0" g="0" b="0"/>
+      </a:fillRef>
+      <a:effectRef idx="0">
+        <a:scrgbClr r="0" g="0" b="0"/>
+      </a:effectRef>
+      <a:fontRef idx="minor">
+        <a:schemeClr val="lt1"/>
+      </a:fontRef>
+    </dgm:style>
+  </dgm:styleLbl>
+  <dgm:styleLbl name="parChTrans1D1">
+    <dgm:scene3d>
+      <a:camera prst="orthographicFront"/>
+      <a:lightRig rig="threePt" dir="t"/>
+    </dgm:scene3d>
+    <dgm:sp3d/>
+    <dgm:txPr/>
+    <dgm:style>
+      <a:lnRef idx="2">
+        <a:scrgbClr r="0" g="0" b="0"/>
+      </a:lnRef>
+      <a:fillRef idx="0">
+        <a:scrgbClr r="0" g="0" b="0"/>
+      </a:fillRef>
+      <a:effectRef idx="0">
+        <a:scrgbClr r="0" g="0" b="0"/>
+      </a:effectRef>
+      <a:fontRef idx="minor"/>
+    </dgm:style>
+  </dgm:styleLbl>
+  <dgm:styleLbl name="parChTrans1D2">
+    <dgm:scene3d>
+      <a:camera prst="orthographicFront"/>
+      <a:lightRig rig="threePt" dir="t"/>
+    </dgm:scene3d>
+    <dgm:sp3d/>
+    <dgm:txPr/>
+    <dgm:style>
+      <a:lnRef idx="2">
+        <a:scrgbClr r="0" g="0" b="0"/>
+      </a:lnRef>
+      <a:fillRef idx="0">
+        <a:scrgbClr r="0" g="0" b="0"/>
+      </a:fillRef>
+      <a:effectRef idx="0">
+        <a:scrgbClr r="0" g="0" b="0"/>
+      </a:effectRef>
+      <a:fontRef idx="minor"/>
+    </dgm:style>
+  </dgm:styleLbl>
+  <dgm:styleLbl name="parChTrans1D3">
+    <dgm:scene3d>
+      <a:camera prst="orthographicFront"/>
+      <a:lightRig rig="threePt" dir="t"/>
+    </dgm:scene3d>
+    <dgm:sp3d/>
+    <dgm:txPr/>
+    <dgm:style>
+      <a:lnRef idx="2">
+        <a:scrgbClr r="0" g="0" b="0"/>
+      </a:lnRef>
+      <a:fillRef idx="0">
+        <a:scrgbClr r="0" g="0" b="0"/>
+      </a:fillRef>
+      <a:effectRef idx="0">
+        <a:scrgbClr r="0" g="0" b="0"/>
+      </a:effectRef>
+      <a:fontRef idx="minor"/>
+    </dgm:style>
+  </dgm:styleLbl>
+  <dgm:styleLbl name="parChTrans1D4">
+    <dgm:scene3d>
+      <a:camera prst="orthographicFront"/>
+      <a:lightRig rig="threePt" dir="t"/>
+    </dgm:scene3d>
+    <dgm:sp3d/>
+    <dgm:txPr/>
+    <dgm:style>
+      <a:lnRef idx="2">
+        <a:scrgbClr r="0" g="0" b="0"/>
+      </a:lnRef>
+      <a:fillRef idx="0">
+        <a:scrgbClr r="0" g="0" b="0"/>
+      </a:fillRef>
+      <a:effectRef idx="0">
+        <a:scrgbClr r="0" g="0" b="0"/>
+      </a:effectRef>
+      <a:fontRef idx="minor"/>
+    </dgm:style>
+  </dgm:styleLbl>
+  <dgm:styleLbl name="fgAcc1">
+    <dgm:scene3d>
+      <a:camera prst="orthographicFront"/>
+      <a:lightRig rig="threePt" dir="t"/>
+    </dgm:scene3d>
+    <dgm:sp3d/>
+    <dgm:txPr/>
+    <dgm:style>
+      <a:lnRef idx="2">
+        <a:scrgbClr r="0" g="0" b="0"/>
+      </a:lnRef>
+      <a:fillRef idx="1">
+        <a:scrgbClr r="0" g="0" b="0"/>
+      </a:fillRef>
+      <a:effectRef idx="0">
+        <a:scrgbClr r="0" g="0" b="0"/>
+      </a:effectRef>
+      <a:fontRef idx="minor"/>
+    </dgm:style>
+  </dgm:styleLbl>
+  <dgm:styleLbl name="conFgAcc1">
+    <dgm:scene3d>
+      <a:camera prst="orthographicFront"/>
+      <a:lightRig rig="threePt" dir="t"/>
+    </dgm:scene3d>
+    <dgm:sp3d/>
+    <dgm:txPr/>
+    <dgm:style>
+      <a:lnRef idx="2">
+        <a:scrgbClr r="0" g="0" b="0"/>
+      </a:lnRef>
+      <a:fillRef idx="1">
+        <a:scrgbClr r="0" g="0" b="0"/>
+      </a:fillRef>
+      <a:effectRef idx="0">
+        <a:scrgbClr r="0" g="0" b="0"/>
+      </a:effectRef>
+      <a:fontRef idx="minor"/>
+    </dgm:style>
+  </dgm:styleLbl>
+  <dgm:styleLbl name="alignAcc1">
+    <dgm:scene3d>
+      <a:camera prst="orthographicFront"/>
+      <a:lightRig rig="threePt" dir="t"/>
+    </dgm:scene3d>
+    <dgm:sp3d/>
+    <dgm:txPr/>
+    <dgm:style>
+      <a:lnRef idx="2">
+        <a:scrgbClr r="0" g="0" b="0"/>
+      </a:lnRef>
+      <a:fillRef idx="1">
+        <a:scrgbClr r="0" g="0" b="0"/>
+      </a:fillRef>
+      <a:effectRef idx="0">
+        <a:scrgbClr r="0" g="0" b="0"/>
+      </a:effectRef>
+      <a:fontRef idx="minor"/>
+    </dgm:style>
+  </dgm:styleLbl>
+  <dgm:styleLbl name="trAlignAcc1">
+    <dgm:scene3d>
+      <a:camera prst="orthographicFront"/>
+      <a:lightRig rig="threePt" dir="t"/>
+    </dgm:scene3d>
+    <dgm:sp3d/>
+    <dgm:txPr/>
+    <dgm:style>
+      <a:lnRef idx="1">
+        <a:scrgbClr r="0" g="0" b="0"/>
+      </a:lnRef>
+      <a:fillRef idx="1">
+        <a:scrgbClr r="0" g="0" b="0"/>
+      </a:fillRef>
+      <a:effectRef idx="0">
+        <a:scrgbClr r="0" g="0" b="0"/>
+      </a:effectRef>
+      <a:fontRef idx="minor"/>
+    </dgm:style>
+  </dgm:styleLbl>
+  <dgm:styleLbl name="bgAcc1">
+    <dgm:scene3d>
+      <a:camera prst="orthographicFront"/>
+      <a:lightRig rig="threePt" dir="t"/>
+    </dgm:scene3d>
+    <dgm:sp3d/>
+    <dgm:txPr/>
+    <dgm:style>
+      <a:lnRef idx="2">
+        <a:scrgbClr r="0" g="0" b="0"/>
+      </a:lnRef>
+      <a:fillRef idx="1">
+        <a:scrgbClr r="0" g="0" b="0"/>
+      </a:fillRef>
+      <a:effectRef idx="0">
+        <a:scrgbClr r="0" g="0" b="0"/>
+      </a:effectRef>
+      <a:fontRef idx="minor"/>
+    </dgm:style>
+  </dgm:styleLbl>
+  <dgm:styleLbl name="solidFgAcc1">
+    <dgm:scene3d>
+      <a:camera prst="orthographicFront"/>
+      <a:lightRig rig="threePt" dir="t"/>
+    </dgm:scene3d>
+    <dgm:sp3d/>
+    <dgm:txPr/>
+    <dgm:style>
+      <a:lnRef idx="2">
+        <a:scrgbClr r="0" g="0" b="0"/>
+      </a:lnRef>
+      <a:fillRef idx="1">
+        <a:scrgbClr r="0" g="0" b="0"/>
+      </a:fillRef>
+      <a:effectRef idx="0">
+        <a:scrgbClr r="0" g="0" b="0"/>
+      </a:effectRef>
+      <a:fontRef idx="minor"/>
+    </dgm:style>
+  </dgm:styleLbl>
+  <dgm:styleLbl name="solidAlignAcc1">
+    <dgm:scene3d>
+      <a:camera prst="orthographicFront"/>
+      <a:lightRig rig="threePt" dir="t"/>
+    </dgm:scene3d>
+    <dgm:sp3d/>
+    <dgm:txPr/>
+    <dgm:style>
+      <a:lnRef idx="2">
+        <a:scrgbClr r="0" g="0" b="0"/>
+      </a:lnRef>
+      <a:fillRef idx="1">
+        <a:scrgbClr r="0" g="0" b="0"/>
+      </a:fillRef>
+      <a:effectRef idx="0">
+        <a:scrgbClr r="0" g="0" b="0"/>
+      </a:effectRef>
+      <a:fontRef idx="minor"/>
+    </dgm:style>
+  </dgm:styleLbl>
+  <dgm:styleLbl name="solidBgAcc1">
+    <dgm:scene3d>
+      <a:camera prst="orthographicFront"/>
+      <a:lightRig rig="threePt" dir="t"/>
+    </dgm:scene3d>
+    <dgm:sp3d/>
+    <dgm:txPr/>
+    <dgm:style>
+      <a:lnRef idx="2">
+        <a:scrgbClr r="0" g="0" b="0"/>
+      </a:lnRef>
+      <a:fillRef idx="1">
+        <a:scrgbClr r="0" g="0" b="0"/>
+      </a:fillRef>
+      <a:effectRef idx="0">
+        <a:scrgbClr r="0" g="0" b="0"/>
+      </a:effectRef>
+      <a:fontRef idx="minor"/>
+    </dgm:style>
+  </dgm:styleLbl>
+  <dgm:styleLbl name="fgAccFollowNode1">
+    <dgm:scene3d>
+      <a:camera prst="orthographicFront"/>
+      <a:lightRig rig="threePt" dir="t"/>
+    </dgm:scene3d>
+    <dgm:sp3d/>
+    <dgm:txPr/>
+    <dgm:style>
+      <a:lnRef idx="2">
+        <a:scrgbClr r="0" g="0" b="0"/>
+      </a:lnRef>
+      <a:fillRef idx="1">
+        <a:scrgbClr r="0" g="0" b="0"/>
+      </a:fillRef>
+      <a:effectRef idx="0">
+        <a:scrgbClr r="0" g="0" b="0"/>
+      </a:effectRef>
+      <a:fontRef idx="minor"/>
+    </dgm:style>
+  </dgm:styleLbl>
+  <dgm:styleLbl name="alignAccFollowNode1">
+    <dgm:scene3d>
+      <a:camera prst="orthographicFront"/>
+      <a:lightRig rig="threePt" dir="t"/>
+    </dgm:scene3d>
+    <dgm:sp3d/>
+    <dgm:txPr/>
+    <dgm:style>
+      <a:lnRef idx="2">
+        <a:scrgbClr r="0" g="0" b="0"/>
+      </a:lnRef>
+      <a:fillRef idx="1">
+        <a:scrgbClr r="0" g="0" b="0"/>
+      </a:fillRef>
+      <a:effectRef idx="0">
+        <a:scrgbClr r="0" g="0" b="0"/>
+      </a:effectRef>
+      <a:fontRef idx="minor"/>
+    </dgm:style>
+  </dgm:styleLbl>
+  <dgm:styleLbl name="bgAccFollowNode1">
+    <dgm:scene3d>
+      <a:camera prst="orthographicFront"/>
+      <a:lightRig rig="threePt" dir="t"/>
+    </dgm:scene3d>
+    <dgm:sp3d/>
+    <dgm:txPr/>
+    <dgm:style>
+      <a:lnRef idx="2">
+        <a:scrgbClr r="0" g="0" b="0"/>
+      </a:lnRef>
+      <a:fillRef idx="1">
+        <a:scrgbClr r="0" g="0" b="0"/>
+      </a:fillRef>
+      <a:effectRef idx="0">
+        <a:scrgbClr r="0" g="0" b="0"/>
+      </a:effectRef>
+      <a:fontRef idx="minor"/>
+    </dgm:style>
+  </dgm:styleLbl>
+  <dgm:styleLbl name="fgAcc0">
+    <dgm:scene3d>
+      <a:camera prst="orthographicFront"/>
+      <a:lightRig rig="threePt" dir="t"/>
+    </dgm:scene3d>
+    <dgm:sp3d/>
+    <dgm:txPr/>
+    <dgm:style>
+      <a:lnRef idx="2">
+        <a:scrgbClr r="0" g="0" b="0"/>
+      </a:lnRef>
+      <a:fillRef idx="1">
+        <a:scrgbClr r="0" g="0" b="0"/>
+      </a:fillRef>
+      <a:effectRef idx="0">
+        <a:scrgbClr r="0" g="0" b="0"/>
+      </a:effectRef>
+      <a:fontRef idx="minor"/>
+    </dgm:style>
+  </dgm:styleLbl>
+  <dgm:styleLbl name="fgAcc2">
+    <dgm:scene3d>
+      <a:camera prst="orthographicFront"/>
+      <a:lightRig rig="threePt" dir="t"/>
+    </dgm:scene3d>
+    <dgm:sp3d/>
+    <dgm:txPr/>
+    <dgm:style>
+      <a:lnRef idx="2">
+        <a:scrgbClr r="0" g="0" b="0"/>
+      </a:lnRef>
+      <a:fillRef idx="1">
+        <a:scrgbClr r="0" g="0" b="0"/>
+      </a:fillRef>
+      <a:effectRef idx="0">
+        <a:scrgbClr r="0" g="0" b="0"/>
+      </a:effectRef>
+      <a:fontRef idx="minor"/>
+    </dgm:style>
+  </dgm:styleLbl>
+  <dgm:styleLbl name="fgAcc3">
+    <dgm:scene3d>
+      <a:camera prst="orthographicFront"/>
+      <a:lightRig rig="threePt" dir="t"/>
+    </dgm:scene3d>
+    <dgm:sp3d/>
+    <dgm:txPr/>
+    <dgm:style>
+      <a:lnRef idx="2">
+        <a:scrgbClr r="0" g="0" b="0"/>
+      </a:lnRef>
+      <a:fillRef idx="1">
+        <a:scrgbClr r="0" g="0" b="0"/>
+      </a:fillRef>
+      <a:effectRef idx="0">
+        <a:scrgbClr r="0" g="0" b="0"/>
+      </a:effectRef>
+      <a:fontRef idx="minor"/>
+    </dgm:style>
+  </dgm:styleLbl>
+  <dgm:styleLbl name="fgAcc4">
+    <dgm:scene3d>
+      <a:camera prst="orthographicFront"/>
+      <a:lightRig rig="threePt" dir="t"/>
+    </dgm:scene3d>
+    <dgm:sp3d/>
+    <dgm:txPr/>
+    <dgm:style>
+      <a:lnRef idx="2">
+        <a:scrgbClr r="0" g="0" b="0"/>
+      </a:lnRef>
+      <a:fillRef idx="1">
+        <a:scrgbClr r="0" g="0" b="0"/>
+      </a:fillRef>
+      <a:effectRef idx="0">
+        <a:scrgbClr r="0" g="0" b="0"/>
+      </a:effectRef>
+      <a:fontRef idx="minor"/>
+    </dgm:style>
+  </dgm:styleLbl>
+  <dgm:styleLbl name="bgShp">
+    <dgm:scene3d>
+      <a:camera prst="orthographicFront"/>
+      <a:lightRig rig="threePt" dir="t"/>
+    </dgm:scene3d>
+    <dgm:sp3d/>
+    <dgm:txPr/>
+    <dgm:style>
+      <a:lnRef idx="0">
+        <a:scrgbClr r="0" g="0" b="0"/>
+      </a:lnRef>
+      <a:fillRef idx="1">
+        <a:scrgbClr r="0" g="0" b="0"/>
+      </a:fillRef>
+      <a:effectRef idx="0">
+        <a:scrgbClr r="0" g="0" b="0"/>
+      </a:effectRef>
+      <a:fontRef idx="minor"/>
+    </dgm:style>
+  </dgm:styleLbl>
+  <dgm:styleLbl name="dkBgShp">
+    <dgm:scene3d>
+      <a:camera prst="orthographicFront"/>
+      <a:lightRig rig="threePt" dir="t"/>
+    </dgm:scene3d>
+    <dgm:sp3d/>
+    <dgm:txPr/>
+    <dgm:style>
+      <a:lnRef idx="0">
+        <a:scrgbClr r="0" g="0" b="0"/>
+      </a:lnRef>
+      <a:fillRef idx="1">
+        <a:scrgbClr r="0" g="0" b="0"/>
+      </a:fillRef>
+      <a:effectRef idx="0">
+        <a:scrgbClr r="0" g="0" b="0"/>
+      </a:effectRef>
+      <a:fontRef idx="minor"/>
+    </dgm:style>
+  </dgm:styleLbl>
+  <dgm:styleLbl name="trBgShp">
+    <dgm:scene3d>
+      <a:camera prst="orthographicFront"/>
+      <a:lightRig rig="threePt" dir="t"/>
+    </dgm:scene3d>
+    <dgm:sp3d/>
+    <dgm:txPr/>
+    <dgm:style>
+      <a:lnRef idx="0">
+        <a:scrgbClr r="0" g="0" b="0"/>
+      </a:lnRef>
+      <a:fillRef idx="1">
+        <a:scrgbClr r="0" g="0" b="0"/>
+      </a:fillRef>
+      <a:effectRef idx="0">
+        <a:scrgbClr r="0" g="0" b="0"/>
+      </a:effectRef>
+      <a:fontRef idx="minor"/>
+    </dgm:style>
+  </dgm:styleLbl>
+  <dgm:styleLbl name="fgShp">
+    <dgm:scene3d>
+      <a:camera prst="orthographicFront"/>
+      <a:lightRig rig="threePt" dir="t"/>
+    </dgm:scene3d>
+    <dgm:sp3d/>
+    <dgm:txPr/>
+    <dgm:style>
+      <a:lnRef idx="2">
+        <a:scrgbClr r="0" g="0" b="0"/>
+      </a:lnRef>
+      <a:fillRef idx="1">
+        <a:scrgbClr r="0" g="0" b="0"/>
+      </a:fillRef>
+      <a:effectRef idx="0">
+        <a:scrgbClr r="0" g="0" b="0"/>
+      </a:effectRef>
+      <a:fontRef idx="minor"/>
+    </dgm:style>
+  </dgm:styleLbl>
+  <dgm:styleLbl name="revTx">
+    <dgm:scene3d>
+      <a:camera prst="orthographicFront"/>
+      <a:lightRig rig="threePt" dir="t"/>
+    </dgm:scene3d>
+    <dgm:sp3d/>
+    <dgm:txPr/>
+    <dgm:style>
+      <a:lnRef idx="0">
+        <a:scrgbClr r="0" g="0" b="0"/>
+      </a:lnRef>
+      <a:fillRef idx="0">
+        <a:scrgbClr r="0" g="0" b="0"/>
+      </a:fillRef>
+      <a:effectRef idx="0">
+        <a:scrgbClr r="0" g="0" b="0"/>
+      </a:effectRef>
+      <a:fontRef idx="minor"/>
+    </dgm:style>
+  </dgm:styleLbl>
+</dgm:styleDef>
+</file>
+
+<file path=ppt/diagrams/quickStyle6.xml><?xml version="1.0" encoding="utf-8"?>
 <dgm:styleDef xmlns:dgm="http://schemas.openxmlformats.org/drawingml/2006/diagram" xmlns:a="http://schemas.openxmlformats.org/drawingml/2006/main" uniqueId="urn:microsoft.com/office/officeart/2005/8/quickstyle/simple1">
   <dgm:title val=""/>
   <dgm:desc val=""/>
@@ -14880,7 +17806,7 @@
           <a:p>
             <a:fld id="{839E281F-7CDE-4F73-8735-7E1A231CB69E}" type="datetimeFigureOut">
               <a:rPr lang="en-GB" smtClean="0"/>
-              <a:t>15/01/2019</a:t>
+              <a:t>16/01/2019</a:t>
             </a:fld>
             <a:endParaRPr lang="en-GB"/>
           </a:p>
@@ -15080,7 +18006,7 @@
           <a:p>
             <a:fld id="{839E281F-7CDE-4F73-8735-7E1A231CB69E}" type="datetimeFigureOut">
               <a:rPr lang="en-GB" smtClean="0"/>
-              <a:t>15/01/2019</a:t>
+              <a:t>16/01/2019</a:t>
             </a:fld>
             <a:endParaRPr lang="en-GB"/>
           </a:p>
@@ -15290,7 +18216,7 @@
           <a:p>
             <a:fld id="{839E281F-7CDE-4F73-8735-7E1A231CB69E}" type="datetimeFigureOut">
               <a:rPr lang="en-GB" smtClean="0"/>
-              <a:t>15/01/2019</a:t>
+              <a:t>16/01/2019</a:t>
             </a:fld>
             <a:endParaRPr lang="en-GB"/>
           </a:p>
@@ -15490,7 +18416,7 @@
           <a:p>
             <a:fld id="{839E281F-7CDE-4F73-8735-7E1A231CB69E}" type="datetimeFigureOut">
               <a:rPr lang="en-GB" smtClean="0"/>
-              <a:t>15/01/2019</a:t>
+              <a:t>16/01/2019</a:t>
             </a:fld>
             <a:endParaRPr lang="en-GB"/>
           </a:p>
@@ -15766,7 +18692,7 @@
           <a:p>
             <a:fld id="{839E281F-7CDE-4F73-8735-7E1A231CB69E}" type="datetimeFigureOut">
               <a:rPr lang="en-GB" smtClean="0"/>
-              <a:t>15/01/2019</a:t>
+              <a:t>16/01/2019</a:t>
             </a:fld>
             <a:endParaRPr lang="en-GB"/>
           </a:p>
@@ -16034,7 +18960,7 @@
           <a:p>
             <a:fld id="{839E281F-7CDE-4F73-8735-7E1A231CB69E}" type="datetimeFigureOut">
               <a:rPr lang="en-GB" smtClean="0"/>
-              <a:t>15/01/2019</a:t>
+              <a:t>16/01/2019</a:t>
             </a:fld>
             <a:endParaRPr lang="en-GB"/>
           </a:p>
@@ -16449,7 +19375,7 @@
           <a:p>
             <a:fld id="{839E281F-7CDE-4F73-8735-7E1A231CB69E}" type="datetimeFigureOut">
               <a:rPr lang="en-GB" smtClean="0"/>
-              <a:t>15/01/2019</a:t>
+              <a:t>16/01/2019</a:t>
             </a:fld>
             <a:endParaRPr lang="en-GB"/>
           </a:p>
@@ -16591,7 +19517,7 @@
           <a:p>
             <a:fld id="{839E281F-7CDE-4F73-8735-7E1A231CB69E}" type="datetimeFigureOut">
               <a:rPr lang="en-GB" smtClean="0"/>
-              <a:t>15/01/2019</a:t>
+              <a:t>16/01/2019</a:t>
             </a:fld>
             <a:endParaRPr lang="en-GB"/>
           </a:p>
@@ -16704,7 +19630,7 @@
           <a:p>
             <a:fld id="{839E281F-7CDE-4F73-8735-7E1A231CB69E}" type="datetimeFigureOut">
               <a:rPr lang="en-GB" smtClean="0"/>
-              <a:t>15/01/2019</a:t>
+              <a:t>16/01/2019</a:t>
             </a:fld>
             <a:endParaRPr lang="en-GB"/>
           </a:p>
@@ -17017,7 +19943,7 @@
           <a:p>
             <a:fld id="{839E281F-7CDE-4F73-8735-7E1A231CB69E}" type="datetimeFigureOut">
               <a:rPr lang="en-GB" smtClean="0"/>
-              <a:t>15/01/2019</a:t>
+              <a:t>16/01/2019</a:t>
             </a:fld>
             <a:endParaRPr lang="en-GB"/>
           </a:p>
@@ -17306,7 +20232,7 @@
           <a:p>
             <a:fld id="{839E281F-7CDE-4F73-8735-7E1A231CB69E}" type="datetimeFigureOut">
               <a:rPr lang="en-GB" smtClean="0"/>
-              <a:t>15/01/2019</a:t>
+              <a:t>16/01/2019</a:t>
             </a:fld>
             <a:endParaRPr lang="en-GB"/>
           </a:p>
@@ -17549,7 +20475,7 @@
           <a:p>
             <a:fld id="{839E281F-7CDE-4F73-8735-7E1A231CB69E}" type="datetimeFigureOut">
               <a:rPr lang="en-GB" smtClean="0"/>
-              <a:t>15/01/2019</a:t>
+              <a:t>16/01/2019</a:t>
             </a:fld>
             <a:endParaRPr lang="en-GB"/>
           </a:p>
@@ -18009,6 +20935,220 @@
 </p:sld>
 </file>
 
+<file path=ppt/slides/slide10.xml><?xml version="1.0" encoding="utf-8"?>
+<p:sld xmlns:a="http://schemas.openxmlformats.org/drawingml/2006/main" xmlns:r="http://schemas.openxmlformats.org/officeDocument/2006/relationships" xmlns:p="http://schemas.openxmlformats.org/presentationml/2006/main">
+  <p:cSld>
+    <p:spTree>
+      <p:nvGrpSpPr>
+        <p:cNvPr id="1" name=""/>
+        <p:cNvGrpSpPr/>
+        <p:nvPr/>
+      </p:nvGrpSpPr>
+      <p:grpSpPr>
+        <a:xfrm>
+          <a:off x="0" y="0"/>
+          <a:ext cx="0" cy="0"/>
+          <a:chOff x="0" y="0"/>
+          <a:chExt cx="0" cy="0"/>
+        </a:xfrm>
+      </p:grpSpPr>
+      <p:sp>
+        <p:nvSpPr>
+          <p:cNvPr id="2" name="Título 1">
+            <a:extLst>
+              <a:ext uri="{FF2B5EF4-FFF2-40B4-BE49-F238E27FC236}">
+                <a16:creationId xmlns:a16="http://schemas.microsoft.com/office/drawing/2014/main" id="{0E6A93C4-2B6D-47F9-A852-A9E72406ADEE}"/>
+              </a:ext>
+            </a:extLst>
+          </p:cNvPr>
+          <p:cNvSpPr>
+            <a:spLocks noGrp="1"/>
+          </p:cNvSpPr>
+          <p:nvPr>
+            <p:ph type="title"/>
+          </p:nvPr>
+        </p:nvSpPr>
+        <p:spPr/>
+        <p:txBody>
+          <a:bodyPr/>
+          <a:lstStyle/>
+          <a:p>
+            <a:pPr algn="ctr"/>
+            <a:r>
+              <a:rPr lang="en-GB" dirty="0"/>
+              <a:t>References</a:t>
+            </a:r>
+          </a:p>
+        </p:txBody>
+      </p:sp>
+      <p:sp>
+        <p:nvSpPr>
+          <p:cNvPr id="3" name="Marcador de Posição de Conteúdo 2">
+            <a:extLst>
+              <a:ext uri="{FF2B5EF4-FFF2-40B4-BE49-F238E27FC236}">
+                <a16:creationId xmlns:a16="http://schemas.microsoft.com/office/drawing/2014/main" id="{4C9C7C33-D52C-4AF6-9B16-86F06D4EB004}"/>
+              </a:ext>
+            </a:extLst>
+          </p:cNvPr>
+          <p:cNvSpPr>
+            <a:spLocks noGrp="1"/>
+          </p:cNvSpPr>
+          <p:nvPr>
+            <p:ph idx="1"/>
+          </p:nvPr>
+        </p:nvSpPr>
+        <p:spPr/>
+        <p:txBody>
+          <a:bodyPr/>
+          <a:lstStyle/>
+          <a:p>
+            <a:r>
+              <a:rPr lang="en-GB" sz="1800" dirty="0"/>
+              <a:t>S. Wunderlich, F. Gabriel, S. </a:t>
+            </a:r>
+            <a:r>
+              <a:rPr lang="en-GB" sz="1800" dirty="0" err="1"/>
+              <a:t>Pandi</a:t>
+            </a:r>
+            <a:r>
+              <a:rPr lang="en-GB" sz="1800" dirty="0"/>
+              <a:t>, F. H. P. </a:t>
+            </a:r>
+            <a:r>
+              <a:rPr lang="en-GB" sz="1800" dirty="0" err="1"/>
+              <a:t>Fitzek</a:t>
+            </a:r>
+            <a:r>
+              <a:rPr lang="en-GB" sz="1800" dirty="0"/>
+              <a:t> and M. </a:t>
+            </a:r>
+            <a:r>
+              <a:rPr lang="en-GB" sz="1800" dirty="0" err="1"/>
+              <a:t>Reisslein</a:t>
+            </a:r>
+            <a:r>
+              <a:rPr lang="en-GB" sz="1800" dirty="0"/>
+              <a:t>, "Caterpillar RLNC (CRLNC): A Practical Finite Sliding Window RLNC Approach," in </a:t>
+            </a:r>
+            <a:r>
+              <a:rPr lang="en-GB" sz="1800" i="1" dirty="0"/>
+              <a:t>IEEE Access</a:t>
+            </a:r>
+            <a:r>
+              <a:rPr lang="en-GB" sz="1800" dirty="0"/>
+              <a:t>, vol. 5, pp. 20183-20197, 2017.</a:t>
+            </a:r>
+            <a:br>
+              <a:rPr lang="en-GB" sz="1800" dirty="0"/>
+            </a:br>
+            <a:r>
+              <a:rPr lang="en-GB" sz="1800" dirty="0" err="1"/>
+              <a:t>doi</a:t>
+            </a:r>
+            <a:r>
+              <a:rPr lang="en-GB" sz="1800" dirty="0"/>
+              <a:t>: 10.1109/ACCESS.2017.2757241</a:t>
+            </a:r>
+          </a:p>
+          <a:p>
+            <a:r>
+              <a:rPr lang="en-GB" sz="1800" dirty="0"/>
+              <a:t>M. V. Pedersen, D. E. </a:t>
+            </a:r>
+            <a:r>
+              <a:rPr lang="en-GB" sz="1800" dirty="0" err="1"/>
+              <a:t>Lucani</a:t>
+            </a:r>
+            <a:r>
+              <a:rPr lang="en-GB" sz="1800" dirty="0"/>
+              <a:t>, F. H. P. </a:t>
+            </a:r>
+            <a:r>
+              <a:rPr lang="en-GB" sz="1800" dirty="0" err="1"/>
+              <a:t>Fitzek</a:t>
+            </a:r>
+            <a:r>
+              <a:rPr lang="en-GB" sz="1800" dirty="0"/>
+              <a:t>, C. W. </a:t>
+            </a:r>
+            <a:r>
+              <a:rPr lang="en-GB" sz="1800" dirty="0" err="1"/>
+              <a:t>Sørensen</a:t>
+            </a:r>
+            <a:r>
+              <a:rPr lang="en-GB" sz="1800" dirty="0"/>
+              <a:t> and A. S. </a:t>
+            </a:r>
+            <a:r>
+              <a:rPr lang="en-GB" sz="1800" dirty="0" err="1"/>
+              <a:t>Badr</a:t>
+            </a:r>
+            <a:r>
+              <a:rPr lang="en-GB" sz="1800" dirty="0"/>
+              <a:t>, "Network coding designs suited for the real world: What works, what doesn't, what's promising," </a:t>
+            </a:r>
+            <a:r>
+              <a:rPr lang="en-GB" sz="1800" i="1" dirty="0"/>
+              <a:t>2013 IEEE Information Theory Workshop (ITW)</a:t>
+            </a:r>
+            <a:r>
+              <a:rPr lang="en-GB" sz="1800" dirty="0"/>
+              <a:t>, Sevilla, 2013, pp. 1-5.</a:t>
+            </a:r>
+          </a:p>
+          <a:p>
+            <a:r>
+              <a:rPr lang="en-GB" sz="1800" dirty="0"/>
+              <a:t>Torre R., </a:t>
+            </a:r>
+            <a:r>
+              <a:rPr lang="en-GB" sz="1800" dirty="0" err="1"/>
+              <a:t>Pandi</a:t>
+            </a:r>
+            <a:r>
+              <a:rPr lang="en-GB" sz="1800" dirty="0"/>
+              <a:t> S., </a:t>
+            </a:r>
+            <a:r>
+              <a:rPr lang="en-GB" sz="1800" dirty="0" err="1"/>
+              <a:t>Fitzek</a:t>
+            </a:r>
+            <a:r>
+              <a:rPr lang="en-GB" sz="1800" dirty="0"/>
+              <a:t> F.H.P. (2019) Network-Coded Multigeneration Protocols in Heterogeneous Cellular Networks. In: </a:t>
+            </a:r>
+            <a:r>
+              <a:rPr lang="en-GB" sz="1800" dirty="0" err="1"/>
+              <a:t>Sucasas</a:t>
+            </a:r>
+            <a:r>
+              <a:rPr lang="en-GB" sz="1800" dirty="0"/>
+              <a:t> V., Mantas G., </a:t>
+            </a:r>
+            <a:r>
+              <a:rPr lang="en-GB" sz="1800" dirty="0" err="1"/>
+              <a:t>Althunibat</a:t>
+            </a:r>
+            <a:r>
+              <a:rPr lang="en-GB" sz="1800" dirty="0"/>
+              <a:t> S. (eds) Broadband Communications, Networks, and Systems. BROADNETS 2018. Lecture Notes of the Institute for Computer Sciences, Social Informatics and Telecommunications Engineering, vol 263. Springer, Cham</a:t>
+            </a:r>
+          </a:p>
+        </p:txBody>
+      </p:sp>
+    </p:spTree>
+    <p:extLst>
+      <p:ext uri="{BB962C8B-B14F-4D97-AF65-F5344CB8AC3E}">
+        <p14:creationId xmlns:p14="http://schemas.microsoft.com/office/powerpoint/2010/main" val="1297826209"/>
+      </p:ext>
+    </p:extLst>
+  </p:cSld>
+  <p:clrMapOvr>
+    <a:masterClrMapping/>
+  </p:clrMapOvr>
+</p:sld>
+</file>
+
 <file path=ppt/slides/slide2.xml><?xml version="1.0" encoding="utf-8"?>
 <p:sld xmlns:a="http://schemas.openxmlformats.org/drawingml/2006/main" xmlns:r="http://schemas.openxmlformats.org/officeDocument/2006/relationships" xmlns:p="http://schemas.openxmlformats.org/presentationml/2006/main">
   <p:cSld>
@@ -18293,7 +21433,7 @@
         <p:spPr>
           <a:xfrm>
             <a:off x="4902444" y="172054"/>
-            <a:ext cx="6631912" cy="6186309"/>
+            <a:ext cx="6631912" cy="5355312"/>
           </a:xfrm>
           <a:prstGeom prst="rect">
             <a:avLst/>
@@ -18312,11 +21452,11 @@
             </a:r>
           </a:p>
           <a:p>
-            <a:endParaRPr lang="en-GB" dirty="0"/>
+            <a:endParaRPr lang="en-GB" b="1" dirty="0"/>
           </a:p>
           <a:p>
             <a:r>
-              <a:rPr lang="en-GB" dirty="0"/>
+              <a:rPr lang="en-GB" b="1" dirty="0"/>
               <a:t>Core objective:</a:t>
             </a:r>
           </a:p>
@@ -18370,6 +21510,26 @@
             </a:r>
           </a:p>
           <a:p>
+            <a:pPr marL="1257300" lvl="2" indent="-342900">
+              <a:buFont typeface="Arial" panose="020B0604020202020204" pitchFamily="34" charset="0"/>
+              <a:buChar char="•"/>
+            </a:pPr>
+            <a:r>
+              <a:rPr lang="en-GB" dirty="0"/>
+              <a:t>No loops, can’t iterate over registers</a:t>
+            </a:r>
+          </a:p>
+          <a:p>
+            <a:pPr marL="1257300" lvl="2" indent="-342900">
+              <a:buFont typeface="Arial" panose="020B0604020202020204" pitchFamily="34" charset="0"/>
+              <a:buChar char="•"/>
+            </a:pPr>
+            <a:r>
+              <a:rPr lang="en-GB" dirty="0"/>
+              <a:t>No way to efficiently fetch the necessary symbols</a:t>
+            </a:r>
+          </a:p>
+          <a:p>
             <a:endParaRPr lang="en-GB" dirty="0"/>
           </a:p>
           <a:p>
@@ -18407,36 +21567,6 @@
               <a:rPr lang="en-GB" dirty="0"/>
               <a:t>Limit the number of symbols that can be buffered at the same time</a:t>
             </a:r>
-          </a:p>
-          <a:p>
-            <a:pPr marL="342900" indent="-342900">
-              <a:buFont typeface="+mj-lt"/>
-              <a:buAutoNum type="arabicPeriod"/>
-            </a:pPr>
-            <a:endParaRPr lang="en-GB" dirty="0"/>
-          </a:p>
-          <a:p>
-            <a:r>
-              <a:rPr lang="en-GB" dirty="0"/>
-              <a:t>Implementation:</a:t>
-            </a:r>
-          </a:p>
-          <a:p>
-            <a:pPr marL="742950" lvl="1" indent="-285750">
-              <a:buFont typeface="Arial" panose="020B0604020202020204" pitchFamily="34" charset="0"/>
-              <a:buChar char="•"/>
-            </a:pPr>
-            <a:r>
-              <a:rPr lang="en-GB" dirty="0"/>
-              <a:t>Through the use of registers it’s possible to store the symbols in the switch.</a:t>
-            </a:r>
-          </a:p>
-          <a:p>
-            <a:pPr marL="742950" lvl="1" indent="-285750">
-              <a:buFont typeface="Arial" panose="020B0604020202020204" pitchFamily="34" charset="0"/>
-              <a:buChar char="•"/>
-            </a:pPr>
-            <a:endParaRPr lang="en-GB" dirty="0"/>
           </a:p>
         </p:txBody>
       </p:sp>
@@ -18504,11 +21634,11 @@
             </a:r>
           </a:p>
           <a:p>
-            <a:endParaRPr lang="en-GB" dirty="0"/>
+            <a:endParaRPr lang="en-GB" b="1" dirty="0"/>
           </a:p>
           <a:p>
             <a:r>
-              <a:rPr lang="en-GB" dirty="0"/>
+              <a:rPr lang="en-GB" b="1" dirty="0"/>
               <a:t>Core objective:</a:t>
             </a:r>
           </a:p>
@@ -18523,100 +21653,109 @@
             </a:r>
           </a:p>
           <a:p>
-            <a:endParaRPr lang="en-GB" dirty="0"/>
+            <a:endParaRPr lang="en-GB" b="1" dirty="0"/>
           </a:p>
           <a:p>
             <a:r>
-              <a:rPr lang="en-GB" dirty="0"/>
-              <a:t>Challenges:</a:t>
+              <a:rPr lang="en-GB" b="1" dirty="0"/>
+              <a:t>Design Choice N.º1 – Choosing the type of RLNC:</a:t>
             </a:r>
           </a:p>
           <a:p>
-            <a:pPr marL="800100" lvl="1" indent="-342900">
-              <a:buFont typeface="+mj-lt"/>
-              <a:buAutoNum type="arabicPeriod"/>
-            </a:pPr>
-            <a:r>
-              <a:rPr lang="en-GB" dirty="0"/>
-              <a:t>Defining important parameters</a:t>
-            </a:r>
-          </a:p>
-          <a:p>
-            <a:pPr marL="1257300" lvl="2" indent="-342900">
+            <a:pPr marL="742950" lvl="1" indent="-285750">
               <a:buFont typeface="Arial" panose="020B0604020202020204" pitchFamily="34" charset="0"/>
               <a:buChar char="•"/>
             </a:pPr>
             <a:r>
               <a:rPr lang="en-GB" dirty="0"/>
-              <a:t>Finite Field Size</a:t>
+              <a:t>Generation based RLNC</a:t>
             </a:r>
           </a:p>
           <a:p>
-            <a:pPr marL="1257300" lvl="2" indent="-342900">
+            <a:pPr marL="1200150" lvl="2" indent="-285750">
               <a:buFont typeface="Arial" panose="020B0604020202020204" pitchFamily="34" charset="0"/>
               <a:buChar char="•"/>
             </a:pPr>
             <a:r>
               <a:rPr lang="en-GB" dirty="0"/>
-              <a:t>Generation Size</a:t>
+              <a:t>More common</a:t>
             </a:r>
           </a:p>
           <a:p>
-            <a:pPr marL="1257300" lvl="2" indent="-342900">
+            <a:pPr marL="1200150" lvl="2" indent="-285750">
               <a:buFont typeface="Arial" panose="020B0604020202020204" pitchFamily="34" charset="0"/>
               <a:buChar char="•"/>
             </a:pPr>
             <a:r>
               <a:rPr lang="en-GB" dirty="0"/>
-              <a:t>Symbol Size</a:t>
+              <a:t>High in-order delivery delay</a:t>
             </a:r>
           </a:p>
           <a:p>
-            <a:pPr marL="800100" lvl="1" indent="-342900">
-              <a:buFont typeface="+mj-lt"/>
-              <a:buAutoNum type="arabicPeriod"/>
+            <a:pPr marL="1200150" lvl="2" indent="-285750">
+              <a:buFont typeface="Arial" panose="020B0604020202020204" pitchFamily="34" charset="0"/>
+              <a:buChar char="•"/>
             </a:pPr>
             <a:r>
               <a:rPr lang="en-GB" dirty="0"/>
-              <a:t>Deciding on which type of RLNC to implement, such as Generation based RLNC or Sliding Window RLNC</a:t>
+              <a:t>Multiple approaches to implement this (e.g. multigeneration, </a:t>
             </a:r>
           </a:p>
           <a:p>
-            <a:pPr marL="285750" indent="-285750">
+            <a:pPr marL="1200150" lvl="2" indent="-285750">
+              <a:buFont typeface="Arial" panose="020B0604020202020204" pitchFamily="34" charset="0"/>
+              <a:buChar char="•"/>
+            </a:pPr>
+            <a:r>
+              <a:rPr lang="en-GB" dirty="0"/>
+              <a:t>Need to create generations</a:t>
+            </a:r>
+          </a:p>
+          <a:p>
+            <a:pPr marL="742950" lvl="1" indent="-285750">
               <a:buFont typeface="Arial" panose="020B0604020202020204" pitchFamily="34" charset="0"/>
               <a:buChar char="•"/>
             </a:pPr>
             <a:endParaRPr lang="en-GB" dirty="0"/>
           </a:p>
           <a:p>
-            <a:r>
-              <a:rPr lang="en-GB" dirty="0"/>
-              <a:t>Solutions:</a:t>
-            </a:r>
-            <a:endParaRPr lang="en-GB" dirty="0">
-              <a:solidFill>
-                <a:prstClr val="black"/>
-              </a:solidFill>
-            </a:endParaRPr>
-          </a:p>
-          <a:p>
-            <a:pPr marL="800100" lvl="1" indent="-342900">
-              <a:buFont typeface="+mj-lt"/>
-              <a:buAutoNum type="arabicPeriod"/>
+            <a:pPr marL="742950" lvl="1" indent="-285750">
+              <a:buFont typeface="Arial" panose="020B0604020202020204" pitchFamily="34" charset="0"/>
+              <a:buChar char="•"/>
             </a:pPr>
             <a:r>
               <a:rPr lang="en-GB" dirty="0"/>
-              <a:t>Depends on the capabilities of the device, memory available, computation power.</a:t>
+              <a:t>Sliding Window RLNC</a:t>
             </a:r>
           </a:p>
           <a:p>
-            <a:pPr marL="800100" lvl="1" indent="-342900">
-              <a:buFont typeface="+mj-lt"/>
-              <a:buAutoNum type="arabicPeriod"/>
+            <a:pPr marL="1200150" lvl="2" indent="-285750">
+              <a:buFont typeface="Arial" panose="020B0604020202020204" pitchFamily="34" charset="0"/>
+              <a:buChar char="•"/>
             </a:pPr>
             <a:r>
               <a:rPr lang="en-GB" dirty="0"/>
-              <a:t>???</a:t>
+              <a:t>Newer approach to RLNC</a:t>
+            </a:r>
+          </a:p>
+          <a:p>
+            <a:pPr marL="1200150" lvl="2" indent="-285750">
+              <a:buFont typeface="Arial" panose="020B0604020202020204" pitchFamily="34" charset="0"/>
+              <a:buChar char="•"/>
+            </a:pPr>
+            <a:r>
+              <a:rPr lang="en-GB" dirty="0"/>
+              <a:t>Good for streaming applications</a:t>
+            </a:r>
+          </a:p>
+          <a:p>
+            <a:pPr marL="1200150" lvl="2" indent="-285750">
+              <a:buFont typeface="Arial" panose="020B0604020202020204" pitchFamily="34" charset="0"/>
+              <a:buChar char="•"/>
+            </a:pPr>
+            <a:r>
+              <a:rPr lang="en-GB" dirty="0"/>
+              <a:t>Low in-order delivery delay</a:t>
             </a:r>
           </a:p>
           <a:p>
@@ -18685,6 +21824,342 @@
           <a:chExt cx="0" cy="0"/>
         </a:xfrm>
       </p:grpSpPr>
+      <mc:AlternateContent xmlns:mc="http://schemas.openxmlformats.org/markup-compatibility/2006" xmlns:a14="http://schemas.microsoft.com/office/drawing/2010/main">
+        <mc:Choice Requires="a14">
+          <p:sp>
+            <p:nvSpPr>
+              <p:cNvPr id="5" name="CaixaDeTexto 4">
+                <a:extLst>
+                  <a:ext uri="{FF2B5EF4-FFF2-40B4-BE49-F238E27FC236}">
+                    <a16:creationId xmlns:a16="http://schemas.microsoft.com/office/drawing/2014/main" id="{547FF68E-F3C3-4728-B680-92534E6BF88A}"/>
+                  </a:ext>
+                </a:extLst>
+              </p:cNvPr>
+              <p:cNvSpPr txBox="1"/>
+              <p:nvPr/>
+            </p:nvSpPr>
+            <p:spPr>
+              <a:xfrm>
+                <a:off x="4973480" y="0"/>
+                <a:ext cx="6631912" cy="5078313"/>
+              </a:xfrm>
+              <a:prstGeom prst="rect">
+                <a:avLst/>
+              </a:prstGeom>
+              <a:noFill/>
+            </p:spPr>
+            <p:txBody>
+              <a:bodyPr wrap="square" rtlCol="0">
+                <a:spAutoFit/>
+              </a:bodyPr>
+              <a:lstStyle/>
+              <a:p>
+                <a:r>
+                  <a:rPr lang="en-GB" b="1" dirty="0"/>
+                  <a:t>Network Coding Module</a:t>
+                </a:r>
+              </a:p>
+              <a:p>
+                <a:endParaRPr lang="en-GB" b="1" dirty="0"/>
+              </a:p>
+              <a:p>
+                <a:r>
+                  <a:rPr lang="en-GB" b="1" dirty="0"/>
+                  <a:t>Design Choice N.º2 – Defining the parameters</a:t>
+                </a:r>
+              </a:p>
+              <a:p>
+                <a:pPr marL="800100" lvl="1" indent="-342900">
+                  <a:buFont typeface="Arial" panose="020B0604020202020204" pitchFamily="34" charset="0"/>
+                  <a:buChar char="•"/>
+                </a:pPr>
+                <a:r>
+                  <a:rPr lang="en-GB" dirty="0"/>
+                  <a:t>Finite Field Size</a:t>
+                </a:r>
+              </a:p>
+              <a:p>
+                <a:pPr marL="1200150" lvl="2" indent="-285750">
+                  <a:buFont typeface="Arial" panose="020B0604020202020204" pitchFamily="34" charset="0"/>
+                  <a:buChar char="•"/>
+                </a:pPr>
+                <a:r>
+                  <a:rPr lang="en-GB" dirty="0"/>
+                  <a:t>Large field</a:t>
+                </a:r>
+              </a:p>
+              <a:p>
+                <a:pPr marL="1657350" lvl="3" indent="-285750">
+                  <a:buFont typeface="Arial" panose="020B0604020202020204" pitchFamily="34" charset="0"/>
+                  <a:buChar char="•"/>
+                </a:pPr>
+                <a:r>
+                  <a:rPr lang="en-GB" dirty="0"/>
+                  <a:t>Lower risk of linearly dependent packets</a:t>
+                </a:r>
+              </a:p>
+              <a:p>
+                <a:pPr marL="1657350" lvl="3" indent="-285750">
+                  <a:buFont typeface="Arial" panose="020B0604020202020204" pitchFamily="34" charset="0"/>
+                  <a:buChar char="•"/>
+                </a:pPr>
+                <a:r>
+                  <a:rPr lang="en-GB" dirty="0"/>
+                  <a:t>Increased implementation complexity</a:t>
+                </a:r>
+              </a:p>
+              <a:p>
+                <a:pPr marL="1200150" lvl="2" indent="-285750">
+                  <a:buFont typeface="Arial" panose="020B0604020202020204" pitchFamily="34" charset="0"/>
+                  <a:buChar char="•"/>
+                </a:pPr>
+                <a:r>
+                  <a:rPr lang="en-GB" dirty="0"/>
+                  <a:t>Small Field</a:t>
+                </a:r>
+              </a:p>
+              <a:p>
+                <a:pPr marL="1657350" lvl="3" indent="-285750">
+                  <a:buFont typeface="Arial" panose="020B0604020202020204" pitchFamily="34" charset="0"/>
+                  <a:buChar char="•"/>
+                </a:pPr>
+                <a:r>
+                  <a:rPr lang="en-GB" dirty="0"/>
+                  <a:t>Higher risk of linearly dependent packets</a:t>
+                </a:r>
+              </a:p>
+              <a:p>
+                <a:pPr marL="1657350" lvl="3" indent="-285750">
+                  <a:buFont typeface="Arial" panose="020B0604020202020204" pitchFamily="34" charset="0"/>
+                  <a:buChar char="•"/>
+                </a:pPr>
+                <a:r>
+                  <a:rPr lang="en-GB" dirty="0"/>
+                  <a:t>Lower implementation complexity</a:t>
+                </a:r>
+              </a:p>
+              <a:p>
+                <a:pPr marL="1200150" lvl="2" indent="-285750">
+                  <a:buFont typeface="Arial" panose="020B0604020202020204" pitchFamily="34" charset="0"/>
+                  <a:buChar char="•"/>
+                </a:pPr>
+                <a14:m>
+                  <m:oMath xmlns:m="http://schemas.openxmlformats.org/officeDocument/2006/math">
+                    <m:r>
+                      <a:rPr lang="en-GB" b="0" i="1" smtClean="0">
+                        <a:latin typeface="Cambria Math" panose="02040503050406030204" pitchFamily="18" charset="0"/>
+                      </a:rPr>
+                      <m:t>𝐺𝐹</m:t>
+                    </m:r>
+                    <m:d>
+                      <m:dPr>
+                        <m:ctrlPr>
+                          <a:rPr lang="en-GB" b="0" i="1" smtClean="0">
+                            <a:latin typeface="Cambria Math" panose="02040503050406030204" pitchFamily="18" charset="0"/>
+                          </a:rPr>
+                        </m:ctrlPr>
+                      </m:dPr>
+                      <m:e>
+                        <m:sSup>
+                          <m:sSupPr>
+                            <m:ctrlPr>
+                              <a:rPr lang="en-GB" i="1" smtClean="0">
+                                <a:latin typeface="Cambria Math" panose="02040503050406030204" pitchFamily="18" charset="0"/>
+                              </a:rPr>
+                            </m:ctrlPr>
+                          </m:sSupPr>
+                          <m:e>
+                            <m:r>
+                              <a:rPr lang="en-GB" b="0" i="1" smtClean="0">
+                                <a:latin typeface="Cambria Math" panose="02040503050406030204" pitchFamily="18" charset="0"/>
+                              </a:rPr>
+                              <m:t>2</m:t>
+                            </m:r>
+                          </m:e>
+                          <m:sup>
+                            <m:r>
+                              <a:rPr lang="en-GB" b="0" i="1" smtClean="0">
+                                <a:latin typeface="Cambria Math" panose="02040503050406030204" pitchFamily="18" charset="0"/>
+                              </a:rPr>
+                              <m:t>8</m:t>
+                            </m:r>
+                          </m:sup>
+                        </m:sSup>
+                      </m:e>
+                    </m:d>
+                  </m:oMath>
+                </a14:m>
+                <a:r>
+                  <a:rPr lang="en-GB" b="0" dirty="0"/>
+                  <a:t>, is the most commonly used.</a:t>
+                </a:r>
+              </a:p>
+              <a:p>
+                <a:pPr marL="1257300" lvl="2" indent="-342900">
+                  <a:buFont typeface="Wingdings" panose="05000000000000000000" pitchFamily="2" charset="2"/>
+                  <a:buChar char="Ø"/>
+                </a:pPr>
+                <a:endParaRPr lang="en-GB" dirty="0"/>
+              </a:p>
+              <a:p>
+                <a:pPr marL="1714500" lvl="3" indent="-342900">
+                  <a:buFont typeface="Wingdings" panose="05000000000000000000" pitchFamily="2" charset="2"/>
+                  <a:buChar char="Ø"/>
+                </a:pPr>
+                <a:endParaRPr lang="en-GB" dirty="0"/>
+              </a:p>
+              <a:p>
+                <a:pPr marL="800100" lvl="1" indent="-342900">
+                  <a:buFont typeface="Arial" panose="020B0604020202020204" pitchFamily="34" charset="0"/>
+                  <a:buChar char="•"/>
+                </a:pPr>
+                <a:r>
+                  <a:rPr lang="en-GB" dirty="0"/>
+                  <a:t>Generation Size – How many packets are coded together:</a:t>
+                </a:r>
+              </a:p>
+              <a:p>
+                <a:pPr marL="1200150" lvl="2" indent="-285750">
+                  <a:buFont typeface="Arial" panose="020B0604020202020204" pitchFamily="34" charset="0"/>
+                  <a:buChar char="•"/>
+                </a:pPr>
+                <a:r>
+                  <a:rPr lang="en-GB" dirty="0"/>
+                  <a:t>Large Generations Sizes </a:t>
+                </a:r>
+              </a:p>
+              <a:p>
+                <a:pPr marL="1657350" lvl="3" indent="-285750">
+                  <a:buFont typeface="Arial" panose="020B0604020202020204" pitchFamily="34" charset="0"/>
+                  <a:buChar char="•"/>
+                </a:pPr>
+                <a:r>
+                  <a:rPr lang="en-GB" dirty="0"/>
+                  <a:t>Higher Delay/Throughput/Complexity</a:t>
+                </a:r>
+              </a:p>
+              <a:p>
+                <a:pPr marL="1200150" lvl="2" indent="-285750">
+                  <a:buFont typeface="Arial" panose="020B0604020202020204" pitchFamily="34" charset="0"/>
+                  <a:buChar char="•"/>
+                </a:pPr>
+                <a:r>
+                  <a:rPr lang="en-GB" dirty="0"/>
+                  <a:t>Small Generation Sizes</a:t>
+                </a:r>
+              </a:p>
+              <a:p>
+                <a:pPr marL="1657350" lvl="3" indent="-285750">
+                  <a:buFont typeface="Arial" panose="020B0604020202020204" pitchFamily="34" charset="0"/>
+                  <a:buChar char="•"/>
+                </a:pPr>
+                <a:r>
+                  <a:rPr lang="en-GB" dirty="0"/>
+                  <a:t>Lower Delay/Throughput/Complexity	</a:t>
+                </a:r>
+              </a:p>
+            </p:txBody>
+          </p:sp>
+        </mc:Choice>
+        <mc:Fallback xmlns="">
+          <p:sp>
+            <p:nvSpPr>
+              <p:cNvPr id="5" name="CaixaDeTexto 4">
+                <a:extLst>
+                  <a:ext uri="{FF2B5EF4-FFF2-40B4-BE49-F238E27FC236}">
+                    <a16:creationId xmlns:a16="http://schemas.microsoft.com/office/drawing/2014/main" id="{547FF68E-F3C3-4728-B680-92534E6BF88A}"/>
+                  </a:ext>
+                </a:extLst>
+              </p:cNvPr>
+              <p:cNvSpPr txBox="1">
+                <a:spLocks noRot="1" noChangeAspect="1" noMove="1" noResize="1" noEditPoints="1" noAdjustHandles="1" noChangeArrowheads="1" noChangeShapeType="1" noTextEdit="1"/>
+              </p:cNvSpPr>
+              <p:nvPr/>
+            </p:nvSpPr>
+            <p:spPr>
+              <a:xfrm>
+                <a:off x="4973480" y="0"/>
+                <a:ext cx="6631912" cy="5078313"/>
+              </a:xfrm>
+              <a:prstGeom prst="rect">
+                <a:avLst/>
+              </a:prstGeom>
+              <a:blipFill>
+                <a:blip r:embed="rId8"/>
+                <a:stretch>
+                  <a:fillRect l="-827" t="-600" b="-960"/>
+                </a:stretch>
+              </a:blipFill>
+            </p:spPr>
+            <p:txBody>
+              <a:bodyPr/>
+              <a:lstStyle/>
+              <a:p>
+                <a:r>
+                  <a:rPr lang="en-GB">
+                    <a:noFill/>
+                  </a:rPr>
+                  <a:t> </a:t>
+                </a:r>
+              </a:p>
+            </p:txBody>
+          </p:sp>
+        </mc:Fallback>
+      </mc:AlternateContent>
+      <p:graphicFrame>
+        <p:nvGraphicFramePr>
+          <p:cNvPr id="6" name="Diagrama 5">
+            <a:extLst>
+              <a:ext uri="{FF2B5EF4-FFF2-40B4-BE49-F238E27FC236}">
+                <a16:creationId xmlns:a16="http://schemas.microsoft.com/office/drawing/2014/main" id="{33C2828A-52BE-494E-A62D-B97B70AC74D3}"/>
+              </a:ext>
+            </a:extLst>
+          </p:cNvPr>
+          <p:cNvGraphicFramePr/>
+          <p:nvPr>
+            <p:extLst/>
+          </p:nvPr>
+        </p:nvGraphicFramePr>
+        <p:xfrm>
+          <a:off x="-269404" y="1113895"/>
+          <a:ext cx="5616575" cy="4630209"/>
+        </p:xfrm>
+        <a:graphic>
+          <a:graphicData uri="http://schemas.openxmlformats.org/drawingml/2006/diagram">
+            <dgm:relIds xmlns:dgm="http://schemas.openxmlformats.org/drawingml/2006/diagram" xmlns:r="http://schemas.openxmlformats.org/officeDocument/2006/relationships" r:dm="rId9" r:lo="rId10" r:qs="rId11" r:cs="rId12"/>
+          </a:graphicData>
+        </a:graphic>
+      </p:graphicFrame>
+    </p:spTree>
+    <p:extLst>
+      <p:ext uri="{BB962C8B-B14F-4D97-AF65-F5344CB8AC3E}">
+        <p14:creationId xmlns:p14="http://schemas.microsoft.com/office/powerpoint/2010/main" val="1474242212"/>
+      </p:ext>
+    </p:extLst>
+  </p:cSld>
+  <p:clrMapOvr>
+    <a:masterClrMapping/>
+  </p:clrMapOvr>
+</p:sld>
+</file>
+
+<file path=ppt/slides/slide6.xml><?xml version="1.0" encoding="utf-8"?>
+<p:sld xmlns:a="http://schemas.openxmlformats.org/drawingml/2006/main" xmlns:r="http://schemas.openxmlformats.org/officeDocument/2006/relationships" xmlns:p="http://schemas.openxmlformats.org/presentationml/2006/main">
+  <p:cSld>
+    <p:spTree>
+      <p:nvGrpSpPr>
+        <p:cNvPr id="1" name=""/>
+        <p:cNvGrpSpPr/>
+        <p:nvPr/>
+      </p:nvGrpSpPr>
+      <p:grpSpPr>
+        <a:xfrm>
+          <a:off x="0" y="0"/>
+          <a:ext cx="0" cy="0"/>
+          <a:chOff x="0" y="0"/>
+          <a:chExt cx="0" cy="0"/>
+        </a:xfrm>
+      </p:grpSpPr>
       <p:graphicFrame>
         <p:nvGraphicFramePr>
           <p:cNvPr id="4" name="Diagrama 3">
@@ -18698,7 +22173,7 @@
           <p:nvPr>
             <p:extLst>
               <p:ext uri="{D42A27DB-BD31-4B8C-83A1-F6EECF244321}">
-                <p14:modId xmlns:p14="http://schemas.microsoft.com/office/powerpoint/2010/main" val="2116154038"/>
+                <p14:modId xmlns:p14="http://schemas.microsoft.com/office/powerpoint/2010/main" val="3027622992"/>
               </p:ext>
             </p:extLst>
           </p:nvPr>
@@ -18713,164 +22188,352 @@
           </a:graphicData>
         </a:graphic>
       </p:graphicFrame>
-      <p:sp>
-        <p:nvSpPr>
-          <p:cNvPr id="5" name="CaixaDeTexto 4">
-            <a:extLst>
-              <a:ext uri="{FF2B5EF4-FFF2-40B4-BE49-F238E27FC236}">
-                <a16:creationId xmlns:a16="http://schemas.microsoft.com/office/drawing/2014/main" id="{C1A77EF9-8DC4-404B-9D49-89056F314C9E}"/>
-              </a:ext>
-            </a:extLst>
-          </p:cNvPr>
-          <p:cNvSpPr txBox="1"/>
-          <p:nvPr/>
-        </p:nvSpPr>
-        <p:spPr>
-          <a:xfrm>
-            <a:off x="5347171" y="403166"/>
-            <a:ext cx="6631912" cy="6186309"/>
-          </a:xfrm>
-          <a:prstGeom prst="rect">
-            <a:avLst/>
-          </a:prstGeom>
-          <a:noFill/>
-        </p:spPr>
-        <p:txBody>
-          <a:bodyPr wrap="square" rtlCol="0">
-            <a:spAutoFit/>
-          </a:bodyPr>
-          <a:lstStyle/>
-          <a:p>
-            <a:r>
-              <a:rPr lang="en-GB" b="1" dirty="0"/>
-              <a:t>Coding Submodule</a:t>
-            </a:r>
-          </a:p>
-          <a:p>
-            <a:endParaRPr lang="en-GB" dirty="0"/>
-          </a:p>
-          <a:p>
-            <a:r>
-              <a:rPr lang="en-GB" dirty="0"/>
-              <a:t>Main functions:</a:t>
-            </a:r>
-          </a:p>
-          <a:p>
-            <a:pPr marL="742950" lvl="1" indent="-285750">
-              <a:buFont typeface="Arial" panose="020B0604020202020204" pitchFamily="34" charset="0"/>
-              <a:buChar char="•"/>
-            </a:pPr>
-            <a:r>
-              <a:rPr lang="en-GB" dirty="0"/>
-              <a:t>To code original symbols and generate enough coded symbols for the decoding process.</a:t>
-            </a:r>
-          </a:p>
-          <a:p>
-            <a:pPr marL="742950" lvl="1" indent="-285750">
-              <a:buFont typeface="Arial" panose="020B0604020202020204" pitchFamily="34" charset="0"/>
-              <a:buChar char="•"/>
-            </a:pPr>
-            <a:r>
-              <a:rPr lang="en-GB" dirty="0"/>
-              <a:t>To generate random coefficients.</a:t>
-            </a:r>
-          </a:p>
-          <a:p>
-            <a:pPr marL="742950" lvl="1" indent="-285750">
-              <a:buFont typeface="Arial" panose="020B0604020202020204" pitchFamily="34" charset="0"/>
-              <a:buChar char="•"/>
-            </a:pPr>
-            <a:r>
-              <a:rPr lang="en-GB" dirty="0"/>
-              <a:t>To perform the required linear combinations.</a:t>
-            </a:r>
-          </a:p>
-          <a:p>
-            <a:endParaRPr lang="en-GB" dirty="0"/>
-          </a:p>
-          <a:p>
-            <a:r>
-              <a:rPr lang="en-GB" dirty="0"/>
-              <a:t>Challenges:</a:t>
-            </a:r>
-          </a:p>
-          <a:p>
-            <a:pPr marL="800100" lvl="1" indent="-342900">
-              <a:buFont typeface="+mj-lt"/>
-              <a:buAutoNum type="arabicPeriod"/>
-            </a:pPr>
-            <a:r>
-              <a:rPr lang="en-GB" dirty="0"/>
-              <a:t>Performing multiplication</a:t>
-            </a:r>
-          </a:p>
-          <a:p>
-            <a:pPr marL="800100" lvl="1" indent="-342900">
-              <a:buFont typeface="+mj-lt"/>
-              <a:buAutoNum type="arabicPeriod"/>
-            </a:pPr>
-            <a:r>
-              <a:rPr lang="en-GB" dirty="0"/>
-              <a:t>Handling arithmetic operations with a large number of symbols and coefficients leads to a more complex computation.</a:t>
-            </a:r>
-          </a:p>
-          <a:p>
-            <a:r>
-              <a:rPr lang="en-GB" dirty="0"/>
-              <a:t> </a:t>
-            </a:r>
-          </a:p>
-          <a:p>
-            <a:r>
-              <a:rPr lang="en-GB" dirty="0"/>
-              <a:t>Solutions:</a:t>
-            </a:r>
-          </a:p>
-          <a:p>
-            <a:pPr marL="800100" lvl="1" indent="-342900">
-              <a:buFont typeface="+mj-lt"/>
-              <a:buAutoNum type="arabicPeriod"/>
-            </a:pPr>
-            <a:r>
-              <a:rPr lang="en-GB" dirty="0"/>
-              <a:t>Use lookup tables for multiplication</a:t>
-            </a:r>
-          </a:p>
-          <a:p>
-            <a:pPr marL="800100" lvl="1" indent="-342900">
-              <a:buFont typeface="+mj-lt"/>
-              <a:buAutoNum type="arabicPeriod"/>
-            </a:pPr>
-            <a:r>
-              <a:rPr lang="en-GB" dirty="0"/>
-              <a:t>???</a:t>
-            </a:r>
-          </a:p>
-          <a:p>
-            <a:pPr lvl="1"/>
-            <a:endParaRPr lang="en-GB" dirty="0"/>
-          </a:p>
-          <a:p>
-            <a:r>
-              <a:rPr lang="en-GB" dirty="0"/>
-              <a:t>Implementation:</a:t>
-            </a:r>
-          </a:p>
-          <a:p>
-            <a:pPr marL="742950" lvl="1" indent="-285750">
-              <a:buFont typeface="Arial" panose="020B0604020202020204" pitchFamily="34" charset="0"/>
-              <a:buChar char="•"/>
-            </a:pPr>
-            <a:r>
-              <a:rPr lang="en-GB" dirty="0"/>
-              <a:t>Through the use of clone() we can generate as many packets as necessary</a:t>
-            </a:r>
-          </a:p>
-          <a:p>
-            <a:endParaRPr lang="en-GB" dirty="0"/>
-          </a:p>
-        </p:txBody>
-      </p:sp>
+      <mc:AlternateContent xmlns:mc="http://schemas.openxmlformats.org/markup-compatibility/2006">
+        <mc:Choice xmlns:a14="http://schemas.microsoft.com/office/drawing/2010/main" Requires="a14">
+          <p:sp>
+            <p:nvSpPr>
+              <p:cNvPr id="5" name="CaixaDeTexto 4">
+                <a:extLst>
+                  <a:ext uri="{FF2B5EF4-FFF2-40B4-BE49-F238E27FC236}">
+                    <a16:creationId xmlns:a16="http://schemas.microsoft.com/office/drawing/2014/main" id="{C1A77EF9-8DC4-404B-9D49-89056F314C9E}"/>
+                  </a:ext>
+                </a:extLst>
+              </p:cNvPr>
+              <p:cNvSpPr txBox="1"/>
+              <p:nvPr/>
+            </p:nvSpPr>
+            <p:spPr>
+              <a:xfrm>
+                <a:off x="5265891" y="0"/>
+                <a:ext cx="6631912" cy="7848302"/>
+              </a:xfrm>
+              <a:prstGeom prst="rect">
+                <a:avLst/>
+              </a:prstGeom>
+              <a:noFill/>
+            </p:spPr>
+            <p:txBody>
+              <a:bodyPr wrap="square" rtlCol="0">
+                <a:spAutoFit/>
+              </a:bodyPr>
+              <a:lstStyle/>
+              <a:p>
+                <a:r>
+                  <a:rPr lang="en-GB" b="1" dirty="0"/>
+                  <a:t>Coding Submodule</a:t>
+                </a:r>
+              </a:p>
+              <a:p>
+                <a:endParaRPr lang="en-GB" dirty="0"/>
+              </a:p>
+              <a:p>
+                <a:r>
+                  <a:rPr lang="en-GB" b="1" dirty="0"/>
+                  <a:t>Main functions:</a:t>
+                </a:r>
+              </a:p>
+              <a:p>
+                <a:pPr marL="742950" lvl="1" indent="-285750">
+                  <a:buFont typeface="Arial" panose="020B0604020202020204" pitchFamily="34" charset="0"/>
+                  <a:buChar char="•"/>
+                </a:pPr>
+                <a:r>
+                  <a:rPr lang="en-GB" dirty="0"/>
+                  <a:t>To code original symbols and generate enough coded symbols for the decoding process.</a:t>
+                </a:r>
+              </a:p>
+              <a:p>
+                <a:pPr marL="742950" lvl="1" indent="-285750">
+                  <a:buFont typeface="Arial" panose="020B0604020202020204" pitchFamily="34" charset="0"/>
+                  <a:buChar char="•"/>
+                </a:pPr>
+                <a:r>
+                  <a:rPr lang="en-GB" dirty="0"/>
+                  <a:t>To generate random coefficients.</a:t>
+                </a:r>
+              </a:p>
+              <a:p>
+                <a:pPr marL="742950" lvl="1" indent="-285750">
+                  <a:buFont typeface="Arial" panose="020B0604020202020204" pitchFamily="34" charset="0"/>
+                  <a:buChar char="•"/>
+                </a:pPr>
+                <a:r>
+                  <a:rPr lang="en-GB" dirty="0"/>
+                  <a:t>To perform the required linear combinations.</a:t>
+                </a:r>
+              </a:p>
+              <a:p>
+                <a:pPr marL="742950" lvl="1" indent="-285750">
+                  <a:buFont typeface="Arial" panose="020B0604020202020204" pitchFamily="34" charset="0"/>
+                  <a:buChar char="•"/>
+                </a:pPr>
+                <a:endParaRPr lang="en-GB" dirty="0"/>
+              </a:p>
+              <a:p>
+                <a:pPr marL="285750" indent="-285750">
+                  <a:buFont typeface="Arial" panose="020B0604020202020204" pitchFamily="34" charset="0"/>
+                  <a:buChar char="•"/>
+                </a:pPr>
+                <a:r>
+                  <a:rPr lang="en-GB" b="1" dirty="0"/>
+                  <a:t>Design choice N.º3 – Where to generate the coded packets</a:t>
+                </a:r>
+              </a:p>
+              <a:p>
+                <a:pPr marL="742950" lvl="1" indent="-285750">
+                  <a:buFont typeface="Arial" panose="020B0604020202020204" pitchFamily="34" charset="0"/>
+                  <a:buChar char="•"/>
+                </a:pPr>
+                <a:r>
+                  <a:rPr lang="en-GB" dirty="0"/>
+                  <a:t>Coded Packets are usually generated at the source</a:t>
+                </a:r>
+              </a:p>
+              <a:p>
+                <a:pPr marL="742950" lvl="1" indent="-285750">
+                  <a:buFont typeface="Arial" panose="020B0604020202020204" pitchFamily="34" charset="0"/>
+                  <a:buChar char="•"/>
+                </a:pPr>
+                <a:r>
+                  <a:rPr lang="en-GB" dirty="0"/>
+                  <a:t>Host</a:t>
+                </a:r>
+              </a:p>
+              <a:p>
+                <a:pPr marL="742950" lvl="1" indent="-285750">
+                  <a:buFont typeface="Arial" panose="020B0604020202020204" pitchFamily="34" charset="0"/>
+                  <a:buChar char="•"/>
+                </a:pPr>
+                <a:r>
+                  <a:rPr lang="en-GB" dirty="0"/>
+                  <a:t>Switch</a:t>
+                </a:r>
+              </a:p>
+              <a:p>
+                <a:pPr marL="285750" indent="-285750">
+                  <a:buFont typeface="Arial" panose="020B0604020202020204" pitchFamily="34" charset="0"/>
+                  <a:buChar char="•"/>
+                </a:pPr>
+                <a:endParaRPr lang="en-GB" dirty="0"/>
+              </a:p>
+              <a:p>
+                <a:pPr marL="285750" indent="-285750">
+                  <a:buFont typeface="Arial" panose="020B0604020202020204" pitchFamily="34" charset="0"/>
+                  <a:buChar char="•"/>
+                </a:pPr>
+                <a:r>
+                  <a:rPr lang="en-GB" b="1" dirty="0"/>
+                  <a:t>Design choice N.º4 – Is there a need for feedback</a:t>
+                </a:r>
+              </a:p>
+              <a:p>
+                <a:pPr marL="742950" lvl="1" indent="-285750">
+                  <a:buFont typeface="Arial" panose="020B0604020202020204" pitchFamily="34" charset="0"/>
+                  <a:buChar char="•"/>
+                </a:pPr>
+                <a:r>
+                  <a:rPr lang="en-GB" dirty="0"/>
+                  <a:t>Can be used to know when to stop generating coded packets</a:t>
+                </a:r>
+              </a:p>
+              <a:p>
+                <a:pPr marL="285750" indent="-285750">
+                  <a:buFont typeface="Arial" panose="020B0604020202020204" pitchFamily="34" charset="0"/>
+                  <a:buChar char="•"/>
+                </a:pPr>
+                <a:endParaRPr lang="en-GB" dirty="0"/>
+              </a:p>
+              <a:p>
+                <a:pPr marL="285750" indent="-285750">
+                  <a:buFont typeface="Arial" panose="020B0604020202020204" pitchFamily="34" charset="0"/>
+                  <a:buChar char="•"/>
+                </a:pPr>
+                <a:r>
+                  <a:rPr lang="en-GB" b="1" dirty="0"/>
+                  <a:t>Design choice N.º5 – How implement product/division</a:t>
+                </a:r>
+              </a:p>
+              <a:p>
+                <a:pPr marL="742950" lvl="1" indent="-285750">
+                  <a:buFont typeface="Arial" panose="020B0604020202020204" pitchFamily="34" charset="0"/>
+                  <a:buChar char="•"/>
+                </a:pPr>
+                <a:r>
+                  <a:rPr lang="en-GB" dirty="0"/>
+                  <a:t>Lookup tables</a:t>
+                </a:r>
+              </a:p>
+              <a:p>
+                <a:pPr marL="1200150" lvl="2" indent="-285750">
+                  <a:buFont typeface="Arial" panose="020B0604020202020204" pitchFamily="34" charset="0"/>
+                  <a:buChar char="•"/>
+                </a:pPr>
+                <a:r>
+                  <a:rPr lang="en-GB" dirty="0"/>
+                  <a:t>Good for smaller finite fields (e.g.  </a:t>
+                </a:r>
+                <a14:m>
+                  <m:oMath xmlns:m="http://schemas.openxmlformats.org/officeDocument/2006/math">
+                    <m:r>
+                      <a:rPr lang="en-GB" i="1">
+                        <a:latin typeface="Cambria Math" panose="02040503050406030204" pitchFamily="18" charset="0"/>
+                      </a:rPr>
+                      <m:t>𝐺𝐹</m:t>
+                    </m:r>
+                    <m:d>
+                      <m:dPr>
+                        <m:ctrlPr>
+                          <a:rPr lang="en-GB" i="1">
+                            <a:latin typeface="Cambria Math" panose="02040503050406030204" pitchFamily="18" charset="0"/>
+                          </a:rPr>
+                        </m:ctrlPr>
+                      </m:dPr>
+                      <m:e>
+                        <m:sSup>
+                          <m:sSupPr>
+                            <m:ctrlPr>
+                              <a:rPr lang="en-GB" i="1">
+                                <a:latin typeface="Cambria Math" panose="02040503050406030204" pitchFamily="18" charset="0"/>
+                              </a:rPr>
+                            </m:ctrlPr>
+                          </m:sSupPr>
+                          <m:e>
+                            <m:r>
+                              <a:rPr lang="en-GB" i="1">
+                                <a:latin typeface="Cambria Math" panose="02040503050406030204" pitchFamily="18" charset="0"/>
+                              </a:rPr>
+                              <m:t>2</m:t>
+                            </m:r>
+                          </m:e>
+                          <m:sup>
+                            <m:r>
+                              <a:rPr lang="en-GB" i="1">
+                                <a:latin typeface="Cambria Math" panose="02040503050406030204" pitchFamily="18" charset="0"/>
+                              </a:rPr>
+                              <m:t>8</m:t>
+                            </m:r>
+                          </m:sup>
+                        </m:sSup>
+                      </m:e>
+                    </m:d>
+                  </m:oMath>
+                </a14:m>
+                <a:r>
+                  <a:rPr lang="en-GB" dirty="0"/>
+                  <a:t>)</a:t>
+                </a:r>
+              </a:p>
+              <a:p>
+                <a:pPr marL="1200150" lvl="2" indent="-285750">
+                  <a:buFont typeface="Arial" panose="020B0604020202020204" pitchFamily="34" charset="0"/>
+                  <a:buChar char="•"/>
+                </a:pPr>
+                <a:r>
+                  <a:rPr lang="en-GB" dirty="0"/>
+                  <a:t>Needs the appropriate memory space</a:t>
+                </a:r>
+              </a:p>
+              <a:p>
+                <a:pPr marL="1200150" lvl="2" indent="-285750">
+                  <a:buFont typeface="Arial" panose="020B0604020202020204" pitchFamily="34" charset="0"/>
+                  <a:buChar char="•"/>
+                </a:pPr>
+                <a:r>
+                  <a:rPr lang="en-GB" dirty="0"/>
+                  <a:t>Doesn’t work with larger finite fields, the memory space required is too much</a:t>
+                </a:r>
+              </a:p>
+              <a:p>
+                <a:pPr marL="742950" lvl="1" indent="-285750">
+                  <a:buFont typeface="Arial" panose="020B0604020202020204" pitchFamily="34" charset="0"/>
+                  <a:buChar char="•"/>
+                </a:pPr>
+                <a:r>
+                  <a:rPr lang="en-GB" dirty="0"/>
+                  <a:t>Others</a:t>
+                </a:r>
+              </a:p>
+              <a:p>
+                <a:pPr marL="1200150" lvl="2" indent="-285750">
+                  <a:buFont typeface="Arial" panose="020B0604020202020204" pitchFamily="34" charset="0"/>
+                  <a:buChar char="•"/>
+                </a:pPr>
+                <a:r>
+                  <a:rPr lang="en-GB" dirty="0"/>
+                  <a:t>Product (shifts+ XORs)</a:t>
+                </a:r>
+              </a:p>
+              <a:p>
+                <a:pPr marL="1200150" lvl="2" indent="-285750">
+                  <a:buFont typeface="Arial" panose="020B0604020202020204" pitchFamily="34" charset="0"/>
+                  <a:buChar char="•"/>
+                </a:pPr>
+                <a:r>
+                  <a:rPr lang="en-GB" dirty="0"/>
+                  <a:t>Modulo irreducible polynomial (long division)</a:t>
+                </a:r>
+              </a:p>
+              <a:p>
+                <a:pPr marL="742950" lvl="1" indent="-285750">
+                  <a:buFont typeface="Arial" panose="020B0604020202020204" pitchFamily="34" charset="0"/>
+                  <a:buChar char="•"/>
+                </a:pPr>
+                <a:endParaRPr lang="en-GB" dirty="0"/>
+              </a:p>
+              <a:p>
+                <a:endParaRPr lang="en-GB" dirty="0"/>
+              </a:p>
+              <a:p>
+                <a:endParaRPr lang="en-GB" dirty="0"/>
+              </a:p>
+            </p:txBody>
+          </p:sp>
+        </mc:Choice>
+        <mc:Fallback>
+          <p:sp>
+            <p:nvSpPr>
+              <p:cNvPr id="5" name="CaixaDeTexto 4">
+                <a:extLst>
+                  <a:ext uri="{FF2B5EF4-FFF2-40B4-BE49-F238E27FC236}">
+                    <a16:creationId xmlns:a16="http://schemas.microsoft.com/office/drawing/2014/main" id="{C1A77EF9-8DC4-404B-9D49-89056F314C9E}"/>
+                  </a:ext>
+                </a:extLst>
+              </p:cNvPr>
+              <p:cNvSpPr txBox="1">
+                <a:spLocks noRot="1" noChangeAspect="1" noMove="1" noResize="1" noEditPoints="1" noAdjustHandles="1" noChangeArrowheads="1" noChangeShapeType="1" noTextEdit="1"/>
+              </p:cNvSpPr>
+              <p:nvPr/>
+            </p:nvSpPr>
+            <p:spPr>
+              <a:xfrm>
+                <a:off x="5265891" y="0"/>
+                <a:ext cx="6631912" cy="7848302"/>
+              </a:xfrm>
+              <a:prstGeom prst="rect">
+                <a:avLst/>
+              </a:prstGeom>
+              <a:blipFill>
+                <a:blip r:embed="rId7"/>
+                <a:stretch>
+                  <a:fillRect l="-827" t="-389" r="-1011"/>
+                </a:stretch>
+              </a:blipFill>
+            </p:spPr>
+            <p:txBody>
+              <a:bodyPr/>
+              <a:lstStyle/>
+              <a:p>
+                <a:r>
+                  <a:rPr lang="en-GB">
+                    <a:noFill/>
+                  </a:rPr>
+                  <a:t> </a:t>
+                </a:r>
+              </a:p>
+            </p:txBody>
+          </p:sp>
+        </mc:Fallback>
+      </mc:AlternateContent>
     </p:spTree>
     <p:extLst>
       <p:ext uri="{BB962C8B-B14F-4D97-AF65-F5344CB8AC3E}">
@@ -18884,7 +22547,7 @@
 </p:sld>
 </file>
 
-<file path=ppt/slides/slide6.xml><?xml version="1.0" encoding="utf-8"?>
+<file path=ppt/slides/slide7.xml><?xml version="1.0" encoding="utf-8"?>
 <p:sld xmlns:a="http://schemas.openxmlformats.org/drawingml/2006/main" xmlns:r="http://schemas.openxmlformats.org/officeDocument/2006/relationships" xmlns:p="http://schemas.openxmlformats.org/presentationml/2006/main">
   <p:cSld>
     <p:spTree>
@@ -18944,7 +22607,7 @@
         <p:spPr>
           <a:xfrm>
             <a:off x="5347171" y="403166"/>
-            <a:ext cx="6631912" cy="5078313"/>
+            <a:ext cx="6631912" cy="2585323"/>
           </a:xfrm>
           <a:prstGeom prst="rect">
             <a:avLst/>
@@ -18967,7 +22630,7 @@
           </a:p>
           <a:p>
             <a:r>
-              <a:rPr lang="en-GB" dirty="0"/>
+              <a:rPr lang="en-GB" b="1" dirty="0"/>
               <a:t>Main functions:</a:t>
             </a:r>
           </a:p>
@@ -19002,72 +22665,17 @@
             </a:r>
           </a:p>
           <a:p>
+            <a:pPr marL="285750" indent="-285750">
+              <a:buFont typeface="Arial" panose="020B0604020202020204" pitchFamily="34" charset="0"/>
+              <a:buChar char="•"/>
+            </a:pPr>
             <a:endParaRPr lang="en-GB" dirty="0"/>
           </a:p>
           <a:p>
             <a:r>
-              <a:rPr lang="en-GB" dirty="0"/>
-              <a:t>Challenges:</a:t>
+              <a:rPr lang="en-GB" b="1" dirty="0"/>
+              <a:t>Same design choices as the coding submodule</a:t>
             </a:r>
-          </a:p>
-          <a:p>
-            <a:pPr marL="800100" lvl="1" indent="-342900">
-              <a:buFont typeface="+mj-lt"/>
-              <a:buAutoNum type="arabicPeriod"/>
-            </a:pPr>
-            <a:r>
-              <a:rPr lang="en-GB" dirty="0"/>
-              <a:t>Performing multiplication</a:t>
-            </a:r>
-          </a:p>
-          <a:p>
-            <a:pPr marL="800100" lvl="1" indent="-342900">
-              <a:buFont typeface="+mj-lt"/>
-              <a:buAutoNum type="arabicPeriod"/>
-            </a:pPr>
-            <a:r>
-              <a:rPr lang="en-GB" dirty="0"/>
-              <a:t>Handling arithmetic operations with a large number of symbols and coefficients leads to a more complex computation.</a:t>
-            </a:r>
-          </a:p>
-          <a:p>
-            <a:r>
-              <a:rPr lang="en-GB" dirty="0"/>
-              <a:t> </a:t>
-            </a:r>
-          </a:p>
-          <a:p>
-            <a:r>
-              <a:rPr lang="en-GB" dirty="0"/>
-              <a:t>Solutions:</a:t>
-            </a:r>
-          </a:p>
-          <a:p>
-            <a:pPr marL="800100" lvl="1" indent="-342900">
-              <a:buFont typeface="+mj-lt"/>
-              <a:buAutoNum type="arabicPeriod"/>
-            </a:pPr>
-            <a:r>
-              <a:rPr lang="en-GB" dirty="0"/>
-              <a:t>Use lookup tables for multiplication</a:t>
-            </a:r>
-          </a:p>
-          <a:p>
-            <a:pPr marL="800100" lvl="1" indent="-342900">
-              <a:buFont typeface="+mj-lt"/>
-              <a:buAutoNum type="arabicPeriod"/>
-            </a:pPr>
-            <a:r>
-              <a:rPr lang="en-GB" dirty="0"/>
-              <a:t>???</a:t>
-            </a:r>
-          </a:p>
-          <a:p>
-            <a:pPr marL="742950" lvl="1" indent="-285750">
-              <a:buFont typeface="Arial" panose="020B0604020202020204" pitchFamily="34" charset="0"/>
-              <a:buChar char="•"/>
-            </a:pPr>
-            <a:endParaRPr lang="en-GB" dirty="0"/>
           </a:p>
           <a:p>
             <a:pPr marL="742950" lvl="1" indent="-285750">
@@ -19091,7 +22699,7 @@
 </p:sld>
 </file>
 
-<file path=ppt/slides/slide7.xml><?xml version="1.0" encoding="utf-8"?>
+<file path=ppt/slides/slide8.xml><?xml version="1.0" encoding="utf-8"?>
 <p:sld xmlns:a="http://schemas.openxmlformats.org/drawingml/2006/main" xmlns:r="http://schemas.openxmlformats.org/officeDocument/2006/relationships" xmlns:p="http://schemas.openxmlformats.org/presentationml/2006/main">
   <p:cSld>
     <p:spTree>
@@ -19151,7 +22759,7 @@
         <p:spPr>
           <a:xfrm>
             <a:off x="5347171" y="403166"/>
-            <a:ext cx="6631912" cy="4247317"/>
+            <a:ext cx="6631912" cy="3693319"/>
           </a:xfrm>
           <a:prstGeom prst="rect">
             <a:avLst/>
@@ -19174,8 +22782,12 @@
           </a:p>
           <a:p>
             <a:r>
+              <a:rPr lang="en-GB" b="1" dirty="0"/>
+              <a:t>Main functions</a:t>
+            </a:r>
+            <a:r>
               <a:rPr lang="en-GB" dirty="0"/>
-              <a:t>Main functions:</a:t>
+              <a:t>:</a:t>
             </a:r>
           </a:p>
           <a:p>
@@ -19209,58 +22821,17 @@
             </a:r>
           </a:p>
           <a:p>
+            <a:pPr lvl="1"/>
             <a:endParaRPr lang="en-GB" dirty="0"/>
           </a:p>
           <a:p>
-            <a:r>
-              <a:rPr lang="en-GB" dirty="0"/>
-              <a:t>Challenges:</a:t>
-            </a:r>
-          </a:p>
-          <a:p>
-            <a:pPr marL="800100" lvl="1" indent="-342900">
-              <a:buFont typeface="+mj-lt"/>
-              <a:buAutoNum type="arabicPeriod"/>
+            <a:pPr marL="285750" indent="-285750">
+              <a:buFont typeface="Arial" panose="020B0604020202020204" pitchFamily="34" charset="0"/>
+              <a:buChar char="•"/>
             </a:pPr>
             <a:r>
-              <a:rPr lang="en-GB" dirty="0"/>
-              <a:t>Checking for linear independency</a:t>
-            </a:r>
-          </a:p>
-          <a:p>
-            <a:pPr marL="800100" lvl="1" indent="-342900">
-              <a:buFont typeface="+mj-lt"/>
-              <a:buAutoNum type="arabicPeriod"/>
-            </a:pPr>
-            <a:r>
-              <a:rPr lang="en-GB" dirty="0"/>
-              <a:t>Performing Gaussian Elimination </a:t>
-            </a:r>
-          </a:p>
-          <a:p>
-            <a:r>
-              <a:rPr lang="en-GB" dirty="0"/>
-              <a:t>Solutions:</a:t>
-            </a:r>
-          </a:p>
-          <a:p>
-            <a:pPr marL="800100" lvl="1" indent="-342900">
-              <a:buFont typeface="+mj-lt"/>
-              <a:buAutoNum type="arabicPeriod"/>
-            </a:pPr>
-            <a:r>
-              <a:rPr lang="en-GB" dirty="0"/>
-              <a:t>???</a:t>
-            </a:r>
-          </a:p>
-          <a:p>
-            <a:pPr marL="800100" lvl="1" indent="-342900">
-              <a:buFont typeface="+mj-lt"/>
-              <a:buAutoNum type="arabicPeriod"/>
-            </a:pPr>
-            <a:r>
-              <a:rPr lang="en-GB" dirty="0"/>
-              <a:t>???</a:t>
+              <a:rPr lang="en-GB" b="1" dirty="0"/>
+              <a:t>Design choice N.º6 – Checking for linear independency</a:t>
             </a:r>
           </a:p>
           <a:p>
@@ -19268,7 +22839,38 @@
               <a:buFont typeface="Arial" panose="020B0604020202020204" pitchFamily="34" charset="0"/>
               <a:buChar char="•"/>
             </a:pPr>
+            <a:r>
+              <a:rPr lang="en-GB" dirty="0"/>
+              <a:t>Possible on a switch?</a:t>
+            </a:r>
+            <a:endParaRPr lang="en-GB" b="1" dirty="0"/>
+          </a:p>
+          <a:p>
+            <a:pPr marL="285750" indent="-285750">
+              <a:buFont typeface="Arial" panose="020B0604020202020204" pitchFamily="34" charset="0"/>
+              <a:buChar char="•"/>
+            </a:pPr>
             <a:endParaRPr lang="en-GB" dirty="0"/>
+          </a:p>
+          <a:p>
+            <a:pPr marL="285750" indent="-285750">
+              <a:buFont typeface="Arial" panose="020B0604020202020204" pitchFamily="34" charset="0"/>
+              <a:buChar char="•"/>
+            </a:pPr>
+            <a:r>
+              <a:rPr lang="en-GB" b="1" dirty="0"/>
+              <a:t>Design choice N.º7 – Solving the linear equations (decoding)</a:t>
+            </a:r>
+          </a:p>
+          <a:p>
+            <a:pPr marL="742950" lvl="1" indent="-285750">
+              <a:buFont typeface="Arial" panose="020B0604020202020204" pitchFamily="34" charset="0"/>
+              <a:buChar char="•"/>
+            </a:pPr>
+            <a:r>
+              <a:rPr lang="en-GB" dirty="0"/>
+              <a:t>Possible on a switch?</a:t>
+            </a:r>
           </a:p>
           <a:p>
             <a:pPr marL="742950" lvl="1" indent="-285750">
@@ -19292,7 +22894,7 @@
 </p:sld>
 </file>
 
-<file path=ppt/slides/slide8.xml><?xml version="1.0" encoding="utf-8"?>
+<file path=ppt/slides/slide9.xml><?xml version="1.0" encoding="utf-8"?>
 <p:sld xmlns:a="http://schemas.openxmlformats.org/drawingml/2006/main" xmlns:r="http://schemas.openxmlformats.org/officeDocument/2006/relationships" xmlns:p="http://schemas.openxmlformats.org/presentationml/2006/main">
   <p:cSld>
     <p:spTree>
@@ -19347,8 +22949,12 @@
           </a:p>
           <a:p>
             <a:r>
+              <a:rPr lang="en-GB" b="1" dirty="0"/>
+              <a:t>Core objective</a:t>
+            </a:r>
+            <a:r>
               <a:rPr lang="en-GB" dirty="0"/>
-              <a:t>Core objective:</a:t>
+              <a:t>:</a:t>
             </a:r>
           </a:p>
           <a:p>
@@ -19358,7 +22964,7 @@
             </a:pPr>
             <a:r>
               <a:rPr lang="en-GB" dirty="0"/>
-              <a:t>To forward the packet to the next node based on some forwarding policy</a:t>
+              <a:t>To forward the packet to the next node according to some forwarding policy</a:t>
             </a:r>
           </a:p>
           <a:p>

</xml_diff>